<commit_message>
Translation of DJ-00-MOOC-Introduction to Spanish
</commit_message>
<xml_diff>
--- a/lectures/DJ-01-Hosting.pptx
+++ b/lectures/DJ-01-Hosting.pptx
@@ -212,7 +212,7 @@
           <a:p>
             <a:fld id="{50B45596-9E8A-1341-85F9-3131B49433D0}" type="datetimeFigureOut">
               <a:rPr lang="en-US" smtClean="0"/>
-              <a:t>9/11/19</a:t>
+              <a:t>7/2/2022</a:t>
             </a:fld>
             <a:endParaRPr lang="en-US"/>
           </a:p>
@@ -276,38 +276,37 @@
           <a:p>
             <a:pPr lvl="0"/>
             <a:r>
-              <a:rPr lang="en-US" smtClean="0"/>
+              <a:rPr lang="en-US"/>
               <a:t>Click to edit Master text styles</a:t>
             </a:r>
           </a:p>
           <a:p>
             <a:pPr lvl="1"/>
             <a:r>
-              <a:rPr lang="en-US" smtClean="0"/>
+              <a:rPr lang="en-US"/>
               <a:t>Second level</a:t>
             </a:r>
           </a:p>
           <a:p>
             <a:pPr lvl="2"/>
             <a:r>
-              <a:rPr lang="en-US" smtClean="0"/>
+              <a:rPr lang="en-US"/>
               <a:t>Third level</a:t>
             </a:r>
           </a:p>
           <a:p>
             <a:pPr lvl="3"/>
             <a:r>
-              <a:rPr lang="en-US" smtClean="0"/>
+              <a:rPr lang="en-US"/>
               <a:t>Fourth level</a:t>
             </a:r>
           </a:p>
           <a:p>
             <a:pPr lvl="4"/>
             <a:r>
-              <a:rPr lang="en-US" smtClean="0"/>
+              <a:rPr lang="en-US"/>
               <a:t>Fifth level</a:t>
             </a:r>
-            <a:endParaRPr lang="en-US"/>
           </a:p>
         </p:txBody>
       </p:sp>
@@ -714,10 +713,9 @@
           </a:lstStyle>
           <a:p>
             <a:r>
-              <a:rPr lang="en-US" dirty="0" smtClean="0"/>
+              <a:rPr lang="en-US" dirty="0"/>
               <a:t>Click to edit Master title style</a:t>
             </a:r>
-            <a:endParaRPr lang="en-US" dirty="0"/>
           </a:p>
         </p:txBody>
       </p:sp>
@@ -779,7 +777,7 @@
           </a:lstStyle>
           <a:p>
             <a:r>
-              <a:rPr lang="en-US" smtClean="0"/>
+              <a:rPr lang="en-US"/>
               <a:t>Click to edit Master subtitle style</a:t>
             </a:r>
             <a:endParaRPr lang="en-US" dirty="0"/>
@@ -803,7 +801,7 @@
           <a:p>
             <a:fld id="{413CA8BA-03F0-8A40-9C15-559693455F49}" type="datetimeFigureOut">
               <a:rPr lang="en-US" smtClean="0"/>
-              <a:t>9/11/19</a:t>
+              <a:t>7/2/2022</a:t>
             </a:fld>
             <a:endParaRPr lang="en-US"/>
           </a:p>
@@ -892,7 +890,7 @@
           <a:lstStyle/>
           <a:p>
             <a:r>
-              <a:rPr lang="en-US" smtClean="0"/>
+              <a:rPr lang="en-US"/>
               <a:t>Click to edit Master title style</a:t>
             </a:r>
             <a:endParaRPr lang="en-US" dirty="0"/>
@@ -916,35 +914,35 @@
           <a:p>
             <a:pPr lvl="0"/>
             <a:r>
-              <a:rPr lang="en-US" smtClean="0"/>
+              <a:rPr lang="en-US"/>
               <a:t>Click to edit Master text styles</a:t>
             </a:r>
           </a:p>
           <a:p>
             <a:pPr lvl="1"/>
             <a:r>
-              <a:rPr lang="en-US" smtClean="0"/>
+              <a:rPr lang="en-US"/>
               <a:t>Second level</a:t>
             </a:r>
           </a:p>
           <a:p>
             <a:pPr lvl="2"/>
             <a:r>
-              <a:rPr lang="en-US" smtClean="0"/>
+              <a:rPr lang="en-US"/>
               <a:t>Third level</a:t>
             </a:r>
           </a:p>
           <a:p>
             <a:pPr lvl="3"/>
             <a:r>
-              <a:rPr lang="en-US" smtClean="0"/>
+              <a:rPr lang="en-US"/>
               <a:t>Fourth level</a:t>
             </a:r>
           </a:p>
           <a:p>
             <a:pPr lvl="4"/>
             <a:r>
-              <a:rPr lang="en-US" smtClean="0"/>
+              <a:rPr lang="en-US"/>
               <a:t>Fifth level</a:t>
             </a:r>
             <a:endParaRPr lang="en-US" dirty="0"/>
@@ -968,7 +966,7 @@
           <a:p>
             <a:fld id="{413CA8BA-03F0-8A40-9C15-559693455F49}" type="datetimeFigureOut">
               <a:rPr lang="en-US" smtClean="0"/>
-              <a:t>9/11/19</a:t>
+              <a:t>7/2/2022</a:t>
             </a:fld>
             <a:endParaRPr lang="en-US"/>
           </a:p>
@@ -1062,7 +1060,7 @@
           <a:lstStyle/>
           <a:p>
             <a:r>
-              <a:rPr lang="en-US" smtClean="0"/>
+              <a:rPr lang="en-US"/>
               <a:t>Click to edit Master title style</a:t>
             </a:r>
             <a:endParaRPr lang="en-US" dirty="0"/>
@@ -1091,35 +1089,35 @@
           <a:p>
             <a:pPr lvl="0"/>
             <a:r>
-              <a:rPr lang="en-US" smtClean="0"/>
+              <a:rPr lang="en-US"/>
               <a:t>Click to edit Master text styles</a:t>
             </a:r>
           </a:p>
           <a:p>
             <a:pPr lvl="1"/>
             <a:r>
-              <a:rPr lang="en-US" smtClean="0"/>
+              <a:rPr lang="en-US"/>
               <a:t>Second level</a:t>
             </a:r>
           </a:p>
           <a:p>
             <a:pPr lvl="2"/>
             <a:r>
-              <a:rPr lang="en-US" smtClean="0"/>
+              <a:rPr lang="en-US"/>
               <a:t>Third level</a:t>
             </a:r>
           </a:p>
           <a:p>
             <a:pPr lvl="3"/>
             <a:r>
-              <a:rPr lang="en-US" smtClean="0"/>
+              <a:rPr lang="en-US"/>
               <a:t>Fourth level</a:t>
             </a:r>
           </a:p>
           <a:p>
             <a:pPr lvl="4"/>
             <a:r>
-              <a:rPr lang="en-US" smtClean="0"/>
+              <a:rPr lang="en-US"/>
               <a:t>Fifth level</a:t>
             </a:r>
             <a:endParaRPr lang="en-US" dirty="0"/>
@@ -1143,7 +1141,7 @@
           <a:p>
             <a:fld id="{413CA8BA-03F0-8A40-9C15-559693455F49}" type="datetimeFigureOut">
               <a:rPr lang="en-US" smtClean="0"/>
-              <a:t>9/11/19</a:t>
+              <a:t>7/2/2022</a:t>
             </a:fld>
             <a:endParaRPr lang="en-US"/>
           </a:p>
@@ -1232,7 +1230,7 @@
           <a:lstStyle/>
           <a:p>
             <a:r>
-              <a:rPr lang="en-US" smtClean="0"/>
+              <a:rPr lang="en-US"/>
               <a:t>Click to edit Master title style</a:t>
             </a:r>
             <a:endParaRPr lang="en-US" dirty="0"/>
@@ -1256,35 +1254,35 @@
           <a:p>
             <a:pPr lvl="0"/>
             <a:r>
-              <a:rPr lang="en-US" smtClean="0"/>
+              <a:rPr lang="en-US"/>
               <a:t>Click to edit Master text styles</a:t>
             </a:r>
           </a:p>
           <a:p>
             <a:pPr lvl="1"/>
             <a:r>
-              <a:rPr lang="en-US" smtClean="0"/>
+              <a:rPr lang="en-US"/>
               <a:t>Second level</a:t>
             </a:r>
           </a:p>
           <a:p>
             <a:pPr lvl="2"/>
             <a:r>
-              <a:rPr lang="en-US" smtClean="0"/>
+              <a:rPr lang="en-US"/>
               <a:t>Third level</a:t>
             </a:r>
           </a:p>
           <a:p>
             <a:pPr lvl="3"/>
             <a:r>
-              <a:rPr lang="en-US" smtClean="0"/>
+              <a:rPr lang="en-US"/>
               <a:t>Fourth level</a:t>
             </a:r>
           </a:p>
           <a:p>
             <a:pPr lvl="4"/>
             <a:r>
-              <a:rPr lang="en-US" smtClean="0"/>
+              <a:rPr lang="en-US"/>
               <a:t>Fifth level</a:t>
             </a:r>
             <a:endParaRPr lang="en-US" dirty="0"/>
@@ -1308,7 +1306,7 @@
           <a:p>
             <a:fld id="{413CA8BA-03F0-8A40-9C15-559693455F49}" type="datetimeFigureOut">
               <a:rPr lang="en-US" smtClean="0"/>
-              <a:t>9/11/19</a:t>
+              <a:t>7/2/2022</a:t>
             </a:fld>
             <a:endParaRPr lang="en-US"/>
           </a:p>
@@ -1406,7 +1404,7 @@
           </a:lstStyle>
           <a:p>
             <a:r>
-              <a:rPr lang="en-US" smtClean="0"/>
+              <a:rPr lang="en-US"/>
               <a:t>Click to edit Master title style</a:t>
             </a:r>
             <a:endParaRPr lang="en-US" dirty="0"/>
@@ -1526,7 +1524,7 @@
           <a:p>
             <a:pPr lvl="0"/>
             <a:r>
-              <a:rPr lang="en-US" smtClean="0"/>
+              <a:rPr lang="en-US"/>
               <a:t>Click to edit Master text styles</a:t>
             </a:r>
           </a:p>
@@ -1549,7 +1547,7 @@
           <a:p>
             <a:fld id="{413CA8BA-03F0-8A40-9C15-559693455F49}" type="datetimeFigureOut">
               <a:rPr lang="en-US" smtClean="0"/>
-              <a:t>9/11/19</a:t>
+              <a:t>7/2/2022</a:t>
             </a:fld>
             <a:endParaRPr lang="en-US"/>
           </a:p>
@@ -1638,7 +1636,7 @@
           <a:lstStyle/>
           <a:p>
             <a:r>
-              <a:rPr lang="en-US" smtClean="0"/>
+              <a:rPr lang="en-US"/>
               <a:t>Click to edit Master title style</a:t>
             </a:r>
             <a:endParaRPr lang="en-US" dirty="0"/>
@@ -1667,35 +1665,35 @@
           <a:p>
             <a:pPr lvl="0"/>
             <a:r>
-              <a:rPr lang="en-US" smtClean="0"/>
+              <a:rPr lang="en-US"/>
               <a:t>Click to edit Master text styles</a:t>
             </a:r>
           </a:p>
           <a:p>
             <a:pPr lvl="1"/>
             <a:r>
-              <a:rPr lang="en-US" smtClean="0"/>
+              <a:rPr lang="en-US"/>
               <a:t>Second level</a:t>
             </a:r>
           </a:p>
           <a:p>
             <a:pPr lvl="2"/>
             <a:r>
-              <a:rPr lang="en-US" smtClean="0"/>
+              <a:rPr lang="en-US"/>
               <a:t>Third level</a:t>
             </a:r>
           </a:p>
           <a:p>
             <a:pPr lvl="3"/>
             <a:r>
-              <a:rPr lang="en-US" smtClean="0"/>
+              <a:rPr lang="en-US"/>
               <a:t>Fourth level</a:t>
             </a:r>
           </a:p>
           <a:p>
             <a:pPr lvl="4"/>
             <a:r>
-              <a:rPr lang="en-US" smtClean="0"/>
+              <a:rPr lang="en-US"/>
               <a:t>Fifth level</a:t>
             </a:r>
             <a:endParaRPr lang="en-US" dirty="0"/>
@@ -1724,35 +1722,35 @@
           <a:p>
             <a:pPr lvl="0"/>
             <a:r>
-              <a:rPr lang="en-US" smtClean="0"/>
+              <a:rPr lang="en-US"/>
               <a:t>Click to edit Master text styles</a:t>
             </a:r>
           </a:p>
           <a:p>
             <a:pPr lvl="1"/>
             <a:r>
-              <a:rPr lang="en-US" smtClean="0"/>
+              <a:rPr lang="en-US"/>
               <a:t>Second level</a:t>
             </a:r>
           </a:p>
           <a:p>
             <a:pPr lvl="2"/>
             <a:r>
-              <a:rPr lang="en-US" smtClean="0"/>
+              <a:rPr lang="en-US"/>
               <a:t>Third level</a:t>
             </a:r>
           </a:p>
           <a:p>
             <a:pPr lvl="3"/>
             <a:r>
-              <a:rPr lang="en-US" smtClean="0"/>
+              <a:rPr lang="en-US"/>
               <a:t>Fourth level</a:t>
             </a:r>
           </a:p>
           <a:p>
             <a:pPr lvl="4"/>
             <a:r>
-              <a:rPr lang="en-US" smtClean="0"/>
+              <a:rPr lang="en-US"/>
               <a:t>Fifth level</a:t>
             </a:r>
             <a:endParaRPr lang="en-US" dirty="0"/>
@@ -1776,7 +1774,7 @@
           <a:p>
             <a:fld id="{413CA8BA-03F0-8A40-9C15-559693455F49}" type="datetimeFigureOut">
               <a:rPr lang="en-US" smtClean="0"/>
-              <a:t>9/11/19</a:t>
+              <a:t>7/2/2022</a:t>
             </a:fld>
             <a:endParaRPr lang="en-US"/>
           </a:p>
@@ -1870,7 +1868,7 @@
           <a:lstStyle/>
           <a:p>
             <a:r>
-              <a:rPr lang="en-US" smtClean="0"/>
+              <a:rPr lang="en-US"/>
               <a:t>Click to edit Master title style</a:t>
             </a:r>
             <a:endParaRPr lang="en-US" dirty="0"/>
@@ -1936,7 +1934,7 @@
           <a:p>
             <a:pPr lvl="0"/>
             <a:r>
-              <a:rPr lang="en-US" smtClean="0"/>
+              <a:rPr lang="en-US"/>
               <a:t>Click to edit Master text styles</a:t>
             </a:r>
           </a:p>
@@ -1964,35 +1962,35 @@
           <a:p>
             <a:pPr lvl="0"/>
             <a:r>
-              <a:rPr lang="en-US" smtClean="0"/>
+              <a:rPr lang="en-US"/>
               <a:t>Click to edit Master text styles</a:t>
             </a:r>
           </a:p>
           <a:p>
             <a:pPr lvl="1"/>
             <a:r>
-              <a:rPr lang="en-US" smtClean="0"/>
+              <a:rPr lang="en-US"/>
               <a:t>Second level</a:t>
             </a:r>
           </a:p>
           <a:p>
             <a:pPr lvl="2"/>
             <a:r>
-              <a:rPr lang="en-US" smtClean="0"/>
+              <a:rPr lang="en-US"/>
               <a:t>Third level</a:t>
             </a:r>
           </a:p>
           <a:p>
             <a:pPr lvl="3"/>
             <a:r>
-              <a:rPr lang="en-US" smtClean="0"/>
+              <a:rPr lang="en-US"/>
               <a:t>Fourth level</a:t>
             </a:r>
           </a:p>
           <a:p>
             <a:pPr lvl="4"/>
             <a:r>
-              <a:rPr lang="en-US" smtClean="0"/>
+              <a:rPr lang="en-US"/>
               <a:t>Fifth level</a:t>
             </a:r>
             <a:endParaRPr lang="en-US" dirty="0"/>
@@ -2058,7 +2056,7 @@
           <a:p>
             <a:pPr lvl="0"/>
             <a:r>
-              <a:rPr lang="en-US" smtClean="0"/>
+              <a:rPr lang="en-US"/>
               <a:t>Click to edit Master text styles</a:t>
             </a:r>
           </a:p>
@@ -2086,35 +2084,35 @@
           <a:p>
             <a:pPr lvl="0"/>
             <a:r>
-              <a:rPr lang="en-US" smtClean="0"/>
+              <a:rPr lang="en-US"/>
               <a:t>Click to edit Master text styles</a:t>
             </a:r>
           </a:p>
           <a:p>
             <a:pPr lvl="1"/>
             <a:r>
-              <a:rPr lang="en-US" smtClean="0"/>
+              <a:rPr lang="en-US"/>
               <a:t>Second level</a:t>
             </a:r>
           </a:p>
           <a:p>
             <a:pPr lvl="2"/>
             <a:r>
-              <a:rPr lang="en-US" smtClean="0"/>
+              <a:rPr lang="en-US"/>
               <a:t>Third level</a:t>
             </a:r>
           </a:p>
           <a:p>
             <a:pPr lvl="3"/>
             <a:r>
-              <a:rPr lang="en-US" smtClean="0"/>
+              <a:rPr lang="en-US"/>
               <a:t>Fourth level</a:t>
             </a:r>
           </a:p>
           <a:p>
             <a:pPr lvl="4"/>
             <a:r>
-              <a:rPr lang="en-US" smtClean="0"/>
+              <a:rPr lang="en-US"/>
               <a:t>Fifth level</a:t>
             </a:r>
             <a:endParaRPr lang="en-US" dirty="0"/>
@@ -2138,7 +2136,7 @@
           <a:p>
             <a:fld id="{413CA8BA-03F0-8A40-9C15-559693455F49}" type="datetimeFigureOut">
               <a:rPr lang="en-US" smtClean="0"/>
-              <a:t>9/11/19</a:t>
+              <a:t>7/2/2022</a:t>
             </a:fld>
             <a:endParaRPr lang="en-US"/>
           </a:p>
@@ -2227,7 +2225,7 @@
           <a:lstStyle/>
           <a:p>
             <a:r>
-              <a:rPr lang="en-US" smtClean="0"/>
+              <a:rPr lang="en-US"/>
               <a:t>Click to edit Master title style</a:t>
             </a:r>
             <a:endParaRPr lang="en-US" dirty="0"/>
@@ -2251,7 +2249,7 @@
           <a:p>
             <a:fld id="{413CA8BA-03F0-8A40-9C15-559693455F49}" type="datetimeFigureOut">
               <a:rPr lang="en-US" smtClean="0"/>
-              <a:t>9/11/19</a:t>
+              <a:t>7/2/2022</a:t>
             </a:fld>
             <a:endParaRPr lang="en-US"/>
           </a:p>
@@ -2341,7 +2339,7 @@
           <a:p>
             <a:fld id="{413CA8BA-03F0-8A40-9C15-559693455F49}" type="datetimeFigureOut">
               <a:rPr lang="en-US" smtClean="0"/>
-              <a:t>9/11/19</a:t>
+              <a:t>7/2/2022</a:t>
             </a:fld>
             <a:endParaRPr lang="en-US"/>
           </a:p>
@@ -2439,7 +2437,7 @@
           </a:lstStyle>
           <a:p>
             <a:r>
-              <a:rPr lang="en-US" smtClean="0"/>
+              <a:rPr lang="en-US"/>
               <a:t>Click to edit Master title style</a:t>
             </a:r>
             <a:endParaRPr lang="en-US" dirty="0"/>
@@ -2496,35 +2494,35 @@
           <a:p>
             <a:pPr lvl="0"/>
             <a:r>
-              <a:rPr lang="en-US" smtClean="0"/>
+              <a:rPr lang="en-US"/>
               <a:t>Click to edit Master text styles</a:t>
             </a:r>
           </a:p>
           <a:p>
             <a:pPr lvl="1"/>
             <a:r>
-              <a:rPr lang="en-US" smtClean="0"/>
+              <a:rPr lang="en-US"/>
               <a:t>Second level</a:t>
             </a:r>
           </a:p>
           <a:p>
             <a:pPr lvl="2"/>
             <a:r>
-              <a:rPr lang="en-US" smtClean="0"/>
+              <a:rPr lang="en-US"/>
               <a:t>Third level</a:t>
             </a:r>
           </a:p>
           <a:p>
             <a:pPr lvl="3"/>
             <a:r>
-              <a:rPr lang="en-US" smtClean="0"/>
+              <a:rPr lang="en-US"/>
               <a:t>Fourth level</a:t>
             </a:r>
           </a:p>
           <a:p>
             <a:pPr lvl="4"/>
             <a:r>
-              <a:rPr lang="en-US" smtClean="0"/>
+              <a:rPr lang="en-US"/>
               <a:t>Fifth level</a:t>
             </a:r>
             <a:endParaRPr lang="en-US" dirty="0"/>
@@ -2590,7 +2588,7 @@
           <a:p>
             <a:pPr lvl="0"/>
             <a:r>
-              <a:rPr lang="en-US" smtClean="0"/>
+              <a:rPr lang="en-US"/>
               <a:t>Click to edit Master text styles</a:t>
             </a:r>
           </a:p>
@@ -2613,7 +2611,7 @@
           <a:p>
             <a:fld id="{413CA8BA-03F0-8A40-9C15-559693455F49}" type="datetimeFigureOut">
               <a:rPr lang="en-US" smtClean="0"/>
-              <a:t>9/11/19</a:t>
+              <a:t>7/2/2022</a:t>
             </a:fld>
             <a:endParaRPr lang="en-US"/>
           </a:p>
@@ -2711,7 +2709,7 @@
           </a:lstStyle>
           <a:p>
             <a:r>
-              <a:rPr lang="en-US" smtClean="0"/>
+              <a:rPr lang="en-US"/>
               <a:t>Click to edit Master title style</a:t>
             </a:r>
             <a:endParaRPr lang="en-US" dirty="0"/>
@@ -2776,7 +2774,7 @@
           </a:lstStyle>
           <a:p>
             <a:r>
-              <a:rPr lang="en-US" smtClean="0"/>
+              <a:rPr lang="en-US"/>
               <a:t>Drag picture to placeholder or click icon to add</a:t>
             </a:r>
             <a:endParaRPr lang="en-US" dirty="0"/>
@@ -2842,7 +2840,7 @@
           <a:p>
             <a:pPr lvl="0"/>
             <a:r>
-              <a:rPr lang="en-US" smtClean="0"/>
+              <a:rPr lang="en-US"/>
               <a:t>Click to edit Master text styles</a:t>
             </a:r>
           </a:p>
@@ -2865,7 +2863,7 @@
           <a:p>
             <a:fld id="{413CA8BA-03F0-8A40-9C15-559693455F49}" type="datetimeFigureOut">
               <a:rPr lang="en-US" smtClean="0"/>
-              <a:t>9/11/19</a:t>
+              <a:t>7/2/2022</a:t>
             </a:fld>
             <a:endParaRPr lang="en-US"/>
           </a:p>
@@ -2969,10 +2967,9 @@
           <a:lstStyle/>
           <a:p>
             <a:r>
-              <a:rPr lang="en-US" dirty="0" smtClean="0"/>
+              <a:rPr lang="en-US" dirty="0"/>
               <a:t>Click to edit Master title style</a:t>
             </a:r>
-            <a:endParaRPr lang="en-US" dirty="0"/>
           </a:p>
         </p:txBody>
       </p:sp>
@@ -3003,35 +3000,35 @@
           <a:p>
             <a:pPr lvl="0"/>
             <a:r>
-              <a:rPr lang="en-US" smtClean="0"/>
+              <a:rPr lang="en-US"/>
               <a:t>Click to edit Master text styles</a:t>
             </a:r>
           </a:p>
           <a:p>
             <a:pPr lvl="1"/>
             <a:r>
-              <a:rPr lang="en-US" smtClean="0"/>
+              <a:rPr lang="en-US"/>
               <a:t>Second level</a:t>
             </a:r>
           </a:p>
           <a:p>
             <a:pPr lvl="2"/>
             <a:r>
-              <a:rPr lang="en-US" smtClean="0"/>
+              <a:rPr lang="en-US"/>
               <a:t>Third level</a:t>
             </a:r>
           </a:p>
           <a:p>
             <a:pPr lvl="3"/>
             <a:r>
-              <a:rPr lang="en-US" smtClean="0"/>
+              <a:rPr lang="en-US"/>
               <a:t>Fourth level</a:t>
             </a:r>
           </a:p>
           <a:p>
             <a:pPr lvl="4"/>
             <a:r>
-              <a:rPr lang="en-US" smtClean="0"/>
+              <a:rPr lang="en-US"/>
               <a:t>Fifth level</a:t>
             </a:r>
             <a:endParaRPr lang="en-US" dirty="0"/>
@@ -3073,7 +3070,7 @@
           <a:p>
             <a:fld id="{413CA8BA-03F0-8A40-9C15-559693455F49}" type="datetimeFigureOut">
               <a:rPr lang="en-US" smtClean="0"/>
-              <a:t>9/11/19</a:t>
+              <a:t>7/2/2022</a:t>
             </a:fld>
             <a:endParaRPr lang="en-US"/>
           </a:p>
@@ -3494,12 +3491,68 @@
           <a:lstStyle/>
           <a:p>
             <a:r>
-              <a:rPr lang="en-US" dirty="0" smtClean="0">
+              <a:rPr lang="en-US" dirty="0" err="1">
                 <a:solidFill>
                   <a:srgbClr val="FFC000"/>
                 </a:solidFill>
               </a:rPr>
-              <a:t>The Structure of a Django Application</a:t>
+              <a:t>Estructura</a:t>
+            </a:r>
+            <a:r>
+              <a:rPr lang="en-US" dirty="0">
+                <a:solidFill>
+                  <a:srgbClr val="FFC000"/>
+                </a:solidFill>
+              </a:rPr>
+              <a:t> de </a:t>
+            </a:r>
+            <a:r>
+              <a:rPr lang="en-US" dirty="0" err="1">
+                <a:solidFill>
+                  <a:srgbClr val="FFC000"/>
+                </a:solidFill>
+              </a:rPr>
+              <a:t>una</a:t>
+            </a:r>
+            <a:r>
+              <a:rPr lang="en-US" dirty="0">
+                <a:solidFill>
+                  <a:srgbClr val="FFC000"/>
+                </a:solidFill>
+              </a:rPr>
+              <a:t> </a:t>
+            </a:r>
+            <a:r>
+              <a:rPr lang="en-US" dirty="0" err="1">
+                <a:solidFill>
+                  <a:srgbClr val="FFC000"/>
+                </a:solidFill>
+              </a:rPr>
+              <a:t>aplicaci</a:t>
+            </a:r>
+            <a:r>
+              <a:rPr lang="es-US" dirty="0" err="1">
+                <a:solidFill>
+                  <a:srgbClr val="FFC000"/>
+                </a:solidFill>
+              </a:rPr>
+              <a:t>ón</a:t>
+            </a:r>
+            <a:r>
+              <a:rPr lang="es-US" dirty="0">
+                <a:solidFill>
+                  <a:srgbClr val="FFC000"/>
+                </a:solidFill>
+              </a:rPr>
+              <a:t> </a:t>
+            </a:r>
+            <a:r>
+              <a:rPr lang="es-US">
+                <a:solidFill>
+                  <a:srgbClr val="FFC000"/>
+                </a:solidFill>
+              </a:rPr>
+              <a:t>de Django</a:t>
             </a:r>
             <a:endParaRPr lang="en-US" dirty="0">
               <a:solidFill>
@@ -3525,16 +3578,15 @@
           <a:lstStyle/>
           <a:p>
             <a:r>
-              <a:rPr lang="en-US" dirty="0" smtClean="0"/>
+              <a:rPr lang="en-US" dirty="0"/>
               <a:t>Dr. Charles R. Severance</a:t>
             </a:r>
           </a:p>
           <a:p>
             <a:r>
-              <a:rPr lang="en-US" dirty="0" smtClean="0"/>
+              <a:rPr lang="en-US" dirty="0"/>
               <a:t>www.dj4e.com</a:t>
             </a:r>
-            <a:endParaRPr lang="en-US" dirty="0"/>
           </a:p>
         </p:txBody>
       </p:sp>
@@ -3572,20 +3624,12 @@
           <a:p>
             <a:pPr algn="ctr"/>
             <a:r>
-              <a:rPr lang="en-US" sz="2400" dirty="0" smtClean="0">
-                <a:solidFill>
-                  <a:srgbClr val="FFFF00"/>
-                </a:solidFill>
-              </a:rPr>
-              <a:t>https</a:t>
-            </a:r>
-            <a:r>
               <a:rPr lang="en-US" sz="2400" dirty="0">
                 <a:solidFill>
                   <a:srgbClr val="FFFF00"/>
                 </a:solidFill>
               </a:rPr>
-              <a:t>://</a:t>
+              <a:t>https://</a:t>
             </a:r>
             <a:r>
               <a:rPr lang="en-US" sz="2400" dirty="0" err="1">
@@ -3670,13 +3714,6 @@
   <p:clrMapOvr>
     <a:masterClrMapping/>
   </p:clrMapOvr>
-  <p:timing>
-    <p:tnLst>
-      <p:par>
-        <p:cTn id="1" dur="indefinite" restart="never" nodeType="tmRoot"/>
-      </p:par>
-    </p:tnLst>
-  </p:timing>
 </p:sld>
 </file>
 
@@ -4732,21 +4769,6 @@
   <p:clrMapOvr>
     <a:masterClrMapping/>
   </p:clrMapOvr>
-  <mc:AlternateContent xmlns:mc="http://schemas.openxmlformats.org/markup-compatibility/2006" xmlns:p14="http://schemas.microsoft.com/office/powerpoint/2010/main">
-    <mc:Choice Requires="p14">
-      <p:transition spd="slow" p14:dur="2000"/>
-    </mc:Choice>
-    <mc:Fallback xmlns="">
-      <p:transition spd="slow"/>
-    </mc:Fallback>
-  </mc:AlternateContent>
-  <p:timing>
-    <p:tnLst>
-      <p:par>
-        <p:cTn id="1" dur="indefinite" restart="never" nodeType="tmRoot"/>
-      </p:par>
-    </p:tnLst>
-  </p:timing>
 </p:sld>
 </file>
 
@@ -4873,13 +4895,6 @@
   <p:clrMapOvr>
     <a:masterClrMapping/>
   </p:clrMapOvr>
-  <p:timing>
-    <p:tnLst>
-      <p:par>
-        <p:cTn id="1" dur="indefinite" restart="never" nodeType="tmRoot"/>
-      </p:par>
-    </p:tnLst>
-  </p:timing>
 </p:sld>
 </file>
 
@@ -4974,13 +4989,6 @@
   <p:clrMapOvr>
     <a:masterClrMapping/>
   </p:clrMapOvr>
-  <p:timing>
-    <p:tnLst>
-      <p:par>
-        <p:cTn id="1" dur="indefinite" restart="never" nodeType="tmRoot"/>
-      </p:par>
-    </p:tnLst>
-  </p:timing>
 </p:sld>
 </file>
 
@@ -5043,10 +5051,9 @@
           <a:p>
             <a:pPr algn="r"/>
             <a:r>
-              <a:rPr lang="en-US" dirty="0" smtClean="0"/>
+              <a:rPr lang="en-US" dirty="0"/>
               <a:t>Linux</a:t>
             </a:r>
-            <a:endParaRPr lang="en-US" dirty="0"/>
           </a:p>
         </p:txBody>
       </p:sp>
@@ -5092,10 +5099,9 @@
           <a:p>
             <a:pPr algn="r"/>
             <a:r>
-              <a:rPr lang="en-US" dirty="0" smtClean="0"/>
+              <a:rPr lang="en-US" dirty="0"/>
               <a:t>Browser</a:t>
             </a:r>
-            <a:endParaRPr lang="en-US" dirty="0"/>
           </a:p>
         </p:txBody>
       </p:sp>
@@ -5143,19 +5149,19 @@
           <a:lstStyle/>
           <a:p>
             <a:r>
-              <a:rPr lang="en-US" dirty="0" smtClean="0"/>
+              <a:rPr lang="en-US" dirty="0"/>
               <a:t>Django </a:t>
             </a:r>
             <a:r>
-              <a:rPr lang="mr-IN" dirty="0" smtClean="0"/>
+              <a:rPr lang="mr-IN" dirty="0"/>
               <a:t>–</a:t>
             </a:r>
             <a:r>
-              <a:rPr lang="en-US" dirty="0" smtClean="0"/>
+              <a:rPr lang="en-US" dirty="0"/>
               <a:t> </a:t>
             </a:r>
             <a:r>
-              <a:rPr lang="en-US" dirty="0" err="1" smtClean="0"/>
+              <a:rPr lang="en-US" dirty="0" err="1"/>
               <a:t>mdntutorial.pythonanywhere.com</a:t>
             </a:r>
             <a:endParaRPr lang="en-US" dirty="0"/>
@@ -5187,7 +5193,7 @@
           <a:lstStyle/>
           <a:p>
             <a:r>
-              <a:rPr lang="en-US" dirty="0" err="1" smtClean="0"/>
+              <a:rPr lang="en-US" dirty="0" err="1"/>
               <a:t>WGSIConfig</a:t>
             </a:r>
             <a:endParaRPr lang="en-US" dirty="0"/>
@@ -5229,7 +5235,7 @@
           <a:p>
             <a:pPr algn="ctr"/>
             <a:r>
-              <a:rPr lang="en-US" smtClean="0"/>
+              <a:rPr lang="en-US"/>
               <a:t>settings.py</a:t>
             </a:r>
             <a:endParaRPr lang="en-US" dirty="0"/>
@@ -5319,38 +5325,37 @@
           <a:p>
             <a:pPr algn="ctr"/>
             <a:r>
-              <a:rPr lang="en-US" dirty="0" smtClean="0"/>
+              <a:rPr lang="en-US" dirty="0"/>
               <a:t>N</a:t>
             </a:r>
           </a:p>
           <a:p>
             <a:pPr algn="ctr"/>
             <a:r>
-              <a:rPr lang="en-US" dirty="0" smtClean="0"/>
+              <a:rPr lang="en-US" dirty="0"/>
               <a:t>G</a:t>
             </a:r>
           </a:p>
           <a:p>
             <a:pPr algn="ctr"/>
             <a:r>
-              <a:rPr lang="en-US" dirty="0" smtClean="0"/>
+              <a:rPr lang="en-US" dirty="0"/>
               <a:t>I</a:t>
             </a:r>
           </a:p>
           <a:p>
             <a:pPr algn="ctr"/>
             <a:r>
-              <a:rPr lang="en-US" dirty="0" smtClean="0"/>
+              <a:rPr lang="en-US" dirty="0"/>
               <a:t>N</a:t>
             </a:r>
             <a:br>
-              <a:rPr lang="en-US" dirty="0" smtClean="0"/>
+              <a:rPr lang="en-US" dirty="0"/>
             </a:br>
             <a:r>
-              <a:rPr lang="en-US" dirty="0" smtClean="0"/>
+              <a:rPr lang="en-US" dirty="0"/>
               <a:t>X</a:t>
             </a:r>
-            <a:endParaRPr lang="en-US" dirty="0"/>
           </a:p>
         </p:txBody>
       </p:sp>
@@ -5471,7 +5476,7 @@
           <a:p>
             <a:pPr algn="ctr"/>
             <a:r>
-              <a:rPr lang="en-US" dirty="0" err="1" smtClean="0"/>
+              <a:rPr lang="en-US" dirty="0" err="1"/>
               <a:t>urls.py</a:t>
             </a:r>
             <a:endParaRPr lang="en-US" dirty="0"/>
@@ -5513,10 +5518,10 @@
           <a:p>
             <a:pPr algn="ctr"/>
             <a:r>
-              <a:rPr lang="en-US" dirty="0" err="1" smtClean="0"/>
+              <a:rPr lang="en-US" dirty="0" err="1"/>
               <a:t>views.py</a:t>
             </a:r>
-            <a:endParaRPr lang="en-US" dirty="0" smtClean="0"/>
+            <a:endParaRPr lang="en-US" dirty="0"/>
           </a:p>
         </p:txBody>
       </p:sp>
@@ -5555,7 +5560,7 @@
           <a:p>
             <a:pPr algn="ctr"/>
             <a:r>
-              <a:rPr lang="en-US" dirty="0" err="1" smtClean="0"/>
+              <a:rPr lang="en-US" dirty="0" err="1"/>
               <a:t>model.py</a:t>
             </a:r>
             <a:endParaRPr lang="en-US" dirty="0"/>
@@ -5606,18 +5611,17 @@
           <a:lstStyle/>
           <a:p>
             <a:r>
-              <a:rPr lang="en-US" dirty="0" smtClean="0"/>
+              <a:rPr lang="en-US" dirty="0"/>
               <a:t>Django </a:t>
             </a:r>
             <a:r>
-              <a:rPr lang="mr-IN" dirty="0" smtClean="0"/>
+              <a:rPr lang="mr-IN" dirty="0"/>
               <a:t>–</a:t>
             </a:r>
             <a:r>
-              <a:rPr lang="en-US" dirty="0" smtClean="0"/>
+              <a:rPr lang="en-US" dirty="0"/>
               <a:t> dj4e.pythonanywhere.com</a:t>
             </a:r>
-            <a:endParaRPr lang="en-US" dirty="0"/>
           </a:p>
         </p:txBody>
       </p:sp>
@@ -5646,7 +5650,7 @@
           <a:lstStyle/>
           <a:p>
             <a:r>
-              <a:rPr lang="en-US" dirty="0" err="1" smtClean="0"/>
+              <a:rPr lang="en-US" dirty="0" err="1"/>
               <a:t>WGSIConfig</a:t>
             </a:r>
             <a:endParaRPr lang="en-US" dirty="0"/>
@@ -5688,7 +5692,7 @@
           <a:p>
             <a:pPr algn="ctr"/>
             <a:r>
-              <a:rPr lang="en-US" smtClean="0"/>
+              <a:rPr lang="en-US"/>
               <a:t>settings.py</a:t>
             </a:r>
             <a:endParaRPr lang="en-US" dirty="0"/>
@@ -5768,7 +5772,7 @@
           <a:p>
             <a:pPr algn="ctr"/>
             <a:r>
-              <a:rPr lang="en-US" dirty="0" err="1" smtClean="0"/>
+              <a:rPr lang="en-US" dirty="0" err="1"/>
               <a:t>urls.py</a:t>
             </a:r>
             <a:endParaRPr lang="en-US" dirty="0"/>
@@ -5810,10 +5814,10 @@
           <a:p>
             <a:pPr algn="ctr"/>
             <a:r>
-              <a:rPr lang="en-US" dirty="0" err="1" smtClean="0"/>
+              <a:rPr lang="en-US" dirty="0" err="1"/>
               <a:t>views.py</a:t>
             </a:r>
-            <a:endParaRPr lang="en-US" dirty="0" smtClean="0"/>
+            <a:endParaRPr lang="en-US" dirty="0"/>
           </a:p>
         </p:txBody>
       </p:sp>
@@ -5852,7 +5856,7 @@
           <a:p>
             <a:pPr algn="ctr"/>
             <a:r>
-              <a:rPr lang="en-US" dirty="0" err="1" smtClean="0"/>
+              <a:rPr lang="en-US" dirty="0" err="1"/>
               <a:t>model.py</a:t>
             </a:r>
             <a:endParaRPr lang="en-US" dirty="0"/>
@@ -5903,19 +5907,19 @@
           <a:lstStyle/>
           <a:p>
             <a:r>
-              <a:rPr lang="en-US" dirty="0" smtClean="0"/>
+              <a:rPr lang="en-US" dirty="0"/>
               <a:t>Flask </a:t>
             </a:r>
             <a:r>
-              <a:rPr lang="mr-IN" dirty="0" smtClean="0"/>
+              <a:rPr lang="mr-IN" dirty="0"/>
               <a:t>–</a:t>
             </a:r>
             <a:r>
-              <a:rPr lang="en-US" dirty="0" smtClean="0"/>
+              <a:rPr lang="en-US" dirty="0"/>
               <a:t> </a:t>
             </a:r>
             <a:r>
-              <a:rPr lang="en-US" dirty="0" err="1" smtClean="0"/>
+              <a:rPr lang="en-US" dirty="0" err="1"/>
               <a:t>flaskfun.pythonanywhere.com</a:t>
             </a:r>
             <a:endParaRPr lang="en-US" dirty="0"/>
@@ -5947,7 +5951,7 @@
           <a:lstStyle/>
           <a:p>
             <a:r>
-              <a:rPr lang="en-US" dirty="0" err="1" smtClean="0"/>
+              <a:rPr lang="en-US" dirty="0" err="1"/>
               <a:t>WGSIConfig</a:t>
             </a:r>
             <a:endParaRPr lang="en-US" dirty="0"/>
@@ -6137,7 +6141,7 @@
           <a:lstStyle/>
           <a:p>
             <a:r>
-              <a:rPr lang="mr-IN" sz="4000" dirty="0" smtClean="0"/>
+              <a:rPr lang="mr-IN" sz="4000" dirty="0"/>
               <a:t>……</a:t>
             </a:r>
             <a:endParaRPr lang="en-US" sz="4000" dirty="0"/>
@@ -6154,13 +6158,6 @@
   <p:clrMapOvr>
     <a:masterClrMapping/>
   </p:clrMapOvr>
-  <p:timing>
-    <p:tnLst>
-      <p:par>
-        <p:cTn id="1" dur="indefinite" restart="never" nodeType="tmRoot"/>
-      </p:par>
-    </p:tnLst>
-  </p:timing>
 </p:sld>
 </file>
 
@@ -6223,10 +6220,9 @@
           <a:p>
             <a:pPr algn="r"/>
             <a:r>
-              <a:rPr lang="en-US" dirty="0" smtClean="0"/>
+              <a:rPr lang="en-US" dirty="0"/>
               <a:t>Linux</a:t>
             </a:r>
-            <a:endParaRPr lang="en-US" dirty="0"/>
           </a:p>
         </p:txBody>
       </p:sp>
@@ -6272,10 +6268,9 @@
           <a:p>
             <a:pPr algn="r"/>
             <a:r>
-              <a:rPr lang="en-US" dirty="0" smtClean="0"/>
+              <a:rPr lang="en-US" dirty="0"/>
               <a:t>Browser</a:t>
             </a:r>
-            <a:endParaRPr lang="en-US" dirty="0"/>
           </a:p>
         </p:txBody>
       </p:sp>
@@ -6323,10 +6318,9 @@
           <a:lstStyle/>
           <a:p>
             <a:r>
-              <a:rPr lang="en-US" dirty="0" smtClean="0"/>
+              <a:rPr lang="en-US" dirty="0"/>
               <a:t>Django</a:t>
             </a:r>
-            <a:endParaRPr lang="en-US" dirty="0"/>
           </a:p>
         </p:txBody>
       </p:sp>
@@ -6355,7 +6349,7 @@
           <a:lstStyle/>
           <a:p>
             <a:r>
-              <a:rPr lang="en-US" dirty="0" err="1" smtClean="0"/>
+              <a:rPr lang="en-US" dirty="0" err="1"/>
               <a:t>WGSIConfig</a:t>
             </a:r>
             <a:endParaRPr lang="en-US" dirty="0"/>
@@ -6400,18 +6394,13 @@
           <a:p>
             <a:pPr algn="ctr"/>
             <a:r>
-              <a:rPr lang="en-US" smtClean="0">
+              <a:rPr lang="en-US">
                 <a:solidFill>
                   <a:schemeClr val="bg1"/>
                 </a:solidFill>
               </a:rPr>
               <a:t>Routing</a:t>
             </a:r>
-            <a:endParaRPr lang="en-US">
-              <a:solidFill>
-                <a:schemeClr val="bg1"/>
-              </a:solidFill>
-            </a:endParaRPr>
           </a:p>
         </p:txBody>
       </p:sp>
@@ -6453,18 +6442,13 @@
           <a:p>
             <a:pPr algn="ctr"/>
             <a:r>
-              <a:rPr lang="en-US" dirty="0" smtClean="0">
+              <a:rPr lang="en-US" dirty="0">
                 <a:solidFill>
                   <a:schemeClr val="bg1"/>
                 </a:solidFill>
               </a:rPr>
               <a:t>Views</a:t>
             </a:r>
-            <a:endParaRPr lang="en-US" dirty="0">
-              <a:solidFill>
-                <a:schemeClr val="bg1"/>
-              </a:solidFill>
-            </a:endParaRPr>
           </a:p>
         </p:txBody>
       </p:sp>
@@ -6508,10 +6492,9 @@
           <a:p>
             <a:pPr algn="ctr"/>
             <a:r>
-              <a:rPr lang="en-US" dirty="0" smtClean="0"/>
+              <a:rPr lang="en-US" dirty="0"/>
               <a:t>Database</a:t>
             </a:r>
-            <a:endParaRPr lang="en-US" dirty="0"/>
           </a:p>
         </p:txBody>
       </p:sp>
@@ -6550,10 +6533,10 @@
           <a:p>
             <a:pPr algn="ctr"/>
             <a:r>
-              <a:rPr lang="en-US" smtClean="0"/>
+              <a:rPr lang="en-US"/>
               <a:t>Templates</a:t>
             </a:r>
-            <a:endParaRPr lang="en-US" dirty="0" smtClean="0"/>
+            <a:endParaRPr lang="en-US" dirty="0"/>
           </a:p>
         </p:txBody>
       </p:sp>
@@ -6592,7 +6575,7 @@
           <a:p>
             <a:pPr algn="ctr"/>
             <a:r>
-              <a:rPr lang="en-US" smtClean="0"/>
+              <a:rPr lang="en-US"/>
               <a:t>settings.py</a:t>
             </a:r>
             <a:endParaRPr lang="en-US" dirty="0"/>
@@ -6906,7 +6889,7 @@
           <a:p>
             <a:pPr algn="ctr"/>
             <a:r>
-              <a:rPr lang="en-US" dirty="0" err="1" smtClean="0"/>
+              <a:rPr lang="en-US" dirty="0" err="1"/>
               <a:t>urls.py</a:t>
             </a:r>
             <a:endParaRPr lang="en-US" dirty="0"/>
@@ -6947,7 +6930,7 @@
           <a:lstStyle/>
           <a:p>
             <a:pPr algn="ctr"/>
-            <a:endParaRPr lang="en-US" dirty="0" smtClean="0"/>
+            <a:endParaRPr lang="en-US" dirty="0"/>
           </a:p>
         </p:txBody>
       </p:sp>
@@ -6986,10 +6969,10 @@
           <a:p>
             <a:pPr algn="ctr"/>
             <a:r>
-              <a:rPr lang="en-US" dirty="0" err="1" smtClean="0"/>
+              <a:rPr lang="en-US" dirty="0" err="1"/>
               <a:t>views.py</a:t>
             </a:r>
-            <a:endParaRPr lang="en-US" dirty="0" smtClean="0"/>
+            <a:endParaRPr lang="en-US" dirty="0"/>
           </a:p>
         </p:txBody>
       </p:sp>
@@ -7066,7 +7049,7 @@
           <a:p>
             <a:pPr algn="ctr"/>
             <a:r>
-              <a:rPr lang="en-US" dirty="0" err="1" smtClean="0"/>
+              <a:rPr lang="en-US" dirty="0" err="1"/>
               <a:t>forms.py</a:t>
             </a:r>
             <a:endParaRPr lang="en-US" dirty="0"/>
@@ -7111,18 +7094,13 @@
           <a:p>
             <a:pPr algn="ctr"/>
             <a:r>
-              <a:rPr lang="en-US" dirty="0" smtClean="0">
+              <a:rPr lang="en-US" dirty="0">
                 <a:solidFill>
                   <a:schemeClr val="bg1"/>
                 </a:solidFill>
               </a:rPr>
               <a:t>Models</a:t>
             </a:r>
-            <a:endParaRPr lang="en-US" dirty="0">
-              <a:solidFill>
-                <a:schemeClr val="bg1"/>
-              </a:solidFill>
-            </a:endParaRPr>
           </a:p>
         </p:txBody>
       </p:sp>
@@ -7366,7 +7344,7 @@
           <a:p>
             <a:pPr algn="ctr"/>
             <a:r>
-              <a:rPr lang="en-US" dirty="0" err="1" smtClean="0"/>
+              <a:rPr lang="en-US" dirty="0" err="1"/>
               <a:t>model.py</a:t>
             </a:r>
             <a:endParaRPr lang="en-US" dirty="0"/>
@@ -7418,24 +7396,23 @@
           <a:p>
             <a:pPr algn="ctr"/>
             <a:r>
-              <a:rPr lang="en-US" dirty="0" smtClean="0"/>
+              <a:rPr lang="en-US" dirty="0"/>
               <a:t>D</a:t>
             </a:r>
           </a:p>
           <a:p>
             <a:pPr algn="ctr"/>
             <a:r>
-              <a:rPr lang="en-US" dirty="0" smtClean="0"/>
+              <a:rPr lang="en-US" dirty="0"/>
               <a:t>O</a:t>
             </a:r>
           </a:p>
           <a:p>
             <a:pPr algn="ctr"/>
             <a:r>
-              <a:rPr lang="en-US" dirty="0" smtClean="0"/>
+              <a:rPr lang="en-US" dirty="0"/>
               <a:t>M</a:t>
             </a:r>
-            <a:endParaRPr lang="en-US" dirty="0"/>
           </a:p>
         </p:txBody>
       </p:sp>
@@ -7480,7 +7457,7 @@
           <a:p>
             <a:pPr algn="ctr"/>
             <a:r>
-              <a:rPr lang="en-US" dirty="0" smtClean="0">
+              <a:rPr lang="en-US" dirty="0">
                 <a:solidFill>
                   <a:schemeClr val="tx1"/>
                 </a:solidFill>
@@ -7491,18 +7468,13 @@
           <a:p>
             <a:pPr algn="ctr"/>
             <a:r>
-              <a:rPr lang="en-US" dirty="0" smtClean="0">
+              <a:rPr lang="en-US" dirty="0">
                 <a:solidFill>
                   <a:schemeClr val="tx1"/>
                 </a:solidFill>
               </a:rPr>
               <a:t>Response</a:t>
             </a:r>
-            <a:endParaRPr lang="en-US" dirty="0">
-              <a:solidFill>
-                <a:schemeClr val="tx1"/>
-              </a:solidFill>
-            </a:endParaRPr>
           </a:p>
         </p:txBody>
       </p:sp>
@@ -7585,13 +7557,6 @@
   <p:clrMapOvr>
     <a:masterClrMapping/>
   </p:clrMapOvr>
-  <p:timing>
-    <p:tnLst>
-      <p:par>
-        <p:cTn id="1" dur="indefinite" restart="never" nodeType="tmRoot"/>
-      </p:par>
-    </p:tnLst>
-  </p:timing>
 </p:sld>
 </file>
 
@@ -7628,10 +7593,9 @@
           <a:lstStyle/>
           <a:p>
             <a:r>
-              <a:rPr lang="en-US" dirty="0" smtClean="0"/>
+              <a:rPr lang="en-US" dirty="0"/>
               <a:t>Summary</a:t>
             </a:r>
-            <a:endParaRPr lang="en-US" dirty="0"/>
           </a:p>
         </p:txBody>
       </p:sp>
@@ -7651,24 +7615,23 @@
           <a:lstStyle/>
           <a:p>
             <a:r>
-              <a:rPr lang="en-US" dirty="0" smtClean="0"/>
+              <a:rPr lang="en-US" dirty="0"/>
               <a:t>It will take a while to fully understand the internal workings of a Django application </a:t>
             </a:r>
             <a:r>
-              <a:rPr lang="mr-IN" dirty="0" smtClean="0"/>
+              <a:rPr lang="mr-IN" dirty="0"/>
               <a:t>–</a:t>
             </a:r>
             <a:r>
-              <a:rPr lang="en-US" dirty="0" smtClean="0"/>
+              <a:rPr lang="en-US" dirty="0"/>
               <a:t> it gets easier after you have built and extended a few applications.</a:t>
             </a:r>
           </a:p>
           <a:p>
             <a:r>
-              <a:rPr lang="en-US" dirty="0" smtClean="0"/>
+              <a:rPr lang="en-US" dirty="0"/>
               <a:t>Having consistency in the "shape" of Django applications is very helpful when you get "dropped into" an existing project developed by someone else.</a:t>
             </a:r>
-            <a:endParaRPr lang="en-US" dirty="0"/>
           </a:p>
         </p:txBody>
       </p:sp>
@@ -7682,13 +7645,6 @@
   <p:clrMapOvr>
     <a:masterClrMapping/>
   </p:clrMapOvr>
-  <p:timing>
-    <p:tnLst>
-      <p:par>
-        <p:cTn id="1" dur="indefinite" restart="never" nodeType="tmRoot"/>
-      </p:par>
-    </p:tnLst>
-  </p:timing>
 </p:sld>
 </file>
 
@@ -7777,23 +7733,7 @@
                   <a:srgbClr val="FFFFFF"/>
                 </a:solidFill>
               </a:rPr>
-              <a:t>These slides are Copyright </a:t>
-            </a:r>
-            <a:r>
-              <a:rPr lang="en-US" sz="1350" dirty="0" smtClean="0">
-                <a:solidFill>
-                  <a:srgbClr val="FFFFFF"/>
-                </a:solidFill>
-              </a:rPr>
-              <a:t>2019-  </a:t>
-            </a:r>
-            <a:r>
-              <a:rPr lang="en-US" sz="1350" dirty="0">
-                <a:solidFill>
-                  <a:srgbClr val="FFFFFF"/>
-                </a:solidFill>
-              </a:rPr>
-              <a:t>Charles R. Severance (</a:t>
+              <a:t>These slides are Copyright 2019-  Charles R. Severance (</a:t>
             </a:r>
             <a:r>
               <a:rPr lang="en-US" sz="1350" u="sng" dirty="0">
@@ -7948,13 +7888,6 @@
   <p:clrMapOvr>
     <a:masterClrMapping/>
   </p:clrMapOvr>
-  <p:timing>
-    <p:tnLst>
-      <p:par>
-        <p:cTn id="1" dur="indefinite" restart="never" nodeType="tmRoot"/>
-      </p:par>
-    </p:tnLst>
-  </p:timing>
 </p:sld>
 </file>
 
@@ -7991,10 +7924,9 @@
           <a:lstStyle/>
           <a:p>
             <a:r>
-              <a:rPr lang="en-US" dirty="0" smtClean="0"/>
+              <a:rPr lang="en-US" dirty="0"/>
               <a:t>Django Terminology (i.e. folders)</a:t>
             </a:r>
-            <a:endParaRPr lang="en-US" dirty="0"/>
           </a:p>
         </p:txBody>
       </p:sp>
@@ -8014,21 +7946,21 @@
           <a:lstStyle/>
           <a:p>
             <a:r>
-              <a:rPr lang="en-US" dirty="0" smtClean="0"/>
+              <a:rPr lang="en-US" dirty="0"/>
               <a:t>Project is a collection of applications</a:t>
             </a:r>
           </a:p>
           <a:p>
             <a:pPr lvl="1"/>
             <a:r>
-              <a:rPr lang="en-US" dirty="0" smtClean="0"/>
+              <a:rPr lang="en-US" dirty="0"/>
               <a:t>Our project is "dj4e-samples"</a:t>
             </a:r>
           </a:p>
           <a:p>
             <a:pPr lvl="1"/>
             <a:r>
-              <a:rPr lang="en-US" dirty="0" smtClean="0"/>
+              <a:rPr lang="en-US" dirty="0"/>
               <a:t>Project-wide configuration is in dj4e-samples/dj4e-samples </a:t>
             </a:r>
           </a:p>
@@ -8038,21 +7970,21 @@
           </a:p>
           <a:p>
             <a:r>
-              <a:rPr lang="en-US" dirty="0" smtClean="0"/>
+              <a:rPr lang="en-US" dirty="0"/>
               <a:t>Our first application is "hello"</a:t>
             </a:r>
           </a:p>
           <a:p>
             <a:pPr lvl="1"/>
             <a:r>
-              <a:rPr lang="en-US" dirty="0" smtClean="0"/>
+              <a:rPr lang="en-US" dirty="0"/>
               <a:t>We will do most of our web development in the application folder </a:t>
             </a:r>
             <a:br>
-              <a:rPr lang="en-US" dirty="0" smtClean="0"/>
+              <a:rPr lang="en-US" dirty="0"/>
             </a:br>
             <a:r>
-              <a:rPr lang="en-US" dirty="0" smtClean="0"/>
+              <a:rPr lang="en-US" dirty="0"/>
               <a:t>dj4e-samples/hello</a:t>
             </a:r>
           </a:p>
@@ -8094,20 +8026,12 @@
           </a:p>
           <a:p>
             <a:r>
-              <a:rPr lang="en-US" sz="2400" dirty="0" smtClean="0">
-                <a:solidFill>
-                  <a:srgbClr val="FFFF00"/>
-                </a:solidFill>
-              </a:rPr>
-              <a:t>https</a:t>
-            </a:r>
-            <a:r>
               <a:rPr lang="en-US" sz="2400" dirty="0">
                 <a:solidFill>
                   <a:srgbClr val="FFFF00"/>
                 </a:solidFill>
               </a:rPr>
-              <a:t>://</a:t>
+              <a:t>https://</a:t>
             </a:r>
             <a:r>
               <a:rPr lang="en-US" sz="2400" dirty="0" err="1">
@@ -8138,13 +8062,6 @@
   <p:clrMapOvr>
     <a:masterClrMapping/>
   </p:clrMapOvr>
-  <p:timing>
-    <p:tnLst>
-      <p:par>
-        <p:cTn id="1" dur="indefinite" restart="never" nodeType="tmRoot"/>
-      </p:par>
-    </p:tnLst>
-  </p:timing>
 </p:sld>
 </file>
 
@@ -8186,7 +8103,7 @@
           <a:lstStyle/>
           <a:p>
             <a:r>
-              <a:rPr lang="en-US" smtClean="0"/>
+              <a:rPr lang="en-US"/>
               <a:t>Django files</a:t>
             </a:r>
             <a:endParaRPr lang="en-US" dirty="0"/>
@@ -8258,7 +8175,7 @@
           </a:p>
           <a:p>
             <a:r>
-              <a:rPr lang="en-US" sz="2000" b="1" dirty="0" smtClean="0">
+              <a:rPr lang="en-US" sz="2000" b="1" dirty="0">
                 <a:latin typeface="Courier" charset="0"/>
                 <a:ea typeface="Courier" charset="0"/>
                 <a:cs typeface="Courier" charset="0"/>
@@ -8458,7 +8375,7 @@
           </a:p>
           <a:p>
             <a:r>
-              <a:rPr lang="en-US" sz="2000" b="1" dirty="0" smtClean="0">
+              <a:rPr lang="en-US" sz="2000" b="1" dirty="0">
                 <a:latin typeface="Courier" charset="0"/>
                 <a:ea typeface="Courier" charset="0"/>
                 <a:cs typeface="Courier" charset="0"/>
@@ -8791,13 +8708,6 @@
   <p:clrMapOvr>
     <a:masterClrMapping/>
   </p:clrMapOvr>
-  <p:timing>
-    <p:tnLst>
-      <p:par>
-        <p:cTn id="1" dur="indefinite" restart="never" nodeType="tmRoot"/>
-      </p:par>
-    </p:tnLst>
-  </p:timing>
 </p:sld>
 </file>
 
@@ -8834,10 +8744,9 @@
           <a:lstStyle/>
           <a:p>
             <a:r>
-              <a:rPr lang="en-US" dirty="0" smtClean="0"/>
+              <a:rPr lang="en-US" dirty="0"/>
               <a:t>Flow of a Web Request</a:t>
             </a:r>
-            <a:endParaRPr lang="en-US" dirty="0"/>
           </a:p>
         </p:txBody>
       </p:sp>
@@ -8857,11 +8766,11 @@
           <a:lstStyle/>
           <a:p>
             <a:r>
-              <a:rPr lang="en-US" dirty="0" smtClean="0"/>
+              <a:rPr lang="en-US" dirty="0"/>
               <a:t>When the request arrives at a Django app the incoming request URL is compared to the list of paths in </a:t>
             </a:r>
             <a:r>
-              <a:rPr lang="en-US" dirty="0" err="1" smtClean="0">
+              <a:rPr lang="en-US" dirty="0" err="1">
                 <a:solidFill>
                   <a:srgbClr val="FFC000"/>
                 </a:solidFill>
@@ -8869,18 +8778,18 @@
               <a:t>urls.py</a:t>
             </a:r>
             <a:r>
-              <a:rPr lang="en-US" dirty="0" smtClean="0"/>
+              <a:rPr lang="en-US" dirty="0"/>
               <a:t> in the variable </a:t>
             </a:r>
             <a:r>
-              <a:rPr lang="en-US" dirty="0" err="1" smtClean="0">
+              <a:rPr lang="en-US" dirty="0" err="1">
                 <a:solidFill>
                   <a:srgbClr val="FFC000"/>
                 </a:solidFill>
               </a:rPr>
               <a:t>urlpatterns</a:t>
             </a:r>
-            <a:endParaRPr lang="en-US" dirty="0" smtClean="0">
+            <a:endParaRPr lang="en-US" dirty="0">
               <a:solidFill>
                 <a:srgbClr val="FFC000"/>
               </a:solidFill>
@@ -8888,19 +8797,19 @@
           </a:p>
           <a:p>
             <a:r>
-              <a:rPr lang="en-US" dirty="0" smtClean="0"/>
+              <a:rPr lang="en-US" dirty="0"/>
               <a:t>When there is a </a:t>
             </a:r>
             <a:r>
-              <a:rPr lang="en-US" dirty="0" err="1" smtClean="0"/>
+              <a:rPr lang="en-US" dirty="0" err="1"/>
               <a:t>url</a:t>
             </a:r>
             <a:r>
-              <a:rPr lang="en-US" dirty="0" smtClean="0"/>
+              <a:rPr lang="en-US" dirty="0"/>
               <a:t> match, it selects a "</a:t>
             </a:r>
             <a:r>
-              <a:rPr lang="en-US" dirty="0" smtClean="0">
+              <a:rPr lang="en-US" dirty="0">
                 <a:solidFill>
                   <a:srgbClr val="FFC000"/>
                 </a:solidFill>
@@ -8908,17 +8817,17 @@
               <a:t>View</a:t>
             </a:r>
             <a:r>
-              <a:rPr lang="en-US" dirty="0" smtClean="0"/>
+              <a:rPr lang="en-US" dirty="0"/>
               <a:t>" which is a bit of code that handles any database access and then produces and delivers the response to the browser</a:t>
             </a:r>
           </a:p>
           <a:p>
             <a:r>
-              <a:rPr lang="en-US" dirty="0" smtClean="0"/>
+              <a:rPr lang="en-US" dirty="0"/>
               <a:t>The </a:t>
             </a:r>
             <a:r>
-              <a:rPr lang="en-US" dirty="0" smtClean="0">
+              <a:rPr lang="en-US" dirty="0">
                 <a:solidFill>
                   <a:srgbClr val="FFC000"/>
                 </a:solidFill>
@@ -8926,11 +8835,11 @@
               <a:t>view</a:t>
             </a:r>
             <a:r>
-              <a:rPr lang="en-US" dirty="0" smtClean="0"/>
+              <a:rPr lang="en-US" dirty="0"/>
               <a:t> access the database indirectly through an abstraction called a "</a:t>
             </a:r>
             <a:r>
-              <a:rPr lang="en-US" dirty="0" smtClean="0">
+              <a:rPr lang="en-US" dirty="0">
                 <a:solidFill>
                   <a:srgbClr val="FFC000"/>
                 </a:solidFill>
@@ -8938,17 +8847,17 @@
               <a:t>model</a:t>
             </a:r>
             <a:r>
-              <a:rPr lang="en-US" dirty="0" smtClean="0"/>
+              <a:rPr lang="en-US" dirty="0"/>
               <a:t>"</a:t>
             </a:r>
           </a:p>
           <a:p>
             <a:r>
-              <a:rPr lang="en-US" dirty="0" smtClean="0"/>
+              <a:rPr lang="en-US" dirty="0"/>
               <a:t>This is a general web pattern called "</a:t>
             </a:r>
             <a:r>
-              <a:rPr lang="en-US" dirty="0" smtClean="0">
+              <a:rPr lang="en-US" dirty="0">
                 <a:solidFill>
                   <a:srgbClr val="FFC000"/>
                 </a:solidFill>
@@ -8956,22 +8865,17 @@
               <a:t>Model-View-Controller</a:t>
             </a:r>
             <a:r>
-              <a:rPr lang="en-US" dirty="0" smtClean="0"/>
+              <a:rPr lang="en-US" dirty="0"/>
               <a:t>" or </a:t>
             </a:r>
             <a:r>
-              <a:rPr lang="en-US" dirty="0" smtClean="0">
+              <a:rPr lang="en-US" dirty="0">
                 <a:solidFill>
                   <a:srgbClr val="FFC000"/>
                 </a:solidFill>
               </a:rPr>
               <a:t>MVC</a:t>
             </a:r>
-            <a:endParaRPr lang="en-US" dirty="0">
-              <a:solidFill>
-                <a:srgbClr val="FFC000"/>
-              </a:solidFill>
-            </a:endParaRPr>
           </a:p>
         </p:txBody>
       </p:sp>
@@ -8985,13 +8889,6 @@
   <p:clrMapOvr>
     <a:masterClrMapping/>
   </p:clrMapOvr>
-  <p:timing>
-    <p:tnLst>
-      <p:par>
-        <p:cTn id="1" dur="indefinite" restart="never" nodeType="tmRoot"/>
-      </p:par>
-    </p:tnLst>
-  </p:timing>
 </p:sld>
 </file>
 
@@ -9054,10 +8951,9 @@
           <a:p>
             <a:pPr algn="r"/>
             <a:r>
-              <a:rPr lang="en-US" dirty="0" smtClean="0"/>
+              <a:rPr lang="en-US" dirty="0"/>
               <a:t>Linux</a:t>
             </a:r>
-            <a:endParaRPr lang="en-US" dirty="0"/>
           </a:p>
         </p:txBody>
       </p:sp>
@@ -9103,10 +8999,9 @@
           <a:p>
             <a:pPr algn="r"/>
             <a:r>
-              <a:rPr lang="en-US" dirty="0" smtClean="0"/>
+              <a:rPr lang="en-US" dirty="0"/>
               <a:t>Browser</a:t>
             </a:r>
-            <a:endParaRPr lang="en-US" dirty="0"/>
           </a:p>
         </p:txBody>
       </p:sp>
@@ -9154,10 +9049,9 @@
           <a:lstStyle/>
           <a:p>
             <a:r>
-              <a:rPr lang="en-US" dirty="0" smtClean="0"/>
+              <a:rPr lang="en-US" dirty="0"/>
               <a:t>Django</a:t>
             </a:r>
-            <a:endParaRPr lang="en-US" dirty="0"/>
           </a:p>
         </p:txBody>
       </p:sp>
@@ -9186,7 +9080,7 @@
           <a:lstStyle/>
           <a:p>
             <a:r>
-              <a:rPr lang="en-US" dirty="0" err="1" smtClean="0"/>
+              <a:rPr lang="en-US" dirty="0" err="1"/>
               <a:t>WGSIConfig</a:t>
             </a:r>
             <a:endParaRPr lang="en-US" dirty="0"/>
@@ -9231,18 +9125,13 @@
           <a:p>
             <a:pPr algn="ctr"/>
             <a:r>
-              <a:rPr lang="en-US" smtClean="0">
+              <a:rPr lang="en-US">
                 <a:solidFill>
                   <a:schemeClr val="bg1"/>
                 </a:solidFill>
               </a:rPr>
               <a:t>Routing</a:t>
             </a:r>
-            <a:endParaRPr lang="en-US">
-              <a:solidFill>
-                <a:schemeClr val="bg1"/>
-              </a:solidFill>
-            </a:endParaRPr>
           </a:p>
         </p:txBody>
       </p:sp>
@@ -9284,18 +9173,13 @@
           <a:p>
             <a:pPr algn="ctr"/>
             <a:r>
-              <a:rPr lang="en-US" dirty="0" smtClean="0">
+              <a:rPr lang="en-US" dirty="0">
                 <a:solidFill>
                   <a:schemeClr val="bg1"/>
                 </a:solidFill>
               </a:rPr>
               <a:t>Views</a:t>
             </a:r>
-            <a:endParaRPr lang="en-US" dirty="0">
-              <a:solidFill>
-                <a:schemeClr val="bg1"/>
-              </a:solidFill>
-            </a:endParaRPr>
           </a:p>
         </p:txBody>
       </p:sp>
@@ -9339,10 +9223,9 @@
           <a:p>
             <a:pPr algn="ctr"/>
             <a:r>
-              <a:rPr lang="en-US" dirty="0" smtClean="0"/>
+              <a:rPr lang="en-US" dirty="0"/>
               <a:t>Database</a:t>
             </a:r>
-            <a:endParaRPr lang="en-US" dirty="0"/>
           </a:p>
         </p:txBody>
       </p:sp>
@@ -9381,10 +9264,10 @@
           <a:p>
             <a:pPr algn="ctr"/>
             <a:r>
-              <a:rPr lang="en-US" smtClean="0"/>
+              <a:rPr lang="en-US"/>
               <a:t>Templates</a:t>
             </a:r>
-            <a:endParaRPr lang="en-US" dirty="0" smtClean="0"/>
+            <a:endParaRPr lang="en-US" dirty="0"/>
           </a:p>
         </p:txBody>
       </p:sp>
@@ -9423,7 +9306,7 @@
           <a:p>
             <a:pPr algn="ctr"/>
             <a:r>
-              <a:rPr lang="en-US" smtClean="0"/>
+              <a:rPr lang="en-US"/>
               <a:t>settings.py</a:t>
             </a:r>
             <a:endParaRPr lang="en-US" dirty="0"/>
@@ -9737,7 +9620,7 @@
           <a:p>
             <a:pPr algn="ctr"/>
             <a:r>
-              <a:rPr lang="en-US" dirty="0" err="1" smtClean="0"/>
+              <a:rPr lang="en-US" dirty="0" err="1"/>
               <a:t>urls.py</a:t>
             </a:r>
             <a:endParaRPr lang="en-US" dirty="0"/>
@@ -9778,7 +9661,7 @@
           <a:lstStyle/>
           <a:p>
             <a:pPr algn="ctr"/>
-            <a:endParaRPr lang="en-US" dirty="0" smtClean="0"/>
+            <a:endParaRPr lang="en-US" dirty="0"/>
           </a:p>
         </p:txBody>
       </p:sp>
@@ -9817,10 +9700,10 @@
           <a:p>
             <a:pPr algn="ctr"/>
             <a:r>
-              <a:rPr lang="en-US" dirty="0" err="1" smtClean="0"/>
+              <a:rPr lang="en-US" dirty="0" err="1"/>
               <a:t>views.py</a:t>
             </a:r>
-            <a:endParaRPr lang="en-US" dirty="0" smtClean="0"/>
+            <a:endParaRPr lang="en-US" dirty="0"/>
           </a:p>
         </p:txBody>
       </p:sp>
@@ -9897,7 +9780,7 @@
           <a:p>
             <a:pPr algn="ctr"/>
             <a:r>
-              <a:rPr lang="en-US" dirty="0" err="1" smtClean="0"/>
+              <a:rPr lang="en-US" dirty="0" err="1"/>
               <a:t>forms.py</a:t>
             </a:r>
             <a:endParaRPr lang="en-US" dirty="0"/>
@@ -9942,18 +9825,13 @@
           <a:p>
             <a:pPr algn="ctr"/>
             <a:r>
-              <a:rPr lang="en-US" dirty="0" smtClean="0">
+              <a:rPr lang="en-US" dirty="0">
                 <a:solidFill>
                   <a:schemeClr val="bg1"/>
                 </a:solidFill>
               </a:rPr>
               <a:t>Models</a:t>
             </a:r>
-            <a:endParaRPr lang="en-US" dirty="0">
-              <a:solidFill>
-                <a:schemeClr val="bg1"/>
-              </a:solidFill>
-            </a:endParaRPr>
           </a:p>
         </p:txBody>
       </p:sp>
@@ -10197,7 +10075,7 @@
           <a:p>
             <a:pPr algn="ctr"/>
             <a:r>
-              <a:rPr lang="en-US" dirty="0" err="1" smtClean="0"/>
+              <a:rPr lang="en-US" dirty="0" err="1"/>
               <a:t>model.py</a:t>
             </a:r>
             <a:endParaRPr lang="en-US" dirty="0"/>
@@ -10249,24 +10127,23 @@
           <a:p>
             <a:pPr algn="ctr"/>
             <a:r>
-              <a:rPr lang="en-US" dirty="0" smtClean="0"/>
+              <a:rPr lang="en-US" dirty="0"/>
               <a:t>D</a:t>
             </a:r>
           </a:p>
           <a:p>
             <a:pPr algn="ctr"/>
             <a:r>
-              <a:rPr lang="en-US" dirty="0" smtClean="0"/>
+              <a:rPr lang="en-US" dirty="0"/>
               <a:t>O</a:t>
             </a:r>
           </a:p>
           <a:p>
             <a:pPr algn="ctr"/>
             <a:r>
-              <a:rPr lang="en-US" dirty="0" smtClean="0"/>
+              <a:rPr lang="en-US" dirty="0"/>
               <a:t>M</a:t>
             </a:r>
-            <a:endParaRPr lang="en-US" dirty="0"/>
           </a:p>
         </p:txBody>
       </p:sp>
@@ -10311,7 +10188,7 @@
           <a:p>
             <a:pPr algn="ctr"/>
             <a:r>
-              <a:rPr lang="en-US" dirty="0" smtClean="0">
+              <a:rPr lang="en-US" dirty="0">
                 <a:solidFill>
                   <a:schemeClr val="tx1"/>
                 </a:solidFill>
@@ -10322,18 +10199,13 @@
           <a:p>
             <a:pPr algn="ctr"/>
             <a:r>
-              <a:rPr lang="en-US" dirty="0" smtClean="0">
+              <a:rPr lang="en-US" dirty="0">
                 <a:solidFill>
                   <a:schemeClr val="tx1"/>
                 </a:solidFill>
               </a:rPr>
               <a:t>Response</a:t>
             </a:r>
-            <a:endParaRPr lang="en-US" dirty="0">
-              <a:solidFill>
-                <a:schemeClr val="tx1"/>
-              </a:solidFill>
-            </a:endParaRPr>
           </a:p>
         </p:txBody>
       </p:sp>
@@ -10384,7 +10256,7 @@
           <a:lstStyle/>
           <a:p>
             <a:r>
-              <a:rPr lang="en-US" dirty="0" err="1" smtClean="0">
+              <a:rPr lang="en-US" dirty="0" err="1">
                 <a:solidFill>
                   <a:schemeClr val="bg1"/>
                 </a:solidFill>
@@ -10753,10 +10625,9 @@
           <a:p>
             <a:pPr algn="ctr"/>
             <a:r>
-              <a:rPr lang="en-US" dirty="0" smtClean="0"/>
+              <a:rPr lang="en-US" dirty="0"/>
               <a:t>1: Click</a:t>
             </a:r>
-            <a:endParaRPr lang="en-US" dirty="0"/>
           </a:p>
         </p:txBody>
       </p:sp>
@@ -10802,10 +10673,9 @@
           <a:p>
             <a:pPr algn="ctr"/>
             <a:r>
-              <a:rPr lang="en-US" dirty="0" smtClean="0"/>
+              <a:rPr lang="en-US" dirty="0"/>
               <a:t>2: GET</a:t>
             </a:r>
-            <a:endParaRPr lang="en-US" dirty="0"/>
           </a:p>
         </p:txBody>
       </p:sp>
@@ -10819,13 +10689,6 @@
   <p:clrMapOvr>
     <a:masterClrMapping/>
   </p:clrMapOvr>
-  <p:timing>
-    <p:tnLst>
-      <p:par>
-        <p:cTn id="1" dur="indefinite" restart="never" nodeType="tmRoot"/>
-      </p:par>
-    </p:tnLst>
-  </p:timing>
 </p:sld>
 </file>
 
@@ -10888,10 +10751,9 @@
           <a:p>
             <a:pPr algn="r"/>
             <a:r>
-              <a:rPr lang="en-US" dirty="0" smtClean="0"/>
+              <a:rPr lang="en-US" dirty="0"/>
               <a:t>Linux</a:t>
             </a:r>
-            <a:endParaRPr lang="en-US" dirty="0"/>
           </a:p>
         </p:txBody>
       </p:sp>
@@ -10937,10 +10799,9 @@
           <a:p>
             <a:pPr algn="r"/>
             <a:r>
-              <a:rPr lang="en-US" dirty="0" smtClean="0"/>
+              <a:rPr lang="en-US" dirty="0"/>
               <a:t>Browser</a:t>
             </a:r>
-            <a:endParaRPr lang="en-US" dirty="0"/>
           </a:p>
         </p:txBody>
       </p:sp>
@@ -10988,10 +10849,9 @@
           <a:lstStyle/>
           <a:p>
             <a:r>
-              <a:rPr lang="en-US" dirty="0" smtClean="0"/>
+              <a:rPr lang="en-US" dirty="0"/>
               <a:t>Django</a:t>
             </a:r>
-            <a:endParaRPr lang="en-US" dirty="0"/>
           </a:p>
         </p:txBody>
       </p:sp>
@@ -11020,7 +10880,7 @@
           <a:lstStyle/>
           <a:p>
             <a:r>
-              <a:rPr lang="en-US" dirty="0" err="1" smtClean="0"/>
+              <a:rPr lang="en-US" dirty="0" err="1"/>
               <a:t>WGSIConfig</a:t>
             </a:r>
             <a:endParaRPr lang="en-US" dirty="0"/>
@@ -11065,18 +10925,13 @@
           <a:p>
             <a:pPr algn="ctr"/>
             <a:r>
-              <a:rPr lang="en-US" smtClean="0">
+              <a:rPr lang="en-US">
                 <a:solidFill>
                   <a:schemeClr val="bg1"/>
                 </a:solidFill>
               </a:rPr>
               <a:t>Routing</a:t>
             </a:r>
-            <a:endParaRPr lang="en-US">
-              <a:solidFill>
-                <a:schemeClr val="bg1"/>
-              </a:solidFill>
-            </a:endParaRPr>
           </a:p>
         </p:txBody>
       </p:sp>
@@ -11118,18 +10973,13 @@
           <a:p>
             <a:pPr algn="ctr"/>
             <a:r>
-              <a:rPr lang="en-US" dirty="0" smtClean="0">
+              <a:rPr lang="en-US" dirty="0">
                 <a:solidFill>
                   <a:schemeClr val="bg1"/>
                 </a:solidFill>
               </a:rPr>
               <a:t>Views</a:t>
             </a:r>
-            <a:endParaRPr lang="en-US" dirty="0">
-              <a:solidFill>
-                <a:schemeClr val="bg1"/>
-              </a:solidFill>
-            </a:endParaRPr>
           </a:p>
         </p:txBody>
       </p:sp>
@@ -11173,10 +11023,9 @@
           <a:p>
             <a:pPr algn="ctr"/>
             <a:r>
-              <a:rPr lang="en-US" dirty="0" smtClean="0"/>
+              <a:rPr lang="en-US" dirty="0"/>
               <a:t>Database</a:t>
             </a:r>
-            <a:endParaRPr lang="en-US" dirty="0"/>
           </a:p>
         </p:txBody>
       </p:sp>
@@ -11215,10 +11064,10 @@
           <a:p>
             <a:pPr algn="ctr"/>
             <a:r>
-              <a:rPr lang="en-US" smtClean="0"/>
+              <a:rPr lang="en-US"/>
               <a:t>Templates</a:t>
             </a:r>
-            <a:endParaRPr lang="en-US" dirty="0" smtClean="0"/>
+            <a:endParaRPr lang="en-US" dirty="0"/>
           </a:p>
         </p:txBody>
       </p:sp>
@@ -11257,7 +11106,7 @@
           <a:p>
             <a:pPr algn="ctr"/>
             <a:r>
-              <a:rPr lang="en-US" smtClean="0"/>
+              <a:rPr lang="en-US"/>
               <a:t>settings.py</a:t>
             </a:r>
             <a:endParaRPr lang="en-US" dirty="0"/>
@@ -11571,7 +11420,7 @@
           <a:p>
             <a:pPr algn="ctr"/>
             <a:r>
-              <a:rPr lang="en-US" dirty="0" err="1" smtClean="0"/>
+              <a:rPr lang="en-US" dirty="0" err="1"/>
               <a:t>urls.py</a:t>
             </a:r>
             <a:endParaRPr lang="en-US" dirty="0"/>
@@ -11612,7 +11461,7 @@
           <a:lstStyle/>
           <a:p>
             <a:pPr algn="ctr"/>
-            <a:endParaRPr lang="en-US" dirty="0" smtClean="0"/>
+            <a:endParaRPr lang="en-US" dirty="0"/>
           </a:p>
         </p:txBody>
       </p:sp>
@@ -11651,10 +11500,10 @@
           <a:p>
             <a:pPr algn="ctr"/>
             <a:r>
-              <a:rPr lang="en-US" dirty="0" err="1" smtClean="0"/>
+              <a:rPr lang="en-US" dirty="0" err="1"/>
               <a:t>views.py</a:t>
             </a:r>
-            <a:endParaRPr lang="en-US" dirty="0" smtClean="0"/>
+            <a:endParaRPr lang="en-US" dirty="0"/>
           </a:p>
         </p:txBody>
       </p:sp>
@@ -11731,7 +11580,7 @@
           <a:p>
             <a:pPr algn="ctr"/>
             <a:r>
-              <a:rPr lang="en-US" dirty="0" err="1" smtClean="0"/>
+              <a:rPr lang="en-US" dirty="0" err="1"/>
               <a:t>forms.py</a:t>
             </a:r>
             <a:endParaRPr lang="en-US" dirty="0"/>
@@ -11776,18 +11625,13 @@
           <a:p>
             <a:pPr algn="ctr"/>
             <a:r>
-              <a:rPr lang="en-US" dirty="0" smtClean="0">
+              <a:rPr lang="en-US" dirty="0">
                 <a:solidFill>
                   <a:schemeClr val="bg1"/>
                 </a:solidFill>
               </a:rPr>
               <a:t>Models</a:t>
             </a:r>
-            <a:endParaRPr lang="en-US" dirty="0">
-              <a:solidFill>
-                <a:schemeClr val="bg1"/>
-              </a:solidFill>
-            </a:endParaRPr>
           </a:p>
         </p:txBody>
       </p:sp>
@@ -12031,7 +11875,7 @@
           <a:p>
             <a:pPr algn="ctr"/>
             <a:r>
-              <a:rPr lang="en-US" dirty="0" err="1" smtClean="0"/>
+              <a:rPr lang="en-US" dirty="0" err="1"/>
               <a:t>model.py</a:t>
             </a:r>
             <a:endParaRPr lang="en-US" dirty="0"/>
@@ -12083,24 +11927,23 @@
           <a:p>
             <a:pPr algn="ctr"/>
             <a:r>
-              <a:rPr lang="en-US" dirty="0" smtClean="0"/>
+              <a:rPr lang="en-US" dirty="0"/>
               <a:t>D</a:t>
             </a:r>
           </a:p>
           <a:p>
             <a:pPr algn="ctr"/>
             <a:r>
-              <a:rPr lang="en-US" dirty="0" smtClean="0"/>
+              <a:rPr lang="en-US" dirty="0"/>
               <a:t>O</a:t>
             </a:r>
           </a:p>
           <a:p>
             <a:pPr algn="ctr"/>
             <a:r>
-              <a:rPr lang="en-US" dirty="0" smtClean="0"/>
+              <a:rPr lang="en-US" dirty="0"/>
               <a:t>M</a:t>
             </a:r>
-            <a:endParaRPr lang="en-US" dirty="0"/>
           </a:p>
         </p:txBody>
       </p:sp>
@@ -12145,7 +11988,7 @@
           <a:p>
             <a:pPr algn="ctr"/>
             <a:r>
-              <a:rPr lang="en-US" dirty="0" smtClean="0">
+              <a:rPr lang="en-US" dirty="0">
                 <a:solidFill>
                   <a:schemeClr val="tx1"/>
                 </a:solidFill>
@@ -12156,18 +11999,13 @@
           <a:p>
             <a:pPr algn="ctr"/>
             <a:r>
-              <a:rPr lang="en-US" dirty="0" smtClean="0">
+              <a:rPr lang="en-US" dirty="0">
                 <a:solidFill>
                   <a:schemeClr val="tx1"/>
                 </a:solidFill>
               </a:rPr>
               <a:t>Response</a:t>
             </a:r>
-            <a:endParaRPr lang="en-US" dirty="0">
-              <a:solidFill>
-                <a:schemeClr val="tx1"/>
-              </a:solidFill>
-            </a:endParaRPr>
           </a:p>
         </p:txBody>
       </p:sp>
@@ -12218,7 +12056,7 @@
           <a:lstStyle/>
           <a:p>
             <a:r>
-              <a:rPr lang="en-US" dirty="0" err="1" smtClean="0">
+              <a:rPr lang="en-US" dirty="0" err="1">
                 <a:solidFill>
                   <a:schemeClr val="bg1"/>
                 </a:solidFill>
@@ -12551,10 +12389,9 @@
           <a:p>
             <a:pPr algn="ctr"/>
             <a:r>
-              <a:rPr lang="en-US" dirty="0" smtClean="0"/>
+              <a:rPr lang="en-US" dirty="0"/>
               <a:t>3: Choose</a:t>
             </a:r>
-            <a:endParaRPr lang="en-US" dirty="0"/>
           </a:p>
         </p:txBody>
       </p:sp>
@@ -12636,18 +12473,17 @@
           <a:p>
             <a:pPr algn="ctr"/>
             <a:r>
-              <a:rPr lang="en-US" dirty="0" smtClean="0"/>
+              <a:rPr lang="en-US" dirty="0"/>
               <a:t>4</a:t>
             </a:r>
             <a:r>
-              <a:rPr lang="en-US" smtClean="0"/>
+              <a:rPr lang="en-US"/>
               <a:t>: Store Data </a:t>
             </a:r>
             <a:r>
-              <a:rPr lang="en-US" dirty="0" smtClean="0"/>
+              <a:rPr lang="en-US" dirty="0"/>
               <a:t>(optional)</a:t>
             </a:r>
-            <a:endParaRPr lang="en-US" dirty="0"/>
           </a:p>
         </p:txBody>
       </p:sp>
@@ -12697,13 +12533,6 @@
   <p:clrMapOvr>
     <a:masterClrMapping/>
   </p:clrMapOvr>
-  <p:timing>
-    <p:tnLst>
-      <p:par>
-        <p:cTn id="1" dur="indefinite" restart="never" nodeType="tmRoot"/>
-      </p:par>
-    </p:tnLst>
-  </p:timing>
 </p:sld>
 </file>
 
@@ -12766,10 +12595,9 @@
           <a:p>
             <a:pPr algn="r"/>
             <a:r>
-              <a:rPr lang="en-US" dirty="0" smtClean="0"/>
+              <a:rPr lang="en-US" dirty="0"/>
               <a:t>Linux</a:t>
             </a:r>
-            <a:endParaRPr lang="en-US" dirty="0"/>
           </a:p>
         </p:txBody>
       </p:sp>
@@ -12815,10 +12643,9 @@
           <a:p>
             <a:pPr algn="r"/>
             <a:r>
-              <a:rPr lang="en-US" dirty="0" smtClean="0"/>
+              <a:rPr lang="en-US" dirty="0"/>
               <a:t>Browser</a:t>
             </a:r>
-            <a:endParaRPr lang="en-US" dirty="0"/>
           </a:p>
         </p:txBody>
       </p:sp>
@@ -12866,10 +12693,9 @@
           <a:lstStyle/>
           <a:p>
             <a:r>
-              <a:rPr lang="en-US" dirty="0" smtClean="0"/>
+              <a:rPr lang="en-US" dirty="0"/>
               <a:t>Django</a:t>
             </a:r>
-            <a:endParaRPr lang="en-US" dirty="0"/>
           </a:p>
         </p:txBody>
       </p:sp>
@@ -12898,7 +12724,7 @@
           <a:lstStyle/>
           <a:p>
             <a:r>
-              <a:rPr lang="en-US" dirty="0" err="1" smtClean="0"/>
+              <a:rPr lang="en-US" dirty="0" err="1"/>
               <a:t>WGSIConfig</a:t>
             </a:r>
             <a:endParaRPr lang="en-US" dirty="0"/>
@@ -12943,18 +12769,13 @@
           <a:p>
             <a:pPr algn="ctr"/>
             <a:r>
-              <a:rPr lang="en-US" smtClean="0">
+              <a:rPr lang="en-US">
                 <a:solidFill>
                   <a:schemeClr val="bg1"/>
                 </a:solidFill>
               </a:rPr>
               <a:t>Routing</a:t>
             </a:r>
-            <a:endParaRPr lang="en-US">
-              <a:solidFill>
-                <a:schemeClr val="bg1"/>
-              </a:solidFill>
-            </a:endParaRPr>
           </a:p>
         </p:txBody>
       </p:sp>
@@ -12996,18 +12817,13 @@
           <a:p>
             <a:pPr algn="ctr"/>
             <a:r>
-              <a:rPr lang="en-US" dirty="0" smtClean="0">
+              <a:rPr lang="en-US" dirty="0">
                 <a:solidFill>
                   <a:schemeClr val="bg1"/>
                 </a:solidFill>
               </a:rPr>
               <a:t>Views</a:t>
             </a:r>
-            <a:endParaRPr lang="en-US" dirty="0">
-              <a:solidFill>
-                <a:schemeClr val="bg1"/>
-              </a:solidFill>
-            </a:endParaRPr>
           </a:p>
         </p:txBody>
       </p:sp>
@@ -13051,10 +12867,9 @@
           <a:p>
             <a:pPr algn="ctr"/>
             <a:r>
-              <a:rPr lang="en-US" dirty="0" smtClean="0"/>
+              <a:rPr lang="en-US" dirty="0"/>
               <a:t>Database</a:t>
             </a:r>
-            <a:endParaRPr lang="en-US" dirty="0"/>
           </a:p>
         </p:txBody>
       </p:sp>
@@ -13093,10 +12908,10 @@
           <a:p>
             <a:pPr algn="ctr"/>
             <a:r>
-              <a:rPr lang="en-US" smtClean="0"/>
+              <a:rPr lang="en-US"/>
               <a:t>Templates</a:t>
             </a:r>
-            <a:endParaRPr lang="en-US" dirty="0" smtClean="0"/>
+            <a:endParaRPr lang="en-US" dirty="0"/>
           </a:p>
         </p:txBody>
       </p:sp>
@@ -13135,7 +12950,7 @@
           <a:p>
             <a:pPr algn="ctr"/>
             <a:r>
-              <a:rPr lang="en-US" smtClean="0"/>
+              <a:rPr lang="en-US"/>
               <a:t>settings.py</a:t>
             </a:r>
             <a:endParaRPr lang="en-US" dirty="0"/>
@@ -13449,7 +13264,7 @@
           <a:p>
             <a:pPr algn="ctr"/>
             <a:r>
-              <a:rPr lang="en-US" dirty="0" err="1" smtClean="0"/>
+              <a:rPr lang="en-US" dirty="0" err="1"/>
               <a:t>urls.py</a:t>
             </a:r>
             <a:endParaRPr lang="en-US" dirty="0"/>
@@ -13490,7 +13305,7 @@
           <a:lstStyle/>
           <a:p>
             <a:pPr algn="ctr"/>
-            <a:endParaRPr lang="en-US" dirty="0" smtClean="0"/>
+            <a:endParaRPr lang="en-US" dirty="0"/>
           </a:p>
         </p:txBody>
       </p:sp>
@@ -13529,10 +13344,10 @@
           <a:p>
             <a:pPr algn="ctr"/>
             <a:r>
-              <a:rPr lang="en-US" dirty="0" err="1" smtClean="0"/>
+              <a:rPr lang="en-US" dirty="0" err="1"/>
               <a:t>views.py</a:t>
             </a:r>
-            <a:endParaRPr lang="en-US" dirty="0" smtClean="0"/>
+            <a:endParaRPr lang="en-US" dirty="0"/>
           </a:p>
         </p:txBody>
       </p:sp>
@@ -13609,7 +13424,7 @@
           <a:p>
             <a:pPr algn="ctr"/>
             <a:r>
-              <a:rPr lang="en-US" dirty="0" err="1" smtClean="0"/>
+              <a:rPr lang="en-US" dirty="0" err="1"/>
               <a:t>forms.py</a:t>
             </a:r>
             <a:endParaRPr lang="en-US" dirty="0"/>
@@ -13654,18 +13469,13 @@
           <a:p>
             <a:pPr algn="ctr"/>
             <a:r>
-              <a:rPr lang="en-US" dirty="0" smtClean="0">
+              <a:rPr lang="en-US" dirty="0">
                 <a:solidFill>
                   <a:schemeClr val="bg1"/>
                 </a:solidFill>
               </a:rPr>
               <a:t>Models</a:t>
             </a:r>
-            <a:endParaRPr lang="en-US" dirty="0">
-              <a:solidFill>
-                <a:schemeClr val="bg1"/>
-              </a:solidFill>
-            </a:endParaRPr>
           </a:p>
         </p:txBody>
       </p:sp>
@@ -13909,7 +13719,7 @@
           <a:p>
             <a:pPr algn="ctr"/>
             <a:r>
-              <a:rPr lang="en-US" dirty="0" err="1" smtClean="0"/>
+              <a:rPr lang="en-US" dirty="0" err="1"/>
               <a:t>model.py</a:t>
             </a:r>
             <a:endParaRPr lang="en-US" dirty="0"/>
@@ -13961,24 +13771,23 @@
           <a:p>
             <a:pPr algn="ctr"/>
             <a:r>
-              <a:rPr lang="en-US" dirty="0" smtClean="0"/>
+              <a:rPr lang="en-US" dirty="0"/>
               <a:t>D</a:t>
             </a:r>
           </a:p>
           <a:p>
             <a:pPr algn="ctr"/>
             <a:r>
-              <a:rPr lang="en-US" dirty="0" smtClean="0"/>
+              <a:rPr lang="en-US" dirty="0"/>
               <a:t>O</a:t>
             </a:r>
           </a:p>
           <a:p>
             <a:pPr algn="ctr"/>
             <a:r>
-              <a:rPr lang="en-US" dirty="0" smtClean="0"/>
+              <a:rPr lang="en-US" dirty="0"/>
               <a:t>M</a:t>
             </a:r>
-            <a:endParaRPr lang="en-US" dirty="0"/>
           </a:p>
         </p:txBody>
       </p:sp>
@@ -14023,7 +13832,7 @@
           <a:p>
             <a:pPr algn="ctr"/>
             <a:r>
-              <a:rPr lang="en-US" dirty="0" smtClean="0">
+              <a:rPr lang="en-US" dirty="0">
                 <a:solidFill>
                   <a:schemeClr val="tx1"/>
                 </a:solidFill>
@@ -14034,18 +13843,13 @@
           <a:p>
             <a:pPr algn="ctr"/>
             <a:r>
-              <a:rPr lang="en-US" dirty="0" smtClean="0">
+              <a:rPr lang="en-US" dirty="0">
                 <a:solidFill>
                   <a:schemeClr val="tx1"/>
                 </a:solidFill>
               </a:rPr>
               <a:t>Response</a:t>
             </a:r>
-            <a:endParaRPr lang="en-US" dirty="0">
-              <a:solidFill>
-                <a:schemeClr val="tx1"/>
-              </a:solidFill>
-            </a:endParaRPr>
           </a:p>
         </p:txBody>
       </p:sp>
@@ -14096,7 +13900,7 @@
           <a:lstStyle/>
           <a:p>
             <a:r>
-              <a:rPr lang="en-US" dirty="0" err="1" smtClean="0">
+              <a:rPr lang="en-US" dirty="0" err="1">
                 <a:solidFill>
                   <a:schemeClr val="bg1"/>
                 </a:solidFill>
@@ -14411,10 +14215,9 @@
           <a:p>
             <a:pPr algn="ctr"/>
             <a:r>
-              <a:rPr lang="en-US" dirty="0" smtClean="0"/>
+              <a:rPr lang="en-US" dirty="0"/>
               <a:t>5: Choose</a:t>
             </a:r>
-            <a:endParaRPr lang="en-US" dirty="0"/>
           </a:p>
         </p:txBody>
       </p:sp>
@@ -14460,11 +14263,11 @@
           <a:p>
             <a:pPr algn="ctr"/>
             <a:r>
-              <a:rPr lang="en-US" dirty="0" smtClean="0"/>
+              <a:rPr lang="en-US" dirty="0"/>
               <a:t>6</a:t>
             </a:r>
             <a:r>
-              <a:rPr lang="en-US" smtClean="0"/>
+              <a:rPr lang="en-US"/>
               <a:t>: Read Data</a:t>
             </a:r>
             <a:endParaRPr lang="en-US" dirty="0"/>
@@ -14549,10 +14352,9 @@
           <a:p>
             <a:pPr algn="ctr"/>
             <a:r>
-              <a:rPr lang="en-US" dirty="0" smtClean="0"/>
+              <a:rPr lang="en-US" dirty="0"/>
               <a:t>7: Render</a:t>
             </a:r>
-            <a:endParaRPr lang="en-US" dirty="0"/>
           </a:p>
         </p:txBody>
       </p:sp>
@@ -14638,13 +14440,6 @@
   <p:clrMapOvr>
     <a:masterClrMapping/>
   </p:clrMapOvr>
-  <p:timing>
-    <p:tnLst>
-      <p:par>
-        <p:cTn id="1" dur="indefinite" restart="never" nodeType="tmRoot"/>
-      </p:par>
-    </p:tnLst>
-  </p:timing>
 </p:sld>
 </file>
 
@@ -14707,10 +14502,9 @@
           <a:p>
             <a:pPr algn="r"/>
             <a:r>
-              <a:rPr lang="en-US" dirty="0" smtClean="0"/>
+              <a:rPr lang="en-US" dirty="0"/>
               <a:t>Linux</a:t>
             </a:r>
-            <a:endParaRPr lang="en-US" dirty="0"/>
           </a:p>
         </p:txBody>
       </p:sp>
@@ -14756,10 +14550,9 @@
           <a:p>
             <a:pPr algn="r"/>
             <a:r>
-              <a:rPr lang="en-US" dirty="0" smtClean="0"/>
+              <a:rPr lang="en-US" dirty="0"/>
               <a:t>Browser</a:t>
             </a:r>
-            <a:endParaRPr lang="en-US" dirty="0"/>
           </a:p>
         </p:txBody>
       </p:sp>
@@ -14807,10 +14600,9 @@
           <a:lstStyle/>
           <a:p>
             <a:r>
-              <a:rPr lang="en-US" dirty="0" smtClean="0"/>
+              <a:rPr lang="en-US" dirty="0"/>
               <a:t>Django</a:t>
             </a:r>
-            <a:endParaRPr lang="en-US" dirty="0"/>
           </a:p>
         </p:txBody>
       </p:sp>
@@ -14839,7 +14631,7 @@
           <a:lstStyle/>
           <a:p>
             <a:r>
-              <a:rPr lang="en-US" dirty="0" err="1" smtClean="0"/>
+              <a:rPr lang="en-US" dirty="0" err="1"/>
               <a:t>WGSIConfig</a:t>
             </a:r>
             <a:endParaRPr lang="en-US" dirty="0"/>
@@ -14884,18 +14676,13 @@
           <a:p>
             <a:pPr algn="ctr"/>
             <a:r>
-              <a:rPr lang="en-US" smtClean="0">
+              <a:rPr lang="en-US">
                 <a:solidFill>
                   <a:schemeClr val="bg1"/>
                 </a:solidFill>
               </a:rPr>
               <a:t>Routing</a:t>
             </a:r>
-            <a:endParaRPr lang="en-US">
-              <a:solidFill>
-                <a:schemeClr val="bg1"/>
-              </a:solidFill>
-            </a:endParaRPr>
           </a:p>
         </p:txBody>
       </p:sp>
@@ -14937,18 +14724,13 @@
           <a:p>
             <a:pPr algn="ctr"/>
             <a:r>
-              <a:rPr lang="en-US" dirty="0" smtClean="0">
+              <a:rPr lang="en-US" dirty="0">
                 <a:solidFill>
                   <a:schemeClr val="bg1"/>
                 </a:solidFill>
               </a:rPr>
               <a:t>Views</a:t>
             </a:r>
-            <a:endParaRPr lang="en-US" dirty="0">
-              <a:solidFill>
-                <a:schemeClr val="bg1"/>
-              </a:solidFill>
-            </a:endParaRPr>
           </a:p>
         </p:txBody>
       </p:sp>
@@ -14992,10 +14774,9 @@
           <a:p>
             <a:pPr algn="ctr"/>
             <a:r>
-              <a:rPr lang="en-US" dirty="0" smtClean="0"/>
+              <a:rPr lang="en-US" dirty="0"/>
               <a:t>Database</a:t>
             </a:r>
-            <a:endParaRPr lang="en-US" dirty="0"/>
           </a:p>
         </p:txBody>
       </p:sp>
@@ -15034,10 +14815,10 @@
           <a:p>
             <a:pPr algn="ctr"/>
             <a:r>
-              <a:rPr lang="en-US" smtClean="0"/>
+              <a:rPr lang="en-US"/>
               <a:t>Templates</a:t>
             </a:r>
-            <a:endParaRPr lang="en-US" dirty="0" smtClean="0"/>
+            <a:endParaRPr lang="en-US" dirty="0"/>
           </a:p>
         </p:txBody>
       </p:sp>
@@ -15076,7 +14857,7 @@
           <a:p>
             <a:pPr algn="ctr"/>
             <a:r>
-              <a:rPr lang="en-US" smtClean="0"/>
+              <a:rPr lang="en-US"/>
               <a:t>settings.py</a:t>
             </a:r>
             <a:endParaRPr lang="en-US" dirty="0"/>
@@ -15390,7 +15171,7 @@
           <a:p>
             <a:pPr algn="ctr"/>
             <a:r>
-              <a:rPr lang="en-US" dirty="0" err="1" smtClean="0"/>
+              <a:rPr lang="en-US" dirty="0" err="1"/>
               <a:t>urls.py</a:t>
             </a:r>
             <a:endParaRPr lang="en-US" dirty="0"/>
@@ -15431,7 +15212,7 @@
           <a:lstStyle/>
           <a:p>
             <a:pPr algn="ctr"/>
-            <a:endParaRPr lang="en-US" dirty="0" smtClean="0"/>
+            <a:endParaRPr lang="en-US" dirty="0"/>
           </a:p>
         </p:txBody>
       </p:sp>
@@ -15470,10 +15251,10 @@
           <a:p>
             <a:pPr algn="ctr"/>
             <a:r>
-              <a:rPr lang="en-US" dirty="0" err="1" smtClean="0"/>
+              <a:rPr lang="en-US" dirty="0" err="1"/>
               <a:t>views.py</a:t>
             </a:r>
-            <a:endParaRPr lang="en-US" dirty="0" smtClean="0"/>
+            <a:endParaRPr lang="en-US" dirty="0"/>
           </a:p>
         </p:txBody>
       </p:sp>
@@ -15550,7 +15331,7 @@
           <a:p>
             <a:pPr algn="ctr"/>
             <a:r>
-              <a:rPr lang="en-US" dirty="0" err="1" smtClean="0"/>
+              <a:rPr lang="en-US" dirty="0" err="1"/>
               <a:t>forms.py</a:t>
             </a:r>
             <a:endParaRPr lang="en-US" dirty="0"/>
@@ -15595,18 +15376,13 @@
           <a:p>
             <a:pPr algn="ctr"/>
             <a:r>
-              <a:rPr lang="en-US" dirty="0" smtClean="0">
+              <a:rPr lang="en-US" dirty="0">
                 <a:solidFill>
                   <a:schemeClr val="bg1"/>
                 </a:solidFill>
               </a:rPr>
               <a:t>Models</a:t>
             </a:r>
-            <a:endParaRPr lang="en-US" dirty="0">
-              <a:solidFill>
-                <a:schemeClr val="bg1"/>
-              </a:solidFill>
-            </a:endParaRPr>
           </a:p>
         </p:txBody>
       </p:sp>
@@ -15850,7 +15626,7 @@
           <a:p>
             <a:pPr algn="ctr"/>
             <a:r>
-              <a:rPr lang="en-US" dirty="0" err="1" smtClean="0"/>
+              <a:rPr lang="en-US" dirty="0" err="1"/>
               <a:t>model.py</a:t>
             </a:r>
             <a:endParaRPr lang="en-US" dirty="0"/>
@@ -15902,24 +15678,23 @@
           <a:p>
             <a:pPr algn="ctr"/>
             <a:r>
-              <a:rPr lang="en-US" dirty="0" smtClean="0"/>
+              <a:rPr lang="en-US" dirty="0"/>
               <a:t>D</a:t>
             </a:r>
           </a:p>
           <a:p>
             <a:pPr algn="ctr"/>
             <a:r>
-              <a:rPr lang="en-US" dirty="0" smtClean="0"/>
+              <a:rPr lang="en-US" dirty="0"/>
               <a:t>O</a:t>
             </a:r>
           </a:p>
           <a:p>
             <a:pPr algn="ctr"/>
             <a:r>
-              <a:rPr lang="en-US" dirty="0" smtClean="0"/>
+              <a:rPr lang="en-US" dirty="0"/>
               <a:t>M</a:t>
             </a:r>
-            <a:endParaRPr lang="en-US" dirty="0"/>
           </a:p>
         </p:txBody>
       </p:sp>
@@ -15964,7 +15739,7 @@
           <a:p>
             <a:pPr algn="ctr"/>
             <a:r>
-              <a:rPr lang="en-US" dirty="0" smtClean="0">
+              <a:rPr lang="en-US" dirty="0">
                 <a:solidFill>
                   <a:schemeClr val="tx1"/>
                 </a:solidFill>
@@ -15975,18 +15750,13 @@
           <a:p>
             <a:pPr algn="ctr"/>
             <a:r>
-              <a:rPr lang="en-US" dirty="0" smtClean="0">
+              <a:rPr lang="en-US" dirty="0">
                 <a:solidFill>
                   <a:schemeClr val="tx1"/>
                 </a:solidFill>
               </a:rPr>
               <a:t>Response</a:t>
             </a:r>
-            <a:endParaRPr lang="en-US" dirty="0">
-              <a:solidFill>
-                <a:schemeClr val="tx1"/>
-              </a:solidFill>
-            </a:endParaRPr>
           </a:p>
         </p:txBody>
       </p:sp>
@@ -16037,7 +15807,7 @@
           <a:lstStyle/>
           <a:p>
             <a:r>
-              <a:rPr lang="en-US" dirty="0" err="1" smtClean="0">
+              <a:rPr lang="en-US" dirty="0" err="1">
                 <a:solidFill>
                   <a:schemeClr val="bg1"/>
                 </a:solidFill>
@@ -16406,10 +16176,9 @@
           <a:p>
             <a:pPr algn="ctr"/>
             <a:r>
-              <a:rPr lang="en-US" dirty="0" smtClean="0"/>
+              <a:rPr lang="en-US" dirty="0"/>
               <a:t>1: Click</a:t>
             </a:r>
-            <a:endParaRPr lang="en-US" dirty="0"/>
           </a:p>
         </p:txBody>
       </p:sp>
@@ -16455,14 +16224,13 @@
           <a:p>
             <a:pPr algn="ctr"/>
             <a:r>
-              <a:rPr lang="en-US" smtClean="0"/>
+              <a:rPr lang="en-US"/>
               <a:t>2: </a:t>
             </a:r>
             <a:r>
-              <a:rPr lang="en-US" dirty="0" smtClean="0"/>
+              <a:rPr lang="en-US" dirty="0"/>
               <a:t>GET</a:t>
             </a:r>
-            <a:endParaRPr lang="en-US" dirty="0"/>
           </a:p>
         </p:txBody>
       </p:sp>
@@ -16508,10 +16276,9 @@
           <a:p>
             <a:pPr algn="ctr"/>
             <a:r>
-              <a:rPr lang="en-US" dirty="0" smtClean="0"/>
+              <a:rPr lang="en-US" dirty="0"/>
               <a:t>3: Choose</a:t>
             </a:r>
-            <a:endParaRPr lang="en-US" dirty="0"/>
           </a:p>
         </p:txBody>
       </p:sp>
@@ -16629,18 +16396,17 @@
           <a:p>
             <a:pPr algn="ctr"/>
             <a:r>
-              <a:rPr lang="en-US" dirty="0" smtClean="0"/>
+              <a:rPr lang="en-US" dirty="0"/>
               <a:t>4</a:t>
             </a:r>
             <a:r>
-              <a:rPr lang="en-US" smtClean="0"/>
+              <a:rPr lang="en-US"/>
               <a:t>: Store Data </a:t>
             </a:r>
             <a:r>
-              <a:rPr lang="en-US" dirty="0" smtClean="0"/>
+              <a:rPr lang="en-US" dirty="0"/>
               <a:t>(optional)</a:t>
             </a:r>
-            <a:endParaRPr lang="en-US" dirty="0"/>
           </a:p>
         </p:txBody>
       </p:sp>
@@ -16686,10 +16452,9 @@
           <a:p>
             <a:pPr algn="ctr"/>
             <a:r>
-              <a:rPr lang="en-US" dirty="0" smtClean="0"/>
+              <a:rPr lang="en-US" dirty="0"/>
               <a:t>5: Choose</a:t>
             </a:r>
-            <a:endParaRPr lang="en-US" dirty="0"/>
           </a:p>
         </p:txBody>
       </p:sp>
@@ -16771,11 +16536,11 @@
           <a:p>
             <a:pPr algn="ctr"/>
             <a:r>
-              <a:rPr lang="en-US" dirty="0" smtClean="0"/>
+              <a:rPr lang="en-US" dirty="0"/>
               <a:t>6</a:t>
             </a:r>
             <a:r>
-              <a:rPr lang="en-US" smtClean="0"/>
+              <a:rPr lang="en-US"/>
               <a:t>: Read Data</a:t>
             </a:r>
             <a:endParaRPr lang="en-US" dirty="0"/>
@@ -16860,10 +16625,9 @@
           <a:p>
             <a:pPr algn="ctr"/>
             <a:r>
-              <a:rPr lang="en-US" dirty="0" smtClean="0"/>
+              <a:rPr lang="en-US" dirty="0"/>
               <a:t>7: Render</a:t>
             </a:r>
-            <a:endParaRPr lang="en-US" dirty="0"/>
           </a:p>
         </p:txBody>
       </p:sp>
@@ -16913,13 +16677,6 @@
   <p:clrMapOvr>
     <a:masterClrMapping/>
   </p:clrMapOvr>
-  <p:timing>
-    <p:tnLst>
-      <p:par>
-        <p:cTn id="1" dur="indefinite" restart="never" nodeType="tmRoot"/>
-      </p:par>
-    </p:tnLst>
-  </p:timing>
 </p:sld>
 </file>
 
@@ -16956,10 +16713,9 @@
           <a:lstStyle/>
           <a:p>
             <a:r>
-              <a:rPr lang="en-US" dirty="0" smtClean="0"/>
+              <a:rPr lang="en-US" dirty="0"/>
               <a:t>Virtual Hosting</a:t>
             </a:r>
-            <a:endParaRPr lang="en-US" dirty="0"/>
           </a:p>
         </p:txBody>
       </p:sp>
@@ -16992,31 +16748,31 @@
             </a:r>
           </a:p>
           <a:p>
-            <a:endParaRPr lang="en-US" dirty="0" smtClean="0"/>
-          </a:p>
-          <a:p>
-            <a:r>
-              <a:rPr lang="en-US" dirty="0" smtClean="0"/>
+            <a:endParaRPr lang="en-US" dirty="0"/>
+          </a:p>
+          <a:p>
+            <a:r>
+              <a:rPr lang="en-US" dirty="0"/>
               <a:t>HTTP </a:t>
             </a:r>
             <a:r>
-              <a:rPr lang="mr-IN" dirty="0" smtClean="0"/>
+              <a:rPr lang="mr-IN" dirty="0"/>
               <a:t>–</a:t>
             </a:r>
             <a:r>
-              <a:rPr lang="en-US" dirty="0" smtClean="0"/>
+              <a:rPr lang="en-US" dirty="0"/>
               <a:t> Hypertext Transport Protocol</a:t>
             </a:r>
           </a:p>
           <a:p>
             <a:r>
-              <a:rPr lang="en-US" dirty="0" smtClean="0"/>
+              <a:rPr lang="en-US" dirty="0"/>
               <a:t>Connects to a domain</a:t>
             </a:r>
           </a:p>
           <a:p>
             <a:r>
-              <a:rPr lang="en-US" dirty="0" smtClean="0"/>
+              <a:rPr lang="en-US" dirty="0"/>
               <a:t>Includes the domain in the GET request</a:t>
             </a:r>
           </a:p>
@@ -17044,18 +16800,17 @@
           <a:lstStyle/>
           <a:p>
             <a:r>
-              <a:rPr lang="en-US" sz="2400" dirty="0" smtClean="0"/>
+              <a:rPr lang="en-US" sz="2400" dirty="0"/>
               <a:t>https://</a:t>
             </a:r>
             <a:r>
-              <a:rPr lang="en-US" sz="2400" dirty="0" err="1" smtClean="0"/>
+              <a:rPr lang="en-US" sz="2400" dirty="0" err="1"/>
               <a:t>blog.pythonanywhere.com</a:t>
             </a:r>
             <a:r>
-              <a:rPr lang="en-US" sz="2400" dirty="0" smtClean="0"/>
+              <a:rPr lang="en-US" sz="2400" dirty="0"/>
               <a:t>/36/</a:t>
             </a:r>
-            <a:endParaRPr lang="en-US" sz="2400" dirty="0"/>
           </a:p>
         </p:txBody>
       </p:sp>
@@ -17069,13 +16824,6 @@
   <p:clrMapOvr>
     <a:masterClrMapping/>
   </p:clrMapOvr>
-  <p:timing>
-    <p:tnLst>
-      <p:par>
-        <p:cTn id="1" dur="indefinite" restart="never" nodeType="tmRoot"/>
-      </p:par>
-    </p:tnLst>
-  </p:timing>
 </p:sld>
 </file>
 

</xml_diff>

<commit_message>
Spanish translation of lectures_DJ_01 (#1)
</commit_message>
<xml_diff>
--- a/lectures/DJ-01-Hosting.pptx
+++ b/lectures/DJ-01-Hosting.pptx
@@ -3598,8 +3598,8 @@
         </p:nvSpPr>
         <p:spPr>
           <a:xfrm>
-            <a:off x="3725194" y="5349875"/>
-            <a:ext cx="4987006" cy="830997"/>
+            <a:off x="3678355" y="5349875"/>
+            <a:ext cx="5080686" cy="830997"/>
           </a:xfrm>
           <a:prstGeom prst="rect">
             <a:avLst/>
@@ -3629,23 +3629,7 @@
                   <a:srgbClr val="FFFF00"/>
                 </a:solidFill>
               </a:rPr>
-              <a:t>https://</a:t>
-            </a:r>
-            <a:r>
-              <a:rPr lang="en-US" sz="2400" dirty="0" err="1">
-                <a:solidFill>
-                  <a:srgbClr val="FFFF00"/>
-                </a:solidFill>
-              </a:rPr>
-              <a:t>github.com</a:t>
-            </a:r>
-            <a:r>
-              <a:rPr lang="en-US" sz="2400" dirty="0">
-                <a:solidFill>
-                  <a:srgbClr val="FFFF00"/>
-                </a:solidFill>
-              </a:rPr>
-              <a:t>/csev/dj4e-samples</a:t>
+              <a:t>https://github.com/csev/dj4e-samples</a:t>
             </a:r>
           </a:p>
         </p:txBody>
@@ -4325,8 +4309,8 @@
         </p:nvSpPr>
         <p:spPr bwMode="auto">
           <a:xfrm>
-            <a:off x="9462859" y="3303945"/>
-            <a:ext cx="1997535" cy="692497"/>
+            <a:off x="9198590" y="3303945"/>
+            <a:ext cx="2526076" cy="692497"/>
           </a:xfrm>
           <a:prstGeom prst="rect">
             <a:avLst/>
@@ -4466,14 +4450,20 @@
               <a:defRPr/>
             </a:pPr>
             <a:r>
-              <a:rPr lang="en-US" altLang="en-US" sz="4500">
+              <a:rPr lang="en-US" altLang="en-US" sz="4500" dirty="0" err="1">
                 <a:solidFill>
                   <a:srgbClr val="0000FF"/>
                 </a:solidFill>
                 <a:ea typeface="ＭＳ Ｐゴシック" charset="-128"/>
               </a:rPr>
-              <a:t>Browser</a:t>
-            </a:r>
+              <a:t>Navegador</a:t>
+            </a:r>
+            <a:endParaRPr lang="en-US" altLang="en-US" sz="4500" dirty="0">
+              <a:solidFill>
+                <a:srgbClr val="0000FF"/>
+              </a:solidFill>
+              <a:ea typeface="ＭＳ Ｐゴシック" charset="-128"/>
+            </a:endParaRPr>
           </a:p>
         </p:txBody>
       </p:sp>
@@ -4487,8 +4477,8 @@
         </p:nvSpPr>
         <p:spPr bwMode="auto">
           <a:xfrm>
-            <a:off x="9244915" y="787884"/>
-            <a:ext cx="2433423" cy="600164"/>
+            <a:off x="9085099" y="787884"/>
+            <a:ext cx="2753061" cy="600164"/>
           </a:xfrm>
           <a:prstGeom prst="rect">
             <a:avLst/>
@@ -4628,13 +4618,22 @@
               <a:defRPr/>
             </a:pPr>
             <a:r>
-              <a:rPr lang="en-US" altLang="en-US" sz="3900">
+              <a:rPr lang="en-US" altLang="en-US" sz="3900" dirty="0" err="1">
                 <a:solidFill>
                   <a:srgbClr val="0000FF"/>
                 </a:solidFill>
                 <a:ea typeface="ＭＳ Ｐゴシック" charset="-128"/>
               </a:rPr>
-              <a:t>Web Server</a:t>
+              <a:t>Servidor</a:t>
+            </a:r>
+            <a:r>
+              <a:rPr lang="en-US" altLang="en-US" sz="3900" dirty="0">
+                <a:solidFill>
+                  <a:srgbClr val="0000FF"/>
+                </a:solidFill>
+                <a:ea typeface="ＭＳ Ｐゴシック" charset="-128"/>
+              </a:rPr>
+              <a:t> Web</a:t>
             </a:r>
           </a:p>
         </p:txBody>
@@ -5099,9 +5098,10 @@
           <a:p>
             <a:pPr algn="r"/>
             <a:r>
-              <a:rPr lang="en-US" dirty="0"/>
-              <a:t>Browser</a:t>
-            </a:r>
+              <a:rPr lang="en-US" dirty="0" err="1"/>
+              <a:t>Navegador</a:t>
+            </a:r>
+            <a:endParaRPr lang="en-US" dirty="0"/>
           </a:p>
         </p:txBody>
       </p:sp>
@@ -6268,9 +6268,10 @@
           <a:p>
             <a:pPr algn="r"/>
             <a:r>
-              <a:rPr lang="en-US" dirty="0"/>
-              <a:t>Browser</a:t>
-            </a:r>
+              <a:rPr lang="en-US" dirty="0" err="1"/>
+              <a:t>Navegador</a:t>
+            </a:r>
+            <a:endParaRPr lang="en-US" dirty="0"/>
           </a:p>
         </p:txBody>
       </p:sp>
@@ -6364,8 +6365,8 @@
         </p:nvSpPr>
         <p:spPr>
           <a:xfrm>
-            <a:off x="6612366" y="1112985"/>
-            <a:ext cx="1086678" cy="1033669"/>
+            <a:off x="6368634" y="1112985"/>
+            <a:ext cx="1574142" cy="1033669"/>
           </a:xfrm>
           <a:prstGeom prst="roundRect">
             <a:avLst/>
@@ -6394,13 +6395,18 @@
           <a:p>
             <a:pPr algn="ctr"/>
             <a:r>
-              <a:rPr lang="en-US">
+              <a:rPr lang="en-US" dirty="0" err="1">
                 <a:solidFill>
                   <a:schemeClr val="bg1"/>
                 </a:solidFill>
               </a:rPr>
-              <a:t>Routing</a:t>
-            </a:r>
+              <a:t>Enrutamiento</a:t>
+            </a:r>
+            <a:endParaRPr lang="en-US" dirty="0">
+              <a:solidFill>
+                <a:schemeClr val="bg1"/>
+              </a:solidFill>
+            </a:endParaRPr>
           </a:p>
         </p:txBody>
       </p:sp>
@@ -6412,8 +6418,8 @@
         </p:nvSpPr>
         <p:spPr>
           <a:xfrm>
-            <a:off x="6612366" y="2901585"/>
-            <a:ext cx="1086678" cy="1033669"/>
+            <a:off x="6368634" y="2901585"/>
+            <a:ext cx="1574142" cy="1033669"/>
           </a:xfrm>
           <a:prstGeom prst="roundRect">
             <a:avLst/>
@@ -6447,7 +6453,7 @@
                   <a:schemeClr val="bg1"/>
                 </a:solidFill>
               </a:rPr>
-              <a:t>Views</a:t>
+              <a:t>Vistas</a:t>
             </a:r>
           </a:p>
         </p:txBody>
@@ -6493,8 +6499,13 @@
             <a:pPr algn="ctr"/>
             <a:r>
               <a:rPr lang="en-US" dirty="0"/>
-              <a:t>Database</a:t>
-            </a:r>
+              <a:t>Base de </a:t>
+            </a:r>
+            <a:r>
+              <a:rPr lang="en-US" dirty="0" err="1"/>
+              <a:t>Datos</a:t>
+            </a:r>
+            <a:endParaRPr lang="en-US" dirty="0"/>
           </a:p>
         </p:txBody>
       </p:sp>
@@ -6533,8 +6544,8 @@
           <a:p>
             <a:pPr algn="ctr"/>
             <a:r>
-              <a:rPr lang="en-US"/>
-              <a:t>Templates</a:t>
+              <a:rPr lang="en-US" dirty="0" err="1"/>
+              <a:t>Plantillas</a:t>
             </a:r>
             <a:endParaRPr lang="en-US" dirty="0"/>
           </a:p>
@@ -6624,6 +6635,7 @@
         <p:nvCxnSpPr>
           <p:cNvPr id="28" name="Straight Arrow Connector 27"/>
           <p:cNvCxnSpPr>
+            <a:cxnSpLocks/>
             <a:stCxn id="15" idx="1"/>
             <a:endCxn id="9" idx="3"/>
           </p:cNvCxnSpPr>
@@ -6631,8 +6643,8 @@
         </p:nvCxnSpPr>
         <p:spPr>
           <a:xfrm flipH="1">
-            <a:off x="7699044" y="1622089"/>
-            <a:ext cx="1318368" cy="7731"/>
+            <a:off x="7942776" y="1622089"/>
+            <a:ext cx="1074636" cy="7731"/>
           </a:xfrm>
           <a:prstGeom prst="straightConnector1">
             <a:avLst/>
@@ -6663,6 +6675,7 @@
         <p:nvCxnSpPr>
           <p:cNvPr id="31" name="Straight Arrow Connector 30"/>
           <p:cNvCxnSpPr>
+            <a:cxnSpLocks/>
             <a:stCxn id="24" idx="1"/>
             <a:endCxn id="10" idx="3"/>
           </p:cNvCxnSpPr>
@@ -6670,8 +6683,8 @@
         </p:nvCxnSpPr>
         <p:spPr>
           <a:xfrm flipH="1">
-            <a:off x="7699044" y="2556508"/>
-            <a:ext cx="1279717" cy="861912"/>
+            <a:off x="7942776" y="2556508"/>
+            <a:ext cx="1035985" cy="861912"/>
           </a:xfrm>
           <a:prstGeom prst="straightConnector1">
             <a:avLst/>
@@ -6702,6 +6715,7 @@
         <p:nvCxnSpPr>
           <p:cNvPr id="34" name="Straight Arrow Connector 33"/>
           <p:cNvCxnSpPr>
+            <a:cxnSpLocks/>
             <a:stCxn id="13" idx="1"/>
             <a:endCxn id="10" idx="3"/>
           </p:cNvCxnSpPr>
@@ -6709,8 +6723,8 @@
         </p:nvCxnSpPr>
         <p:spPr>
           <a:xfrm flipH="1" flipV="1">
-            <a:off x="7699044" y="3418420"/>
-            <a:ext cx="660617" cy="911701"/>
+            <a:off x="7942776" y="3418420"/>
+            <a:ext cx="416885" cy="911701"/>
           </a:xfrm>
           <a:prstGeom prst="straightConnector1">
             <a:avLst/>
@@ -6741,6 +6755,7 @@
         <p:nvCxnSpPr>
           <p:cNvPr id="37" name="Straight Arrow Connector 36"/>
           <p:cNvCxnSpPr>
+            <a:cxnSpLocks/>
             <a:stCxn id="14" idx="1"/>
             <a:endCxn id="10" idx="3"/>
           </p:cNvCxnSpPr>
@@ -6748,8 +6763,8 @@
         </p:nvCxnSpPr>
         <p:spPr>
           <a:xfrm flipH="1" flipV="1">
-            <a:off x="7699044" y="3418420"/>
-            <a:ext cx="1279717" cy="23900"/>
+            <a:off x="7942776" y="3418420"/>
+            <a:ext cx="1035985" cy="23900"/>
           </a:xfrm>
           <a:prstGeom prst="straightConnector1">
             <a:avLst/>
@@ -6780,6 +6795,7 @@
         <p:nvCxnSpPr>
           <p:cNvPr id="40" name="Straight Arrow Connector 39"/>
           <p:cNvCxnSpPr>
+            <a:cxnSpLocks/>
             <a:stCxn id="11" idx="2"/>
             <a:endCxn id="49" idx="3"/>
           </p:cNvCxnSpPr>
@@ -6787,8 +6803,8 @@
         </p:nvCxnSpPr>
         <p:spPr>
           <a:xfrm flipH="1" flipV="1">
-            <a:off x="7699044" y="5515568"/>
-            <a:ext cx="1094848" cy="372789"/>
+            <a:off x="7942776" y="5515568"/>
+            <a:ext cx="851116" cy="372789"/>
           </a:xfrm>
           <a:prstGeom prst="straightConnector1">
             <a:avLst/>
@@ -7064,8 +7080,8 @@
         </p:nvSpPr>
         <p:spPr>
           <a:xfrm>
-            <a:off x="6612366" y="4998733"/>
-            <a:ext cx="1086678" cy="1033669"/>
+            <a:off x="6368634" y="4998733"/>
+            <a:ext cx="1574142" cy="1033669"/>
           </a:xfrm>
           <a:prstGeom prst="roundRect">
             <a:avLst/>
@@ -7094,13 +7110,18 @@
           <a:p>
             <a:pPr algn="ctr"/>
             <a:r>
-              <a:rPr lang="en-US" dirty="0">
+              <a:rPr lang="en-US" dirty="0" err="1">
                 <a:solidFill>
                   <a:schemeClr val="bg1"/>
                 </a:solidFill>
               </a:rPr>
-              <a:t>Models</a:t>
-            </a:r>
+              <a:t>Modelos</a:t>
+            </a:r>
+            <a:endParaRPr lang="en-US" dirty="0">
+              <a:solidFill>
+                <a:schemeClr val="bg1"/>
+              </a:solidFill>
+            </a:endParaRPr>
           </a:p>
         </p:txBody>
       </p:sp>
@@ -7108,14 +7129,15 @@
         <p:nvCxnSpPr>
           <p:cNvPr id="56" name="Straight Arrow Connector 55"/>
           <p:cNvCxnSpPr>
+            <a:cxnSpLocks/>
             <a:endCxn id="49" idx="3"/>
           </p:cNvCxnSpPr>
           <p:nvPr/>
         </p:nvCxnSpPr>
         <p:spPr>
           <a:xfrm flipH="1">
-            <a:off x="7699044" y="5060467"/>
-            <a:ext cx="1369168" cy="455101"/>
+            <a:off x="7942776" y="5060467"/>
+            <a:ext cx="1125436" cy="455101"/>
           </a:xfrm>
           <a:prstGeom prst="straightConnector1">
             <a:avLst/>
@@ -7146,6 +7168,7 @@
         <p:nvCxnSpPr>
           <p:cNvPr id="60" name="Straight Arrow Connector 59"/>
           <p:cNvCxnSpPr>
+            <a:cxnSpLocks/>
             <a:endCxn id="10" idx="0"/>
           </p:cNvCxnSpPr>
           <p:nvPr/>
@@ -7184,6 +7207,7 @@
         <p:nvCxnSpPr>
           <p:cNvPr id="64" name="Straight Arrow Connector 63"/>
           <p:cNvCxnSpPr>
+            <a:cxnSpLocks/>
             <a:endCxn id="10" idx="2"/>
           </p:cNvCxnSpPr>
           <p:nvPr/>
@@ -7457,24 +7481,34 @@
           <a:p>
             <a:pPr algn="ctr"/>
             <a:r>
+              <a:rPr lang="en-US" dirty="0" err="1">
+                <a:solidFill>
+                  <a:schemeClr val="tx1"/>
+                </a:solidFill>
+              </a:rPr>
+              <a:t>Analizar</a:t>
+            </a:r>
+            <a:r>
               <a:rPr lang="en-US" dirty="0">
                 <a:solidFill>
                   <a:schemeClr val="tx1"/>
                 </a:solidFill>
               </a:rPr>
-              <a:t>Parse</a:t>
-            </a:r>
-          </a:p>
-          <a:p>
-            <a:pPr algn="ctr"/>
-            <a:r>
-              <a:rPr lang="en-US" dirty="0">
+              <a:t> </a:t>
+            </a:r>
+            <a:r>
+              <a:rPr lang="en-US" dirty="0" err="1">
                 <a:solidFill>
                   <a:schemeClr val="tx1"/>
                 </a:solidFill>
               </a:rPr>
-              <a:t>Response</a:t>
-            </a:r>
+              <a:t>respuesta</a:t>
+            </a:r>
+            <a:endParaRPr lang="en-US" dirty="0">
+              <a:solidFill>
+                <a:schemeClr val="tx1"/>
+              </a:solidFill>
+            </a:endParaRPr>
           </a:p>
         </p:txBody>
       </p:sp>
@@ -7593,9 +7627,10 @@
           <a:lstStyle/>
           <a:p>
             <a:r>
-              <a:rPr lang="en-US" dirty="0"/>
-              <a:t>Summary</a:t>
-            </a:r>
+              <a:rPr lang="en-US" dirty="0" err="1"/>
+              <a:t>Resumen</a:t>
+            </a:r>
+            <a:endParaRPr lang="en-US" dirty="0"/>
           </a:p>
         </p:txBody>
       </p:sp>
@@ -7615,8 +7650,84 @@
           <a:lstStyle/>
           <a:p>
             <a:r>
-              <a:rPr lang="en-US" dirty="0"/>
-              <a:t>It will take a while to fully understand the internal workings of a Django application </a:t>
+              <a:rPr lang="en-US" dirty="0" err="1"/>
+              <a:t>Va</a:t>
+            </a:r>
+            <a:r>
+              <a:rPr lang="en-US" dirty="0"/>
+              <a:t> a </a:t>
+            </a:r>
+            <a:r>
+              <a:rPr lang="en-US" dirty="0" err="1"/>
+              <a:t>tomar</a:t>
+            </a:r>
+            <a:r>
+              <a:rPr lang="en-US" dirty="0"/>
+              <a:t> un </a:t>
+            </a:r>
+            <a:r>
+              <a:rPr lang="en-US" dirty="0" err="1"/>
+              <a:t>tiempo</a:t>
+            </a:r>
+            <a:r>
+              <a:rPr lang="en-US" dirty="0"/>
+              <a:t> </a:t>
+            </a:r>
+            <a:r>
+              <a:rPr lang="en-US" dirty="0" err="1"/>
+              <a:t>entender</a:t>
+            </a:r>
+            <a:r>
+              <a:rPr lang="en-US" dirty="0"/>
+              <a:t> </a:t>
+            </a:r>
+            <a:r>
+              <a:rPr lang="en-US" dirty="0" err="1"/>
+              <a:t>completamente</a:t>
+            </a:r>
+            <a:r>
+              <a:rPr lang="en-US" dirty="0"/>
+              <a:t> </a:t>
+            </a:r>
+            <a:r>
+              <a:rPr lang="en-US" dirty="0" err="1"/>
+              <a:t>los</a:t>
+            </a:r>
+            <a:r>
+              <a:rPr lang="en-US" dirty="0"/>
+              <a:t> </a:t>
+            </a:r>
+            <a:r>
+              <a:rPr lang="en-US" dirty="0" err="1"/>
+              <a:t>mecanismos</a:t>
+            </a:r>
+            <a:r>
+              <a:rPr lang="en-US" dirty="0"/>
+              <a:t> </a:t>
+            </a:r>
+            <a:r>
+              <a:rPr lang="en-US" dirty="0" err="1"/>
+              <a:t>internos</a:t>
+            </a:r>
+            <a:r>
+              <a:rPr lang="en-US" dirty="0"/>
+              <a:t> de </a:t>
+            </a:r>
+            <a:r>
+              <a:rPr lang="en-US" dirty="0" err="1"/>
+              <a:t>una</a:t>
+            </a:r>
+            <a:r>
+              <a:rPr lang="en-US" dirty="0"/>
+              <a:t> </a:t>
+            </a:r>
+            <a:r>
+              <a:rPr lang="en-US" dirty="0" err="1"/>
+              <a:t>aplicación</a:t>
+            </a:r>
+            <a:r>
+              <a:rPr lang="en-US" dirty="0"/>
+              <a:t> de Django </a:t>
             </a:r>
             <a:r>
               <a:rPr lang="mr-IN" dirty="0"/>
@@ -7624,13 +7735,189 @@
             </a:r>
             <a:r>
               <a:rPr lang="en-US" dirty="0"/>
-              <a:t> it gets easier after you have built and extended a few applications.</a:t>
-            </a:r>
-          </a:p>
-          <a:p>
-            <a:r>
-              <a:rPr lang="en-US" dirty="0"/>
-              <a:t>Having consistency in the "shape" of Django applications is very helpful when you get "dropped into" an existing project developed by someone else.</a:t>
+              <a:t> se </a:t>
+            </a:r>
+            <a:r>
+              <a:rPr lang="en-US" dirty="0" err="1"/>
+              <a:t>vuelve</a:t>
+            </a:r>
+            <a:r>
+              <a:rPr lang="en-US" dirty="0"/>
+              <a:t> </a:t>
+            </a:r>
+            <a:r>
+              <a:rPr lang="en-US" dirty="0" err="1"/>
+              <a:t>más</a:t>
+            </a:r>
+            <a:r>
+              <a:rPr lang="en-US" dirty="0"/>
+              <a:t> </a:t>
+            </a:r>
+            <a:r>
+              <a:rPr lang="en-US" dirty="0" err="1"/>
+              <a:t>fácil</a:t>
+            </a:r>
+            <a:r>
+              <a:rPr lang="en-US" dirty="0"/>
+              <a:t> </a:t>
+            </a:r>
+            <a:r>
+              <a:rPr lang="en-US" dirty="0" err="1"/>
+              <a:t>después</a:t>
+            </a:r>
+            <a:r>
+              <a:rPr lang="en-US" dirty="0"/>
+              <a:t> de </a:t>
+            </a:r>
+            <a:r>
+              <a:rPr lang="en-US" dirty="0" err="1"/>
+              <a:t>construir</a:t>
+            </a:r>
+            <a:r>
+              <a:rPr lang="en-US" dirty="0"/>
+              <a:t> y extender </a:t>
+            </a:r>
+            <a:r>
+              <a:rPr lang="en-US" dirty="0" err="1"/>
+              <a:t>algunas</a:t>
+            </a:r>
+            <a:r>
+              <a:rPr lang="en-US" dirty="0"/>
+              <a:t> </a:t>
+            </a:r>
+            <a:r>
+              <a:rPr lang="en-US" dirty="0" err="1"/>
+              <a:t>aplicaciones</a:t>
+            </a:r>
+            <a:r>
+              <a:rPr lang="en-US" dirty="0"/>
+              <a:t>.</a:t>
+            </a:r>
+          </a:p>
+          <a:p>
+            <a:r>
+              <a:rPr lang="en-US" dirty="0"/>
+              <a:t>Tener </a:t>
+            </a:r>
+            <a:r>
+              <a:rPr lang="en-US" dirty="0" err="1"/>
+              <a:t>consistencia</a:t>
+            </a:r>
+            <a:r>
+              <a:rPr lang="en-US" dirty="0"/>
+              <a:t> </a:t>
+            </a:r>
+            <a:r>
+              <a:rPr lang="en-US" dirty="0" err="1"/>
+              <a:t>en</a:t>
+            </a:r>
+            <a:r>
+              <a:rPr lang="en-US" dirty="0"/>
+              <a:t> la "forma" de </a:t>
+            </a:r>
+            <a:r>
+              <a:rPr lang="en-US" dirty="0" err="1"/>
+              <a:t>una</a:t>
+            </a:r>
+            <a:r>
+              <a:rPr lang="en-US" dirty="0"/>
+              <a:t> </a:t>
+            </a:r>
+            <a:r>
+              <a:rPr lang="en-US" dirty="0" err="1"/>
+              <a:t>aplicación</a:t>
+            </a:r>
+            <a:r>
+              <a:rPr lang="en-US" dirty="0"/>
+              <a:t> de Django es </a:t>
+            </a:r>
+            <a:r>
+              <a:rPr lang="en-US" dirty="0" err="1"/>
+              <a:t>muy</a:t>
+            </a:r>
+            <a:r>
+              <a:rPr lang="en-US" dirty="0"/>
+              <a:t> </a:t>
+            </a:r>
+            <a:r>
+              <a:rPr lang="en-US" dirty="0" err="1"/>
+              <a:t>útil</a:t>
+            </a:r>
+            <a:r>
+              <a:rPr lang="en-US" dirty="0"/>
+              <a:t> </a:t>
+            </a:r>
+            <a:r>
+              <a:rPr lang="en-US" dirty="0" err="1"/>
+              <a:t>cuando</a:t>
+            </a:r>
+            <a:r>
+              <a:rPr lang="en-US" dirty="0"/>
+              <a:t> "</a:t>
+            </a:r>
+            <a:r>
+              <a:rPr lang="en-US" dirty="0" err="1"/>
+              <a:t>te</a:t>
+            </a:r>
+            <a:r>
+              <a:rPr lang="en-US" dirty="0"/>
+              <a:t> </a:t>
+            </a:r>
+            <a:r>
+              <a:rPr lang="en-US" dirty="0" err="1"/>
+              <a:t>involucras</a:t>
+            </a:r>
+            <a:r>
+              <a:rPr lang="en-US" dirty="0"/>
+              <a:t>" </a:t>
+            </a:r>
+            <a:r>
+              <a:rPr lang="en-US" dirty="0" err="1"/>
+              <a:t>en</a:t>
+            </a:r>
+            <a:r>
+              <a:rPr lang="en-US" dirty="0"/>
+              <a:t> un </a:t>
+            </a:r>
+            <a:r>
+              <a:rPr lang="en-US" dirty="0" err="1"/>
+              <a:t>proyecto</a:t>
+            </a:r>
+            <a:r>
+              <a:rPr lang="en-US" dirty="0"/>
+              <a:t> </a:t>
+            </a:r>
+            <a:r>
+              <a:rPr lang="en-US" dirty="0" err="1"/>
+              <a:t>desarrollado</a:t>
+            </a:r>
+            <a:r>
+              <a:rPr lang="en-US" dirty="0"/>
+              <a:t> </a:t>
+            </a:r>
+            <a:r>
+              <a:rPr lang="en-US" dirty="0" err="1"/>
+              <a:t>por</a:t>
+            </a:r>
+            <a:r>
+              <a:rPr lang="en-US" dirty="0"/>
+              <a:t> </a:t>
+            </a:r>
+            <a:r>
+              <a:rPr lang="en-US" dirty="0" err="1"/>
+              <a:t>alguien</a:t>
+            </a:r>
+            <a:r>
+              <a:rPr lang="en-US" dirty="0"/>
+              <a:t> </a:t>
+            </a:r>
+            <a:r>
+              <a:rPr lang="en-US" dirty="0" err="1"/>
+              <a:t>más</a:t>
+            </a:r>
+            <a:r>
+              <a:rPr lang="en-US" dirty="0"/>
+              <a:t>.</a:t>
             </a:r>
           </a:p>
         </p:txBody>
@@ -7692,13 +7979,34 @@
               </a:spcBef>
             </a:pPr>
             <a:r>
+              <a:rPr lang="en-US" sz="2700" dirty="0" err="1">
+                <a:solidFill>
+                  <a:srgbClr val="FFFF00"/>
+                </a:solidFill>
+              </a:rPr>
+              <a:t>Reconocimientos</a:t>
+            </a:r>
+            <a:r>
               <a:rPr lang="en-US" sz="2700" dirty="0">
                 <a:solidFill>
                   <a:srgbClr val="FFFF00"/>
                 </a:solidFill>
               </a:rPr>
-              <a:t>Acknowledgements / Contributions</a:t>
-            </a:r>
+              <a:t> / </a:t>
+            </a:r>
+            <a:r>
+              <a:rPr lang="en-US" sz="2700" dirty="0" err="1">
+                <a:solidFill>
+                  <a:srgbClr val="FFFF00"/>
+                </a:solidFill>
+              </a:rPr>
+              <a:t>Contribuciones</a:t>
+            </a:r>
+            <a:endParaRPr lang="en-US" sz="2700" dirty="0">
+              <a:solidFill>
+                <a:srgbClr val="FFFF00"/>
+              </a:solidFill>
+            </a:endParaRPr>
           </a:p>
         </p:txBody>
       </p:sp>
@@ -7728,33 +8036,81 @@
           <a:lstStyle/>
           <a:p>
             <a:r>
-              <a:rPr lang="en-US" sz="1350" dirty="0">
+              <a:rPr lang="es-ES" sz="1350" dirty="0">
                 <a:solidFill>
                   <a:srgbClr val="FFFFFF"/>
                 </a:solidFill>
               </a:rPr>
-              <a:t>These slides are Copyright 2019-  Charles R. Severance (</a:t>
-            </a:r>
-            <a:r>
-              <a:rPr lang="en-US" sz="1350" u="sng" dirty="0">
+              <a:t>Las diapositivas están bajo el Copyright 2019-  Charles R. </a:t>
+            </a:r>
+            <a:r>
+              <a:rPr lang="es-ES" sz="1350" dirty="0" err="1">
                 <a:solidFill>
-                  <a:srgbClr val="FFFF00"/>
+                  <a:srgbClr val="FFFFFF"/>
+                </a:solidFill>
+              </a:rPr>
+              <a:t>Severance</a:t>
+            </a:r>
+            <a:r>
+              <a:rPr lang="es-ES" sz="1350" dirty="0">
+                <a:solidFill>
+                  <a:srgbClr val="FFFFFF"/>
+                </a:solidFill>
+              </a:rPr>
+              <a:t> (</a:t>
+            </a:r>
+            <a:r>
+              <a:rPr lang="es-ES" sz="1350" dirty="0">
+                <a:solidFill>
+                  <a:srgbClr val="FFFFFF"/>
                 </a:solidFill>
                 <a:hlinkClick r:id="rId3"/>
               </a:rPr>
               <a:t>www.dr-chuck.com</a:t>
             </a:r>
             <a:r>
-              <a:rPr lang="en-US" sz="1350" dirty="0">
+              <a:rPr lang="es-ES" sz="1350" dirty="0">
                 <a:solidFill>
                   <a:srgbClr val="FFFFFF"/>
                 </a:solidFill>
               </a:rPr>
-              <a:t>) of the University of Michigan School of Information and made available under a Creative Commons Attribution 4.0 License.  Please maintain this last slide in all copies of the document to comply with the attribution requirements of the license.  If you make a change, feel free to add your name and organization to the list of contributors on this page as you republish the materials.</a:t>
-            </a:r>
-          </a:p>
-          <a:p>
-            <a:endParaRPr sz="1350" dirty="0">
+              <a:t>) de la Escuela de Informática  de la Universidad de Michigan, y están disponibles públicamente bajo una Licencia Creative </a:t>
+            </a:r>
+            <a:r>
+              <a:rPr lang="es-ES" sz="1350" dirty="0" err="1">
+                <a:solidFill>
+                  <a:srgbClr val="FFFFFF"/>
+                </a:solidFill>
+              </a:rPr>
+              <a:t>Commons</a:t>
+            </a:r>
+            <a:r>
+              <a:rPr lang="es-ES" sz="1350" dirty="0">
+                <a:solidFill>
+                  <a:srgbClr val="FFFFFF"/>
+                </a:solidFill>
+              </a:rPr>
+              <a:t> </a:t>
+            </a:r>
+            <a:r>
+              <a:rPr lang="es-ES" sz="1350" dirty="0" err="1">
+                <a:solidFill>
+                  <a:srgbClr val="FFFFFF"/>
+                </a:solidFill>
+              </a:rPr>
+              <a:t>Attribution</a:t>
+            </a:r>
+            <a:r>
+              <a:rPr lang="es-ES" sz="1350" dirty="0">
+                <a:solidFill>
+                  <a:srgbClr val="FFFFFF"/>
+                </a:solidFill>
+              </a:rPr>
+              <a:t> 4.0. Favor de mantener esta última diapositiva en todas las copias del documento para cumplir con los requerimientos de atribución de la licencia. Si haces un cambio, siéntete libre de agregar tu nombre y organización a la lista de contribuidores en esta página conforme sean republicados los materiales.</a:t>
+            </a:r>
+          </a:p>
+          <a:p>
+            <a:endParaRPr lang="es-ES" sz="1350" dirty="0">
               <a:solidFill>
                 <a:srgbClr val="FFFFFF"/>
               </a:solidFill>
@@ -7762,39 +8118,49 @@
           </a:p>
           <a:p>
             <a:r>
-              <a:rPr lang="en-US" sz="1350" dirty="0">
+              <a:rPr lang="es-ES" sz="1350" dirty="0">
                 <a:solidFill>
                   <a:srgbClr val="FFFFFF"/>
                 </a:solidFill>
               </a:rPr>
-              <a:t>Initial Development: Charles Severance, University of Michigan School of Information</a:t>
-            </a:r>
-          </a:p>
-          <a:p>
-            <a:endParaRPr sz="1350" dirty="0">
+              <a:t>Desarrollo inicial: Charles </a:t>
+            </a:r>
+            <a:r>
+              <a:rPr lang="es-ES" sz="1350" dirty="0" err="1">
+                <a:solidFill>
+                  <a:srgbClr val="FFFFFF"/>
+                </a:solidFill>
+              </a:rPr>
+              <a:t>Severance</a:t>
+            </a:r>
+            <a:r>
+              <a:rPr lang="es-ES" sz="1350" dirty="0">
+                <a:solidFill>
+                  <a:srgbClr val="FFFFFF"/>
+                </a:solidFill>
+              </a:rPr>
+              <a:t>, Escuela de Informática de la Universidad de Michigan.</a:t>
+            </a:r>
+          </a:p>
+          <a:p>
+            <a:endParaRPr lang="es-ES" sz="1350" dirty="0">
               <a:solidFill>
                 <a:srgbClr val="FFFFFF"/>
               </a:solidFill>
             </a:endParaRPr>
           </a:p>
           <a:p>
-            <a:pPr>
-              <a:buClr>
-                <a:schemeClr val="dk2"/>
-              </a:buClr>
-              <a:buSzPct val="61111"/>
-            </a:pPr>
-            <a:r>
-              <a:rPr lang="en-US" sz="1350" dirty="0">
+            <a:r>
+              <a:rPr lang="es-ES" sz="1350" dirty="0">
                 <a:solidFill>
-                  <a:schemeClr val="lt1"/>
+                  <a:srgbClr val="FFFFFF"/>
                 </a:solidFill>
               </a:rPr>
-              <a:t>… Insert new Contributors and Translators here</a:t>
-            </a:r>
-          </a:p>
-          <a:p>
-            <a:endParaRPr sz="1350" dirty="0">
+              <a:t>Traducción al Español por Juan Carlos Pérez Castellanos - 2022-07-02</a:t>
+            </a:r>
+          </a:p>
+          <a:p>
+            <a:endParaRPr lang="en-US" sz="1350" dirty="0">
               <a:solidFill>
                 <a:srgbClr val="FFFFFF"/>
               </a:solidFill>
@@ -7829,55 +8195,6 @@
           </a:ln>
         </p:spPr>
       </p:pic>
-      <p:sp>
-        <p:nvSpPr>
-          <p:cNvPr id="650" name="Shape 650"/>
-          <p:cNvSpPr txBox="1"/>
-          <p:nvPr/>
-        </p:nvSpPr>
-        <p:spPr>
-          <a:xfrm>
-            <a:off x="6528301" y="1746993"/>
-            <a:ext cx="5098274" cy="4337660"/>
-          </a:xfrm>
-          <a:prstGeom prst="rect">
-            <a:avLst/>
-          </a:prstGeom>
-          <a:noFill/>
-          <a:ln>
-            <a:noFill/>
-          </a:ln>
-        </p:spPr>
-        <p:txBody>
-          <a:bodyPr lIns="68569" tIns="68569" rIns="68569" bIns="68569" anchor="t" anchorCtr="0">
-            <a:noAutofit/>
-          </a:bodyPr>
-          <a:lstStyle/>
-          <a:p>
-            <a:r>
-              <a:rPr lang="en-US" sz="1350" dirty="0">
-                <a:solidFill>
-                  <a:srgbClr val="FFFFFF"/>
-                </a:solidFill>
-              </a:rPr>
-              <a:t>Continue</a:t>
-            </a:r>
-            <a:r>
-              <a:rPr lang="is-IS" sz="1350" dirty="0">
-                <a:solidFill>
-                  <a:srgbClr val="FFFFFF"/>
-                </a:solidFill>
-              </a:rPr>
-              <a:t>…</a:t>
-            </a:r>
-            <a:endParaRPr lang="en-US" sz="1350" dirty="0">
-              <a:solidFill>
-                <a:srgbClr val="FFFFFF"/>
-              </a:solidFill>
-            </a:endParaRPr>
-          </a:p>
-        </p:txBody>
-      </p:sp>
     </p:spTree>
     <p:extLst>
       <p:ext uri="{BB962C8B-B14F-4D97-AF65-F5344CB8AC3E}">
@@ -7924,8 +8241,28 @@
           <a:lstStyle/>
           <a:p>
             <a:r>
-              <a:rPr lang="en-US" dirty="0"/>
-              <a:t>Django Terminology (i.e. folders)</a:t>
+              <a:rPr lang="en-US" dirty="0" err="1"/>
+              <a:t>Terminolog</a:t>
+            </a:r>
+            <a:r>
+              <a:rPr lang="es-US" dirty="0" err="1"/>
+              <a:t>ía</a:t>
+            </a:r>
+            <a:r>
+              <a:rPr lang="es-US" dirty="0"/>
+              <a:t> </a:t>
+            </a:r>
+            <a:r>
+              <a:rPr lang="en-US" dirty="0"/>
+              <a:t>Django (i.e. </a:t>
+            </a:r>
+            <a:r>
+              <a:rPr lang="en-US" dirty="0" err="1"/>
+              <a:t>carpetas</a:t>
+            </a:r>
+            <a:r>
+              <a:rPr lang="en-US" dirty="0"/>
+              <a:t>)</a:t>
             </a:r>
           </a:p>
         </p:txBody>
@@ -7947,21 +8284,102 @@
           <a:p>
             <a:r>
               <a:rPr lang="en-US" dirty="0"/>
-              <a:t>Project is a collection of applications</a:t>
-            </a:r>
+              <a:t>Un </a:t>
+            </a:r>
+            <a:r>
+              <a:rPr lang="en-US" dirty="0" err="1"/>
+              <a:t>proyecto</a:t>
+            </a:r>
+            <a:r>
+              <a:rPr lang="en-US" dirty="0"/>
+              <a:t> es </a:t>
+            </a:r>
+            <a:r>
+              <a:rPr lang="en-US" dirty="0" err="1"/>
+              <a:t>una</a:t>
+            </a:r>
+            <a:r>
+              <a:rPr lang="en-US" dirty="0"/>
+              <a:t> </a:t>
+            </a:r>
+            <a:r>
+              <a:rPr lang="en-US" dirty="0" err="1"/>
+              <a:t>colección</a:t>
+            </a:r>
+            <a:r>
+              <a:rPr lang="en-US" dirty="0"/>
+              <a:t> de </a:t>
+            </a:r>
+            <a:r>
+              <a:rPr lang="en-US" dirty="0" err="1"/>
+              <a:t>aplicaciones</a:t>
+            </a:r>
+            <a:endParaRPr lang="en-US" dirty="0"/>
           </a:p>
           <a:p>
             <a:pPr lvl="1"/>
             <a:r>
-              <a:rPr lang="en-US" dirty="0"/>
-              <a:t>Our project is "dj4e-samples"</a:t>
+              <a:rPr lang="en-US" dirty="0" err="1"/>
+              <a:t>Nuestro</a:t>
+            </a:r>
+            <a:r>
+              <a:rPr lang="en-US" dirty="0"/>
+              <a:t> </a:t>
+            </a:r>
+            <a:r>
+              <a:rPr lang="en-US" dirty="0" err="1"/>
+              <a:t>proyecto</a:t>
+            </a:r>
+            <a:r>
+              <a:rPr lang="en-US" dirty="0"/>
+              <a:t> es "dj4e-samples"</a:t>
             </a:r>
           </a:p>
           <a:p>
             <a:pPr lvl="1"/>
             <a:r>
               <a:rPr lang="en-US" dirty="0"/>
-              <a:t>Project-wide configuration is in dj4e-samples/dj4e-samples </a:t>
+              <a:t>La </a:t>
+            </a:r>
+            <a:r>
+              <a:rPr lang="en-US" dirty="0" err="1"/>
+              <a:t>configuración</a:t>
+            </a:r>
+            <a:r>
+              <a:rPr lang="en-US" dirty="0"/>
+              <a:t> a </a:t>
+            </a:r>
+            <a:r>
+              <a:rPr lang="en-US" dirty="0" err="1"/>
+              <a:t>nivel</a:t>
+            </a:r>
+            <a:r>
+              <a:rPr lang="en-US" dirty="0"/>
+              <a:t> de </a:t>
+            </a:r>
+            <a:r>
+              <a:rPr lang="en-US" dirty="0" err="1"/>
+              <a:t>proyecto</a:t>
+            </a:r>
+            <a:r>
+              <a:rPr lang="en-US" dirty="0"/>
+              <a:t> se </a:t>
+            </a:r>
+            <a:r>
+              <a:rPr lang="en-US" dirty="0" err="1"/>
+              <a:t>encuentra</a:t>
+            </a:r>
+            <a:r>
+              <a:rPr lang="en-US" dirty="0"/>
+              <a:t> </a:t>
+            </a:r>
+            <a:r>
+              <a:rPr lang="en-US" dirty="0" err="1"/>
+              <a:t>en</a:t>
+            </a:r>
+            <a:r>
+              <a:rPr lang="en-US" dirty="0"/>
+              <a:t> dj4e-samples/dj4e-samples </a:t>
             </a:r>
           </a:p>
           <a:p>
@@ -7971,14 +8389,74 @@
           <a:p>
             <a:r>
               <a:rPr lang="en-US" dirty="0"/>
-              <a:t>Our first application is "hello"</a:t>
+              <a:t>Nuestra </a:t>
+            </a:r>
+            <a:r>
+              <a:rPr lang="en-US" dirty="0" err="1"/>
+              <a:t>primera</a:t>
+            </a:r>
+            <a:r>
+              <a:rPr lang="en-US" dirty="0"/>
+              <a:t> </a:t>
+            </a:r>
+            <a:r>
+              <a:rPr lang="en-US" dirty="0" err="1"/>
+              <a:t>aplicación</a:t>
+            </a:r>
+            <a:r>
+              <a:rPr lang="en-US" dirty="0"/>
+              <a:t> es "hello"</a:t>
             </a:r>
           </a:p>
           <a:p>
             <a:pPr lvl="1"/>
             <a:r>
-              <a:rPr lang="en-US" dirty="0"/>
-              <a:t>We will do most of our web development in the application folder </a:t>
+              <a:rPr lang="en-US" dirty="0" err="1"/>
+              <a:t>Haremos</a:t>
+            </a:r>
+            <a:r>
+              <a:rPr lang="en-US" dirty="0"/>
+              <a:t> la </a:t>
+            </a:r>
+            <a:r>
+              <a:rPr lang="en-US" dirty="0" err="1"/>
+              <a:t>mayoría</a:t>
+            </a:r>
+            <a:r>
+              <a:rPr lang="en-US" dirty="0"/>
+              <a:t> de la </a:t>
+            </a:r>
+            <a:r>
+              <a:rPr lang="en-US" dirty="0" err="1"/>
+              <a:t>implementación</a:t>
+            </a:r>
+            <a:r>
+              <a:rPr lang="en-US" dirty="0"/>
+              <a:t> web </a:t>
+            </a:r>
+            <a:r>
+              <a:rPr lang="en-US" dirty="0" err="1"/>
+              <a:t>en</a:t>
+            </a:r>
+            <a:r>
+              <a:rPr lang="en-US" dirty="0"/>
+              <a:t> </a:t>
+            </a:r>
+            <a:r>
+              <a:rPr lang="en-US" dirty="0" err="1"/>
+              <a:t>el</a:t>
+            </a:r>
+            <a:r>
+              <a:rPr lang="en-US" dirty="0"/>
+              <a:t> folder de </a:t>
+            </a:r>
+            <a:r>
+              <a:rPr lang="en-US" dirty="0" err="1"/>
+              <a:t>aplicaciones</a:t>
+            </a:r>
+            <a:r>
+              <a:rPr lang="en-US" dirty="0"/>
+              <a:t> (application) </a:t>
             </a:r>
             <a:br>
               <a:rPr lang="en-US" dirty="0"/>
@@ -8031,23 +8509,7 @@
                   <a:srgbClr val="FFFF00"/>
                 </a:solidFill>
               </a:rPr>
-              <a:t>https://</a:t>
-            </a:r>
-            <a:r>
-              <a:rPr lang="en-US" sz="2400" dirty="0" err="1">
-                <a:solidFill>
-                  <a:srgbClr val="FFFF00"/>
-                </a:solidFill>
-              </a:rPr>
-              <a:t>github.com</a:t>
-            </a:r>
-            <a:r>
-              <a:rPr lang="en-US" sz="2400" dirty="0">
-                <a:solidFill>
-                  <a:srgbClr val="FFFF00"/>
-                </a:solidFill>
-              </a:rPr>
-              <a:t>/csev/dj4e-samples</a:t>
+              <a:t>https://github.com/csev/dj4e-samples</a:t>
             </a:r>
           </a:p>
         </p:txBody>
@@ -8103,10 +8565,13 @@
           <a:lstStyle/>
           <a:p>
             <a:r>
-              <a:rPr lang="en-US"/>
-              <a:t>Django files</a:t>
-            </a:r>
-            <a:endParaRPr lang="en-US" dirty="0"/>
+              <a:rPr lang="en-US" dirty="0" err="1"/>
+              <a:t>Archivos</a:t>
+            </a:r>
+            <a:r>
+              <a:rPr lang="en-US" dirty="0"/>
+              <a:t> de Django</a:t>
+            </a:r>
           </a:p>
         </p:txBody>
       </p:sp>
@@ -8744,8 +9209,28 @@
           <a:lstStyle/>
           <a:p>
             <a:r>
-              <a:rPr lang="en-US" dirty="0"/>
-              <a:t>Flow of a Web Request</a:t>
+              <a:rPr lang="en-US" dirty="0" err="1"/>
+              <a:t>Flujo</a:t>
+            </a:r>
+            <a:r>
+              <a:rPr lang="en-US" dirty="0"/>
+              <a:t> de </a:t>
+            </a:r>
+            <a:r>
+              <a:rPr lang="en-US" dirty="0" err="1"/>
+              <a:t>una</a:t>
+            </a:r>
+            <a:r>
+              <a:rPr lang="en-US" dirty="0"/>
+              <a:t> </a:t>
+            </a:r>
+            <a:r>
+              <a:rPr lang="en-US" dirty="0" err="1"/>
+              <a:t>solicitud</a:t>
+            </a:r>
+            <a:r>
+              <a:rPr lang="en-US" dirty="0"/>
+              <a:t> Web</a:t>
             </a:r>
           </a:p>
         </p:txBody>
@@ -8762,15 +9247,85 @@
         </p:nvSpPr>
         <p:spPr/>
         <p:txBody>
-          <a:bodyPr/>
-          <a:lstStyle/>
-          <a:p>
-            <a:r>
-              <a:rPr lang="en-US" dirty="0"/>
-              <a:t>When the request arrives at a Django app the incoming request URL is compared to the list of paths in </a:t>
-            </a:r>
-            <a:r>
-              <a:rPr lang="en-US" dirty="0" err="1">
+          <a:bodyPr>
+            <a:normAutofit/>
+          </a:bodyPr>
+          <a:lstStyle/>
+          <a:p>
+            <a:r>
+              <a:rPr lang="en-US" dirty="0" err="1"/>
+              <a:t>Cuando</a:t>
+            </a:r>
+            <a:r>
+              <a:rPr lang="en-US" dirty="0"/>
+              <a:t> </a:t>
+            </a:r>
+            <a:r>
+              <a:rPr lang="en-US" dirty="0" err="1"/>
+              <a:t>una</a:t>
+            </a:r>
+            <a:r>
+              <a:rPr lang="en-US" dirty="0"/>
+              <a:t> </a:t>
+            </a:r>
+            <a:r>
+              <a:rPr lang="en-US" dirty="0" err="1"/>
+              <a:t>solicitud</a:t>
+            </a:r>
+            <a:r>
+              <a:rPr lang="en-US" dirty="0"/>
+              <a:t> </a:t>
+            </a:r>
+            <a:r>
+              <a:rPr lang="en-US" dirty="0" err="1"/>
+              <a:t>llega</a:t>
+            </a:r>
+            <a:r>
+              <a:rPr lang="en-US" dirty="0"/>
+              <a:t> a la app de Django, la URL que se </a:t>
+            </a:r>
+            <a:r>
+              <a:rPr lang="en-US" dirty="0" err="1"/>
+              <a:t>solicita</a:t>
+            </a:r>
+            <a:r>
+              <a:rPr lang="en-US" dirty="0"/>
+              <a:t> es </a:t>
+            </a:r>
+            <a:r>
+              <a:rPr lang="en-US" dirty="0" err="1"/>
+              <a:t>comparada</a:t>
+            </a:r>
+            <a:r>
+              <a:rPr lang="en-US" dirty="0"/>
+              <a:t> con </a:t>
+            </a:r>
+            <a:r>
+              <a:rPr lang="en-US" dirty="0" err="1"/>
+              <a:t>una</a:t>
+            </a:r>
+            <a:r>
+              <a:rPr lang="en-US" dirty="0"/>
+              <a:t> </a:t>
+            </a:r>
+            <a:r>
+              <a:rPr lang="en-US" dirty="0" err="1"/>
+              <a:t>lista</a:t>
+            </a:r>
+            <a:r>
+              <a:rPr lang="en-US" dirty="0"/>
+              <a:t> de </a:t>
+            </a:r>
+            <a:r>
+              <a:rPr lang="en-US" dirty="0" err="1"/>
+              <a:t>directorios</a:t>
+            </a:r>
+            <a:r>
+              <a:rPr lang="en-US" dirty="0"/>
+              <a:t> es urls.py </a:t>
+            </a:r>
+            <a:r>
+              <a:rPr lang="en-US" dirty="0">
                 <a:solidFill>
                   <a:srgbClr val="FFC000"/>
                 </a:solidFill>
@@ -8779,7 +9334,23 @@
             </a:r>
             <a:r>
               <a:rPr lang="en-US" dirty="0"/>
-              <a:t> in the variable </a:t>
+              <a:t> </a:t>
+            </a:r>
+            <a:r>
+              <a:rPr lang="en-US" dirty="0" err="1"/>
+              <a:t>en</a:t>
+            </a:r>
+            <a:r>
+              <a:rPr lang="en-US" dirty="0"/>
+              <a:t> la variable </a:t>
+            </a:r>
+            <a:r>
+              <a:rPr lang="en-US" dirty="0" err="1"/>
+              <a:t>llamada</a:t>
+            </a:r>
+            <a:r>
+              <a:rPr lang="en-US" dirty="0"/>
+              <a:t> </a:t>
             </a:r>
             <a:r>
               <a:rPr lang="en-US" dirty="0" err="1">
@@ -8797,8 +9368,28 @@
           </a:p>
           <a:p>
             <a:r>
-              <a:rPr lang="en-US" dirty="0"/>
-              <a:t>When there is a </a:t>
+              <a:rPr lang="en-US" dirty="0" err="1"/>
+              <a:t>Cuando</a:t>
+            </a:r>
+            <a:r>
+              <a:rPr lang="en-US" dirty="0"/>
+              <a:t> hay </a:t>
+            </a:r>
+            <a:r>
+              <a:rPr lang="en-US" dirty="0" err="1"/>
+              <a:t>una</a:t>
+            </a:r>
+            <a:r>
+              <a:rPr lang="en-US" dirty="0"/>
+              <a:t> </a:t>
+            </a:r>
+            <a:r>
+              <a:rPr lang="en-US" dirty="0" err="1"/>
+              <a:t>coincidencia</a:t>
+            </a:r>
+            <a:r>
+              <a:rPr lang="en-US" dirty="0"/>
+              <a:t> de </a:t>
             </a:r>
             <a:r>
               <a:rPr lang="en-US" dirty="0" err="1"/>
@@ -8806,7 +9397,23 @@
             </a:r>
             <a:r>
               <a:rPr lang="en-US" dirty="0"/>
-              <a:t> match, it selects a "</a:t>
+              <a:t>, se </a:t>
+            </a:r>
+            <a:r>
+              <a:rPr lang="en-US" dirty="0" err="1"/>
+              <a:t>selecciona</a:t>
+            </a:r>
+            <a:r>
+              <a:rPr lang="en-US" dirty="0"/>
+              <a:t> </a:t>
+            </a:r>
+            <a:r>
+              <a:rPr lang="en-US" dirty="0" err="1"/>
+              <a:t>una</a:t>
+            </a:r>
+            <a:r>
+              <a:rPr lang="en-US" dirty="0"/>
+              <a:t> "</a:t>
             </a:r>
             <a:r>
               <a:rPr lang="en-US" dirty="0">
@@ -8814,17 +9421,94 @@
                   <a:srgbClr val="FFC000"/>
                 </a:solidFill>
               </a:rPr>
-              <a:t>View</a:t>
-            </a:r>
-            <a:r>
-              <a:rPr lang="en-US" dirty="0"/>
-              <a:t>" which is a bit of code that handles any database access and then produces and delivers the response to the browser</a:t>
-            </a:r>
-          </a:p>
-          <a:p>
-            <a:r>
-              <a:rPr lang="en-US" dirty="0"/>
-              <a:t>The </a:t>
+              <a:t>Vista</a:t>
+            </a:r>
+            <a:r>
+              <a:rPr lang="en-US" dirty="0"/>
+              <a:t>", la </a:t>
+            </a:r>
+            <a:r>
+              <a:rPr lang="en-US" dirty="0" err="1"/>
+              <a:t>cual</a:t>
+            </a:r>
+            <a:r>
+              <a:rPr lang="en-US" dirty="0"/>
+              <a:t> es un </a:t>
+            </a:r>
+            <a:r>
+              <a:rPr lang="en-US" dirty="0" err="1"/>
+              <a:t>bloque</a:t>
+            </a:r>
+            <a:r>
+              <a:rPr lang="en-US" dirty="0"/>
+              <a:t> de </a:t>
+            </a:r>
+            <a:r>
+              <a:rPr lang="en-US" dirty="0" err="1"/>
+              <a:t>código</a:t>
+            </a:r>
+            <a:r>
+              <a:rPr lang="en-US" dirty="0"/>
+              <a:t> que </a:t>
+            </a:r>
+            <a:r>
+              <a:rPr lang="en-US" dirty="0" err="1"/>
+              <a:t>maneja</a:t>
+            </a:r>
+            <a:r>
+              <a:rPr lang="en-US" dirty="0"/>
+              <a:t> </a:t>
+            </a:r>
+            <a:r>
+              <a:rPr lang="en-US" dirty="0" err="1"/>
+              <a:t>el</a:t>
+            </a:r>
+            <a:r>
+              <a:rPr lang="en-US" dirty="0"/>
+              <a:t> </a:t>
+            </a:r>
+            <a:r>
+              <a:rPr lang="en-US" dirty="0" err="1"/>
+              <a:t>acceso</a:t>
+            </a:r>
+            <a:r>
+              <a:rPr lang="en-US" dirty="0"/>
+              <a:t> a la base de </a:t>
+            </a:r>
+            <a:r>
+              <a:rPr lang="en-US" dirty="0" err="1"/>
+              <a:t>datos</a:t>
+            </a:r>
+            <a:r>
+              <a:rPr lang="en-US" dirty="0"/>
+              <a:t> y produce y </a:t>
+            </a:r>
+            <a:r>
+              <a:rPr lang="en-US" dirty="0" err="1"/>
+              <a:t>entrega</a:t>
+            </a:r>
+            <a:r>
+              <a:rPr lang="en-US" dirty="0"/>
+              <a:t> la </a:t>
+            </a:r>
+            <a:r>
+              <a:rPr lang="en-US" dirty="0" err="1"/>
+              <a:t>respuesta</a:t>
+            </a:r>
+            <a:r>
+              <a:rPr lang="en-US" dirty="0"/>
+              <a:t> al </a:t>
+            </a:r>
+            <a:r>
+              <a:rPr lang="en-US" dirty="0" err="1"/>
+              <a:t>navegador</a:t>
+            </a:r>
+            <a:endParaRPr lang="en-US" dirty="0"/>
+          </a:p>
+          <a:p>
+            <a:r>
+              <a:rPr lang="en-US" dirty="0"/>
+              <a:t>La </a:t>
             </a:r>
             <a:r>
               <a:rPr lang="en-US" dirty="0">
@@ -8832,11 +9516,109 @@
                   <a:srgbClr val="FFC000"/>
                 </a:solidFill>
               </a:rPr>
-              <a:t>view</a:t>
-            </a:r>
-            <a:r>
-              <a:rPr lang="en-US" dirty="0"/>
-              <a:t> access the database indirectly through an abstraction called a "</a:t>
+              <a:t>vista</a:t>
+            </a:r>
+            <a:r>
+              <a:rPr lang="en-US" dirty="0"/>
+              <a:t> accede a la base de </a:t>
+            </a:r>
+            <a:r>
+              <a:rPr lang="en-US" dirty="0" err="1"/>
+              <a:t>datos</a:t>
+            </a:r>
+            <a:r>
+              <a:rPr lang="en-US" dirty="0"/>
+              <a:t> </a:t>
+            </a:r>
+            <a:r>
+              <a:rPr lang="en-US" dirty="0" err="1"/>
+              <a:t>indirectamente</a:t>
+            </a:r>
+            <a:r>
+              <a:rPr lang="en-US" dirty="0"/>
+              <a:t> a </a:t>
+            </a:r>
+            <a:r>
+              <a:rPr lang="en-US" dirty="0" err="1"/>
+              <a:t>través</a:t>
+            </a:r>
+            <a:r>
+              <a:rPr lang="en-US" dirty="0"/>
+              <a:t> de </a:t>
+            </a:r>
+            <a:r>
+              <a:rPr lang="en-US" dirty="0" err="1"/>
+              <a:t>una</a:t>
+            </a:r>
+            <a:r>
+              <a:rPr lang="en-US" dirty="0"/>
+              <a:t> </a:t>
+            </a:r>
+            <a:r>
+              <a:rPr lang="en-US" dirty="0" err="1"/>
+              <a:t>abstracción</a:t>
+            </a:r>
+            <a:r>
+              <a:rPr lang="en-US" dirty="0"/>
+              <a:t> </a:t>
+            </a:r>
+            <a:r>
+              <a:rPr lang="en-US" dirty="0" err="1"/>
+              <a:t>llamada</a:t>
+            </a:r>
+            <a:r>
+              <a:rPr lang="en-US" dirty="0"/>
+              <a:t> "</a:t>
+            </a:r>
+            <a:r>
+              <a:rPr lang="en-US" dirty="0" err="1">
+                <a:solidFill>
+                  <a:srgbClr val="FFC000"/>
+                </a:solidFill>
+              </a:rPr>
+              <a:t>modelo</a:t>
+            </a:r>
+            <a:r>
+              <a:rPr lang="en-US" dirty="0"/>
+              <a:t>"</a:t>
+            </a:r>
+          </a:p>
+          <a:p>
+            <a:r>
+              <a:rPr lang="en-US" dirty="0"/>
+              <a:t>Es un </a:t>
+            </a:r>
+            <a:r>
+              <a:rPr lang="en-US" dirty="0" err="1"/>
+              <a:t>patrón</a:t>
+            </a:r>
+            <a:r>
+              <a:rPr lang="en-US" dirty="0"/>
+              <a:t> web </a:t>
+            </a:r>
+            <a:r>
+              <a:rPr lang="en-US" dirty="0" err="1"/>
+              <a:t>conocido</a:t>
+            </a:r>
+            <a:r>
+              <a:rPr lang="en-US" dirty="0"/>
+              <a:t> </a:t>
+            </a:r>
+            <a:r>
+              <a:rPr lang="en-US" dirty="0" err="1"/>
+              <a:t>como</a:t>
+            </a:r>
+            <a:r>
+              <a:rPr lang="en-US" dirty="0"/>
+              <a:t> "</a:t>
+            </a:r>
+            <a:r>
+              <a:rPr lang="en-US" dirty="0" err="1">
+                <a:solidFill>
+                  <a:srgbClr val="FFC000"/>
+                </a:solidFill>
+              </a:rPr>
+              <a:t>Modelo</a:t>
             </a:r>
             <a:r>
               <a:rPr lang="en-US" dirty="0">
@@ -8844,25 +9626,15 @@
                   <a:srgbClr val="FFC000"/>
                 </a:solidFill>
               </a:rPr>
-              <a:t>model</a:t>
-            </a:r>
-            <a:r>
-              <a:rPr lang="en-US" dirty="0"/>
-              <a:t>"</a:t>
-            </a:r>
-          </a:p>
-          <a:p>
-            <a:r>
-              <a:rPr lang="en-US" dirty="0"/>
-              <a:t>This is a general web pattern called "</a:t>
-            </a:r>
-            <a:r>
-              <a:rPr lang="en-US" dirty="0">
+              <a:t>-Vista-</a:t>
+            </a:r>
+            <a:r>
+              <a:rPr lang="en-US" dirty="0" err="1">
                 <a:solidFill>
                   <a:srgbClr val="FFC000"/>
                 </a:solidFill>
               </a:rPr>
-              <a:t>Model-View-Controller</a:t>
+              <a:t>Controlador</a:t>
             </a:r>
             <a:r>
               <a:rPr lang="en-US" dirty="0"/>
@@ -8999,9 +9771,10 @@
           <a:p>
             <a:pPr algn="r"/>
             <a:r>
-              <a:rPr lang="en-US" dirty="0"/>
-              <a:t>Browser</a:t>
-            </a:r>
+              <a:rPr lang="en-US" dirty="0" err="1"/>
+              <a:t>Navegador</a:t>
+            </a:r>
+            <a:endParaRPr lang="en-US" dirty="0"/>
           </a:p>
         </p:txBody>
       </p:sp>
@@ -9095,8 +9868,8 @@
         </p:nvSpPr>
         <p:spPr>
           <a:xfrm>
-            <a:off x="6612366" y="1112985"/>
-            <a:ext cx="1086678" cy="1033669"/>
+            <a:off x="6357019" y="1112985"/>
+            <a:ext cx="1597372" cy="1033669"/>
           </a:xfrm>
           <a:prstGeom prst="roundRect">
             <a:avLst/>
@@ -9125,13 +9898,18 @@
           <a:p>
             <a:pPr algn="ctr"/>
             <a:r>
-              <a:rPr lang="en-US">
+              <a:rPr lang="en-US" dirty="0" err="1">
                 <a:solidFill>
                   <a:schemeClr val="bg1"/>
                 </a:solidFill>
               </a:rPr>
-              <a:t>Routing</a:t>
-            </a:r>
+              <a:t>Enrutamiento</a:t>
+            </a:r>
+            <a:endParaRPr lang="en-US" dirty="0">
+              <a:solidFill>
+                <a:schemeClr val="bg1"/>
+              </a:solidFill>
+            </a:endParaRPr>
           </a:p>
         </p:txBody>
       </p:sp>
@@ -9143,8 +9921,8 @@
         </p:nvSpPr>
         <p:spPr>
           <a:xfrm>
-            <a:off x="6612366" y="2901585"/>
-            <a:ext cx="1086678" cy="1033669"/>
+            <a:off x="6357019" y="2901585"/>
+            <a:ext cx="1597372" cy="1033669"/>
           </a:xfrm>
           <a:prstGeom prst="roundRect">
             <a:avLst/>
@@ -9178,7 +9956,7 @@
                   <a:schemeClr val="bg1"/>
                 </a:solidFill>
               </a:rPr>
-              <a:t>Views</a:t>
+              <a:t>Vistas</a:t>
             </a:r>
           </a:p>
         </p:txBody>
@@ -9224,8 +10002,13 @@
             <a:pPr algn="ctr"/>
             <a:r>
               <a:rPr lang="en-US" dirty="0"/>
-              <a:t>Database</a:t>
-            </a:r>
+              <a:t>Base de </a:t>
+            </a:r>
+            <a:r>
+              <a:rPr lang="en-US" dirty="0" err="1"/>
+              <a:t>Datos</a:t>
+            </a:r>
+            <a:endParaRPr lang="en-US" dirty="0"/>
           </a:p>
         </p:txBody>
       </p:sp>
@@ -9264,8 +10047,8 @@
           <a:p>
             <a:pPr algn="ctr"/>
             <a:r>
-              <a:rPr lang="en-US"/>
-              <a:t>Templates</a:t>
+              <a:rPr lang="en-US" dirty="0" err="1"/>
+              <a:t>Plantillas</a:t>
             </a:r>
             <a:endParaRPr lang="en-US" dirty="0"/>
           </a:p>
@@ -9306,10 +10089,9 @@
           <a:p>
             <a:pPr algn="ctr"/>
             <a:r>
-              <a:rPr lang="en-US"/>
+              <a:rPr lang="en-US" dirty="0"/>
               <a:t>settings.py</a:t>
             </a:r>
-            <a:endParaRPr lang="en-US" dirty="0"/>
           </a:p>
         </p:txBody>
       </p:sp>
@@ -9355,6 +10137,7 @@
         <p:nvCxnSpPr>
           <p:cNvPr id="28" name="Straight Arrow Connector 27"/>
           <p:cNvCxnSpPr>
+            <a:cxnSpLocks/>
             <a:stCxn id="15" idx="1"/>
             <a:endCxn id="9" idx="3"/>
           </p:cNvCxnSpPr>
@@ -9362,8 +10145,8 @@
         </p:nvCxnSpPr>
         <p:spPr>
           <a:xfrm flipH="1">
-            <a:off x="7699044" y="1622089"/>
-            <a:ext cx="1318368" cy="7731"/>
+            <a:off x="7954391" y="1622089"/>
+            <a:ext cx="1063021" cy="7731"/>
           </a:xfrm>
           <a:prstGeom prst="straightConnector1">
             <a:avLst/>
@@ -9394,6 +10177,7 @@
         <p:nvCxnSpPr>
           <p:cNvPr id="31" name="Straight Arrow Connector 30"/>
           <p:cNvCxnSpPr>
+            <a:cxnSpLocks/>
             <a:stCxn id="24" idx="1"/>
             <a:endCxn id="10" idx="3"/>
           </p:cNvCxnSpPr>
@@ -9401,8 +10185,8 @@
         </p:nvCxnSpPr>
         <p:spPr>
           <a:xfrm flipH="1">
-            <a:off x="7699044" y="2556508"/>
-            <a:ext cx="1279717" cy="861912"/>
+            <a:off x="7954391" y="2556508"/>
+            <a:ext cx="1024370" cy="861912"/>
           </a:xfrm>
           <a:prstGeom prst="straightConnector1">
             <a:avLst/>
@@ -9433,6 +10217,7 @@
         <p:nvCxnSpPr>
           <p:cNvPr id="34" name="Straight Arrow Connector 33"/>
           <p:cNvCxnSpPr>
+            <a:cxnSpLocks/>
             <a:stCxn id="13" idx="1"/>
             <a:endCxn id="10" idx="3"/>
           </p:cNvCxnSpPr>
@@ -9440,8 +10225,8 @@
         </p:nvCxnSpPr>
         <p:spPr>
           <a:xfrm flipH="1" flipV="1">
-            <a:off x="7699044" y="3418420"/>
-            <a:ext cx="660617" cy="911701"/>
+            <a:off x="7954391" y="3418420"/>
+            <a:ext cx="405270" cy="911701"/>
           </a:xfrm>
           <a:prstGeom prst="straightConnector1">
             <a:avLst/>
@@ -9472,6 +10257,7 @@
         <p:nvCxnSpPr>
           <p:cNvPr id="37" name="Straight Arrow Connector 36"/>
           <p:cNvCxnSpPr>
+            <a:cxnSpLocks/>
             <a:stCxn id="14" idx="1"/>
             <a:endCxn id="10" idx="3"/>
           </p:cNvCxnSpPr>
@@ -9479,8 +10265,8 @@
         </p:nvCxnSpPr>
         <p:spPr>
           <a:xfrm flipH="1" flipV="1">
-            <a:off x="7699044" y="3418420"/>
-            <a:ext cx="1279717" cy="23900"/>
+            <a:off x="7954391" y="3418420"/>
+            <a:ext cx="1024370" cy="23900"/>
           </a:xfrm>
           <a:prstGeom prst="straightConnector1">
             <a:avLst/>
@@ -9511,6 +10297,7 @@
         <p:nvCxnSpPr>
           <p:cNvPr id="40" name="Straight Arrow Connector 39"/>
           <p:cNvCxnSpPr>
+            <a:cxnSpLocks/>
             <a:stCxn id="11" idx="2"/>
             <a:endCxn id="49" idx="3"/>
           </p:cNvCxnSpPr>
@@ -9518,8 +10305,8 @@
         </p:nvCxnSpPr>
         <p:spPr>
           <a:xfrm flipH="1" flipV="1">
-            <a:off x="7699044" y="5515568"/>
-            <a:ext cx="1094848" cy="372789"/>
+            <a:off x="7954391" y="5515568"/>
+            <a:ext cx="839501" cy="372789"/>
           </a:xfrm>
           <a:prstGeom prst="straightConnector1">
             <a:avLst/>
@@ -9795,8 +10582,8 @@
         </p:nvSpPr>
         <p:spPr>
           <a:xfrm>
-            <a:off x="6612366" y="4998733"/>
-            <a:ext cx="1086678" cy="1033669"/>
+            <a:off x="6357019" y="4998733"/>
+            <a:ext cx="1597372" cy="1033669"/>
           </a:xfrm>
           <a:prstGeom prst="roundRect">
             <a:avLst/>
@@ -9825,13 +10612,18 @@
           <a:p>
             <a:pPr algn="ctr"/>
             <a:r>
-              <a:rPr lang="en-US" dirty="0">
+              <a:rPr lang="en-US" dirty="0" err="1">
                 <a:solidFill>
                   <a:schemeClr val="bg1"/>
                 </a:solidFill>
               </a:rPr>
-              <a:t>Models</a:t>
-            </a:r>
+              <a:t>Modelos</a:t>
+            </a:r>
+            <a:endParaRPr lang="en-US" dirty="0">
+              <a:solidFill>
+                <a:schemeClr val="bg1"/>
+              </a:solidFill>
+            </a:endParaRPr>
           </a:p>
         </p:txBody>
       </p:sp>
@@ -9839,14 +10631,15 @@
         <p:nvCxnSpPr>
           <p:cNvPr id="56" name="Straight Arrow Connector 55"/>
           <p:cNvCxnSpPr>
+            <a:cxnSpLocks/>
             <a:endCxn id="49" idx="3"/>
           </p:cNvCxnSpPr>
           <p:nvPr/>
         </p:nvCxnSpPr>
         <p:spPr>
           <a:xfrm flipH="1">
-            <a:off x="7699044" y="5060467"/>
-            <a:ext cx="1369168" cy="455101"/>
+            <a:off x="7954391" y="5060467"/>
+            <a:ext cx="1113821" cy="455101"/>
           </a:xfrm>
           <a:prstGeom prst="straightConnector1">
             <a:avLst/>
@@ -9877,6 +10670,7 @@
         <p:nvCxnSpPr>
           <p:cNvPr id="60" name="Straight Arrow Connector 59"/>
           <p:cNvCxnSpPr>
+            <a:cxnSpLocks/>
             <a:endCxn id="10" idx="0"/>
           </p:cNvCxnSpPr>
           <p:nvPr/>
@@ -9915,6 +10709,7 @@
         <p:nvCxnSpPr>
           <p:cNvPr id="64" name="Straight Arrow Connector 63"/>
           <p:cNvCxnSpPr>
+            <a:cxnSpLocks/>
             <a:endCxn id="10" idx="2"/>
           </p:cNvCxnSpPr>
           <p:nvPr/>
@@ -10188,24 +10983,34 @@
           <a:p>
             <a:pPr algn="ctr"/>
             <a:r>
+              <a:rPr lang="en-US" dirty="0" err="1">
+                <a:solidFill>
+                  <a:schemeClr val="tx1"/>
+                </a:solidFill>
+              </a:rPr>
+              <a:t>Analizar</a:t>
+            </a:r>
+            <a:r>
               <a:rPr lang="en-US" dirty="0">
                 <a:solidFill>
                   <a:schemeClr val="tx1"/>
                 </a:solidFill>
               </a:rPr>
-              <a:t>Parse</a:t>
-            </a:r>
-          </a:p>
-          <a:p>
-            <a:pPr algn="ctr"/>
-            <a:r>
-              <a:rPr lang="en-US" dirty="0">
+              <a:t> </a:t>
+            </a:r>
+            <a:r>
+              <a:rPr lang="en-US" dirty="0" err="1">
                 <a:solidFill>
                   <a:schemeClr val="tx1"/>
                 </a:solidFill>
               </a:rPr>
-              <a:t>Response</a:t>
-            </a:r>
+              <a:t>respuesta</a:t>
+            </a:r>
+            <a:endParaRPr lang="en-US" dirty="0">
+              <a:solidFill>
+                <a:schemeClr val="tx1"/>
+              </a:solidFill>
+            </a:endParaRPr>
           </a:p>
         </p:txBody>
       </p:sp>
@@ -10549,6 +11354,7 @@
         <p:nvCxnSpPr>
           <p:cNvPr id="38" name="Straight Arrow Connector 37"/>
           <p:cNvCxnSpPr>
+            <a:cxnSpLocks/>
             <a:endCxn id="9" idx="1"/>
           </p:cNvCxnSpPr>
           <p:nvPr/>
@@ -10556,7 +11362,7 @@
         <p:spPr>
           <a:xfrm>
             <a:off x="3597722" y="1549422"/>
-            <a:ext cx="3014644" cy="80398"/>
+            <a:ext cx="2759297" cy="80398"/>
           </a:xfrm>
           <a:prstGeom prst="straightConnector1">
             <a:avLst/>
@@ -10799,9 +11605,10 @@
           <a:p>
             <a:pPr algn="r"/>
             <a:r>
-              <a:rPr lang="en-US" dirty="0"/>
-              <a:t>Browser</a:t>
-            </a:r>
+              <a:rPr lang="en-US" dirty="0" err="1"/>
+              <a:t>Navegador</a:t>
+            </a:r>
+            <a:endParaRPr lang="en-US" dirty="0"/>
           </a:p>
         </p:txBody>
       </p:sp>
@@ -10895,8 +11702,8 @@
         </p:nvSpPr>
         <p:spPr>
           <a:xfrm>
-            <a:off x="6612366" y="1112985"/>
-            <a:ext cx="1086678" cy="1033669"/>
+            <a:off x="6276206" y="1112985"/>
+            <a:ext cx="1758998" cy="1033669"/>
           </a:xfrm>
           <a:prstGeom prst="roundRect">
             <a:avLst/>
@@ -10925,13 +11732,18 @@
           <a:p>
             <a:pPr algn="ctr"/>
             <a:r>
-              <a:rPr lang="en-US">
+              <a:rPr lang="en-US" dirty="0" err="1">
                 <a:solidFill>
                   <a:schemeClr val="bg1"/>
                 </a:solidFill>
               </a:rPr>
-              <a:t>Routing</a:t>
-            </a:r>
+              <a:t>Enrutamiento</a:t>
+            </a:r>
+            <a:endParaRPr lang="en-US" dirty="0">
+              <a:solidFill>
+                <a:schemeClr val="bg1"/>
+              </a:solidFill>
+            </a:endParaRPr>
           </a:p>
         </p:txBody>
       </p:sp>
@@ -10943,8 +11755,8 @@
         </p:nvSpPr>
         <p:spPr>
           <a:xfrm>
-            <a:off x="6612366" y="2901585"/>
-            <a:ext cx="1086678" cy="1033669"/>
+            <a:off x="6276206" y="2901585"/>
+            <a:ext cx="1758998" cy="1033669"/>
           </a:xfrm>
           <a:prstGeom prst="roundRect">
             <a:avLst/>
@@ -10978,7 +11790,7 @@
                   <a:schemeClr val="bg1"/>
                 </a:solidFill>
               </a:rPr>
-              <a:t>Views</a:t>
+              <a:t>Vistas</a:t>
             </a:r>
           </a:p>
         </p:txBody>
@@ -11024,8 +11836,13 @@
             <a:pPr algn="ctr"/>
             <a:r>
               <a:rPr lang="en-US" dirty="0"/>
-              <a:t>Database</a:t>
-            </a:r>
+              <a:t>Base de </a:t>
+            </a:r>
+            <a:r>
+              <a:rPr lang="en-US" dirty="0" err="1"/>
+              <a:t>Datos</a:t>
+            </a:r>
+            <a:endParaRPr lang="en-US" dirty="0"/>
           </a:p>
         </p:txBody>
       </p:sp>
@@ -11064,8 +11881,8 @@
           <a:p>
             <a:pPr algn="ctr"/>
             <a:r>
-              <a:rPr lang="en-US"/>
-              <a:t>Templates</a:t>
+              <a:rPr lang="en-US" dirty="0" err="1"/>
+              <a:t>Plantillas</a:t>
             </a:r>
             <a:endParaRPr lang="en-US" dirty="0"/>
           </a:p>
@@ -11155,6 +11972,7 @@
         <p:nvCxnSpPr>
           <p:cNvPr id="28" name="Straight Arrow Connector 27"/>
           <p:cNvCxnSpPr>
+            <a:cxnSpLocks/>
             <a:stCxn id="15" idx="1"/>
             <a:endCxn id="9" idx="3"/>
           </p:cNvCxnSpPr>
@@ -11162,8 +11980,8 @@
         </p:nvCxnSpPr>
         <p:spPr>
           <a:xfrm flipH="1">
-            <a:off x="7699044" y="1622089"/>
-            <a:ext cx="1318368" cy="7731"/>
+            <a:off x="8035204" y="1622089"/>
+            <a:ext cx="982208" cy="7731"/>
           </a:xfrm>
           <a:prstGeom prst="straightConnector1">
             <a:avLst/>
@@ -11194,6 +12012,7 @@
         <p:nvCxnSpPr>
           <p:cNvPr id="31" name="Straight Arrow Connector 30"/>
           <p:cNvCxnSpPr>
+            <a:cxnSpLocks/>
             <a:stCxn id="24" idx="1"/>
             <a:endCxn id="10" idx="3"/>
           </p:cNvCxnSpPr>
@@ -11201,8 +12020,8 @@
         </p:nvCxnSpPr>
         <p:spPr>
           <a:xfrm flipH="1">
-            <a:off x="7699044" y="2556508"/>
-            <a:ext cx="1279717" cy="861912"/>
+            <a:off x="8035204" y="2556508"/>
+            <a:ext cx="943557" cy="861912"/>
           </a:xfrm>
           <a:prstGeom prst="straightConnector1">
             <a:avLst/>
@@ -11233,6 +12052,7 @@
         <p:nvCxnSpPr>
           <p:cNvPr id="34" name="Straight Arrow Connector 33"/>
           <p:cNvCxnSpPr>
+            <a:cxnSpLocks/>
             <a:stCxn id="13" idx="1"/>
             <a:endCxn id="10" idx="3"/>
           </p:cNvCxnSpPr>
@@ -11240,8 +12060,8 @@
         </p:nvCxnSpPr>
         <p:spPr>
           <a:xfrm flipH="1" flipV="1">
-            <a:off x="7699044" y="3418420"/>
-            <a:ext cx="660617" cy="911701"/>
+            <a:off x="8035204" y="3418420"/>
+            <a:ext cx="324457" cy="911701"/>
           </a:xfrm>
           <a:prstGeom prst="straightConnector1">
             <a:avLst/>
@@ -11272,6 +12092,7 @@
         <p:nvCxnSpPr>
           <p:cNvPr id="37" name="Straight Arrow Connector 36"/>
           <p:cNvCxnSpPr>
+            <a:cxnSpLocks/>
             <a:stCxn id="14" idx="1"/>
             <a:endCxn id="10" idx="3"/>
           </p:cNvCxnSpPr>
@@ -11279,8 +12100,8 @@
         </p:nvCxnSpPr>
         <p:spPr>
           <a:xfrm flipH="1" flipV="1">
-            <a:off x="7699044" y="3418420"/>
-            <a:ext cx="1279717" cy="23900"/>
+            <a:off x="8035204" y="3418420"/>
+            <a:ext cx="943557" cy="23900"/>
           </a:xfrm>
           <a:prstGeom prst="straightConnector1">
             <a:avLst/>
@@ -11311,6 +12132,7 @@
         <p:nvCxnSpPr>
           <p:cNvPr id="40" name="Straight Arrow Connector 39"/>
           <p:cNvCxnSpPr>
+            <a:cxnSpLocks/>
             <a:stCxn id="11" idx="2"/>
             <a:endCxn id="49" idx="3"/>
           </p:cNvCxnSpPr>
@@ -11318,8 +12140,8 @@
         </p:nvCxnSpPr>
         <p:spPr>
           <a:xfrm flipH="1" flipV="1">
-            <a:off x="7699044" y="5515568"/>
-            <a:ext cx="1094848" cy="372789"/>
+            <a:off x="8035204" y="5515568"/>
+            <a:ext cx="758688" cy="372789"/>
           </a:xfrm>
           <a:prstGeom prst="straightConnector1">
             <a:avLst/>
@@ -11595,8 +12417,8 @@
         </p:nvSpPr>
         <p:spPr>
           <a:xfrm>
-            <a:off x="6612366" y="4998733"/>
-            <a:ext cx="1086678" cy="1033669"/>
+            <a:off x="6276206" y="4998733"/>
+            <a:ext cx="1758998" cy="1033669"/>
           </a:xfrm>
           <a:prstGeom prst="roundRect">
             <a:avLst/>
@@ -11625,13 +12447,18 @@
           <a:p>
             <a:pPr algn="ctr"/>
             <a:r>
-              <a:rPr lang="en-US" dirty="0">
+              <a:rPr lang="en-US" dirty="0" err="1">
                 <a:solidFill>
                   <a:schemeClr val="bg1"/>
                 </a:solidFill>
               </a:rPr>
-              <a:t>Models</a:t>
-            </a:r>
+              <a:t>Modelos</a:t>
+            </a:r>
+            <a:endParaRPr lang="en-US" dirty="0">
+              <a:solidFill>
+                <a:schemeClr val="bg1"/>
+              </a:solidFill>
+            </a:endParaRPr>
           </a:p>
         </p:txBody>
       </p:sp>
@@ -11639,14 +12466,15 @@
         <p:nvCxnSpPr>
           <p:cNvPr id="56" name="Straight Arrow Connector 55"/>
           <p:cNvCxnSpPr>
+            <a:cxnSpLocks/>
             <a:endCxn id="49" idx="3"/>
           </p:cNvCxnSpPr>
           <p:nvPr/>
         </p:nvCxnSpPr>
         <p:spPr>
           <a:xfrm flipH="1">
-            <a:off x="7699044" y="5060467"/>
-            <a:ext cx="1369168" cy="455101"/>
+            <a:off x="8035204" y="5060467"/>
+            <a:ext cx="1033008" cy="455101"/>
           </a:xfrm>
           <a:prstGeom prst="straightConnector1">
             <a:avLst/>
@@ -11677,6 +12505,7 @@
         <p:nvCxnSpPr>
           <p:cNvPr id="60" name="Straight Arrow Connector 59"/>
           <p:cNvCxnSpPr>
+            <a:cxnSpLocks/>
             <a:endCxn id="10" idx="0"/>
           </p:cNvCxnSpPr>
           <p:nvPr/>
@@ -11715,6 +12544,7 @@
         <p:nvCxnSpPr>
           <p:cNvPr id="64" name="Straight Arrow Connector 63"/>
           <p:cNvCxnSpPr>
+            <a:cxnSpLocks/>
             <a:endCxn id="10" idx="2"/>
           </p:cNvCxnSpPr>
           <p:nvPr/>
@@ -11988,24 +12818,34 @@
           <a:p>
             <a:pPr algn="ctr"/>
             <a:r>
+              <a:rPr lang="en-US" dirty="0" err="1">
+                <a:solidFill>
+                  <a:schemeClr val="tx1"/>
+                </a:solidFill>
+              </a:rPr>
+              <a:t>Analizar</a:t>
+            </a:r>
+            <a:r>
               <a:rPr lang="en-US" dirty="0">
                 <a:solidFill>
                   <a:schemeClr val="tx1"/>
                 </a:solidFill>
               </a:rPr>
-              <a:t>Parse</a:t>
-            </a:r>
-          </a:p>
-          <a:p>
-            <a:pPr algn="ctr"/>
-            <a:r>
-              <a:rPr lang="en-US" dirty="0">
+              <a:t> </a:t>
+            </a:r>
+            <a:r>
+              <a:rPr lang="en-US" dirty="0" err="1">
                 <a:solidFill>
                   <a:schemeClr val="tx1"/>
                 </a:solidFill>
               </a:rPr>
-              <a:t>Response</a:t>
-            </a:r>
+              <a:t>respuesta</a:t>
+            </a:r>
+            <a:endParaRPr lang="en-US" dirty="0">
+              <a:solidFill>
+                <a:schemeClr val="tx1"/>
+              </a:solidFill>
+            </a:endParaRPr>
           </a:p>
         </p:txBody>
       </p:sp>
@@ -12313,6 +13153,7 @@
         <p:nvCxnSpPr>
           <p:cNvPr id="38" name="Straight Arrow Connector 37"/>
           <p:cNvCxnSpPr>
+            <a:cxnSpLocks/>
             <a:endCxn id="9" idx="1"/>
           </p:cNvCxnSpPr>
           <p:nvPr/>
@@ -12320,7 +13161,7 @@
         <p:spPr>
           <a:xfrm>
             <a:off x="670560" y="1423453"/>
-            <a:ext cx="5941806" cy="206367"/>
+            <a:ext cx="5605646" cy="206367"/>
           </a:xfrm>
           <a:prstGeom prst="straightConnector1">
             <a:avLst/>
@@ -12390,8 +13231,13 @@
             <a:pPr algn="ctr"/>
             <a:r>
               <a:rPr lang="en-US" dirty="0"/>
-              <a:t>3: Choose</a:t>
-            </a:r>
+              <a:t>3: </a:t>
+            </a:r>
+            <a:r>
+              <a:rPr lang="en-US" dirty="0" err="1"/>
+              <a:t>Elegir</a:t>
+            </a:r>
+            <a:endParaRPr lang="en-US" dirty="0"/>
           </a:p>
         </p:txBody>
       </p:sp>
@@ -12439,8 +13285,8 @@
         </p:nvSpPr>
         <p:spPr>
           <a:xfrm>
-            <a:off x="5272267" y="4375124"/>
-            <a:ext cx="1567830" cy="623607"/>
+            <a:off x="5201025" y="4079312"/>
+            <a:ext cx="1746277" cy="799251"/>
           </a:xfrm>
           <a:prstGeom prst="roundRect">
             <a:avLst/>
@@ -12474,15 +13320,31 @@
             <a:pPr algn="ctr"/>
             <a:r>
               <a:rPr lang="en-US" dirty="0"/>
-              <a:t>4</a:t>
-            </a:r>
-            <a:r>
-              <a:rPr lang="en-US"/>
-              <a:t>: Store Data </a:t>
-            </a:r>
-            <a:r>
-              <a:rPr lang="en-US" dirty="0"/>
-              <a:t>(optional)</a:t>
+              <a:t>4: </a:t>
+            </a:r>
+            <a:r>
+              <a:rPr lang="en-US" dirty="0" err="1"/>
+              <a:t>Almacenar</a:t>
+            </a:r>
+            <a:r>
+              <a:rPr lang="en-US" dirty="0"/>
+              <a:t> </a:t>
+            </a:r>
+            <a:r>
+              <a:rPr lang="en-US" dirty="0" err="1"/>
+              <a:t>Datos</a:t>
+            </a:r>
+            <a:r>
+              <a:rPr lang="en-US" dirty="0"/>
+              <a:t> (</a:t>
+            </a:r>
+            <a:r>
+              <a:rPr lang="en-US" dirty="0" err="1"/>
+              <a:t>opcional</a:t>
+            </a:r>
+            <a:r>
+              <a:rPr lang="en-US" dirty="0"/>
+              <a:t>)</a:t>
             </a:r>
           </a:p>
         </p:txBody>
@@ -12643,9 +13505,10 @@
           <a:p>
             <a:pPr algn="r"/>
             <a:r>
-              <a:rPr lang="en-US" dirty="0"/>
-              <a:t>Browser</a:t>
-            </a:r>
+              <a:rPr lang="en-US" dirty="0" err="1"/>
+              <a:t>Navegador</a:t>
+            </a:r>
+            <a:endParaRPr lang="en-US" dirty="0"/>
           </a:p>
         </p:txBody>
       </p:sp>
@@ -12739,8 +13602,8 @@
         </p:nvSpPr>
         <p:spPr>
           <a:xfrm>
-            <a:off x="6612366" y="1112985"/>
-            <a:ext cx="1086678" cy="1033669"/>
+            <a:off x="6276210" y="1112985"/>
+            <a:ext cx="1758990" cy="1033669"/>
           </a:xfrm>
           <a:prstGeom prst="roundRect">
             <a:avLst/>
@@ -12769,13 +13632,18 @@
           <a:p>
             <a:pPr algn="ctr"/>
             <a:r>
-              <a:rPr lang="en-US">
+              <a:rPr lang="en-US" dirty="0" err="1">
                 <a:solidFill>
                   <a:schemeClr val="bg1"/>
                 </a:solidFill>
               </a:rPr>
-              <a:t>Routing</a:t>
-            </a:r>
+              <a:t>Enrutamiento</a:t>
+            </a:r>
+            <a:endParaRPr lang="en-US" dirty="0">
+              <a:solidFill>
+                <a:schemeClr val="bg1"/>
+              </a:solidFill>
+            </a:endParaRPr>
           </a:p>
         </p:txBody>
       </p:sp>
@@ -12787,8 +13655,8 @@
         </p:nvSpPr>
         <p:spPr>
           <a:xfrm>
-            <a:off x="6612366" y="2901585"/>
-            <a:ext cx="1086678" cy="1033669"/>
+            <a:off x="6276210" y="2901585"/>
+            <a:ext cx="1758990" cy="1033669"/>
           </a:xfrm>
           <a:prstGeom prst="roundRect">
             <a:avLst/>
@@ -12822,7 +13690,7 @@
                   <a:schemeClr val="bg1"/>
                 </a:solidFill>
               </a:rPr>
-              <a:t>Views</a:t>
+              <a:t>Vistas</a:t>
             </a:r>
           </a:p>
         </p:txBody>
@@ -12868,8 +13736,13 @@
             <a:pPr algn="ctr"/>
             <a:r>
               <a:rPr lang="en-US" dirty="0"/>
-              <a:t>Database</a:t>
-            </a:r>
+              <a:t>Base de </a:t>
+            </a:r>
+            <a:r>
+              <a:rPr lang="en-US" dirty="0" err="1"/>
+              <a:t>Datos</a:t>
+            </a:r>
+            <a:endParaRPr lang="en-US" dirty="0"/>
           </a:p>
         </p:txBody>
       </p:sp>
@@ -12908,8 +13781,8 @@
           <a:p>
             <a:pPr algn="ctr"/>
             <a:r>
-              <a:rPr lang="en-US"/>
-              <a:t>Templates</a:t>
+              <a:rPr lang="en-US" dirty="0" err="1"/>
+              <a:t>Plantillas</a:t>
             </a:r>
             <a:endParaRPr lang="en-US" dirty="0"/>
           </a:p>
@@ -12999,6 +13872,7 @@
         <p:nvCxnSpPr>
           <p:cNvPr id="28" name="Straight Arrow Connector 27"/>
           <p:cNvCxnSpPr>
+            <a:cxnSpLocks/>
             <a:stCxn id="15" idx="1"/>
             <a:endCxn id="9" idx="3"/>
           </p:cNvCxnSpPr>
@@ -13006,8 +13880,8 @@
         </p:nvCxnSpPr>
         <p:spPr>
           <a:xfrm flipH="1">
-            <a:off x="7699044" y="1622089"/>
-            <a:ext cx="1318368" cy="7731"/>
+            <a:off x="8035200" y="1622089"/>
+            <a:ext cx="982212" cy="7731"/>
           </a:xfrm>
           <a:prstGeom prst="straightConnector1">
             <a:avLst/>
@@ -13038,6 +13912,7 @@
         <p:nvCxnSpPr>
           <p:cNvPr id="31" name="Straight Arrow Connector 30"/>
           <p:cNvCxnSpPr>
+            <a:cxnSpLocks/>
             <a:stCxn id="24" idx="1"/>
             <a:endCxn id="10" idx="3"/>
           </p:cNvCxnSpPr>
@@ -13045,8 +13920,8 @@
         </p:nvCxnSpPr>
         <p:spPr>
           <a:xfrm flipH="1">
-            <a:off x="7699044" y="2556508"/>
-            <a:ext cx="1279717" cy="861912"/>
+            <a:off x="8035200" y="2556508"/>
+            <a:ext cx="943561" cy="861912"/>
           </a:xfrm>
           <a:prstGeom prst="straightConnector1">
             <a:avLst/>
@@ -13077,6 +13952,7 @@
         <p:nvCxnSpPr>
           <p:cNvPr id="34" name="Straight Arrow Connector 33"/>
           <p:cNvCxnSpPr>
+            <a:cxnSpLocks/>
             <a:stCxn id="13" idx="1"/>
             <a:endCxn id="10" idx="3"/>
           </p:cNvCxnSpPr>
@@ -13084,8 +13960,8 @@
         </p:nvCxnSpPr>
         <p:spPr>
           <a:xfrm flipH="1" flipV="1">
-            <a:off x="7699044" y="3418420"/>
-            <a:ext cx="660617" cy="911701"/>
+            <a:off x="8035200" y="3418420"/>
+            <a:ext cx="324461" cy="911701"/>
           </a:xfrm>
           <a:prstGeom prst="straightConnector1">
             <a:avLst/>
@@ -13116,6 +13992,7 @@
         <p:nvCxnSpPr>
           <p:cNvPr id="37" name="Straight Arrow Connector 36"/>
           <p:cNvCxnSpPr>
+            <a:cxnSpLocks/>
             <a:stCxn id="14" idx="1"/>
             <a:endCxn id="10" idx="3"/>
           </p:cNvCxnSpPr>
@@ -13123,8 +14000,8 @@
         </p:nvCxnSpPr>
         <p:spPr>
           <a:xfrm flipH="1" flipV="1">
-            <a:off x="7699044" y="3418420"/>
-            <a:ext cx="1279717" cy="23900"/>
+            <a:off x="8035200" y="3418420"/>
+            <a:ext cx="943561" cy="23900"/>
           </a:xfrm>
           <a:prstGeom prst="straightConnector1">
             <a:avLst/>
@@ -13155,6 +14032,7 @@
         <p:nvCxnSpPr>
           <p:cNvPr id="40" name="Straight Arrow Connector 39"/>
           <p:cNvCxnSpPr>
+            <a:cxnSpLocks/>
             <a:stCxn id="11" idx="2"/>
             <a:endCxn id="49" idx="3"/>
           </p:cNvCxnSpPr>
@@ -13162,8 +14040,8 @@
         </p:nvCxnSpPr>
         <p:spPr>
           <a:xfrm flipH="1" flipV="1">
-            <a:off x="7699044" y="5515568"/>
-            <a:ext cx="1094848" cy="372789"/>
+            <a:off x="8035200" y="5515568"/>
+            <a:ext cx="758692" cy="372789"/>
           </a:xfrm>
           <a:prstGeom prst="straightConnector1">
             <a:avLst/>
@@ -13439,8 +14317,8 @@
         </p:nvSpPr>
         <p:spPr>
           <a:xfrm>
-            <a:off x="6612366" y="4998733"/>
-            <a:ext cx="1086678" cy="1033669"/>
+            <a:off x="6276210" y="4998733"/>
+            <a:ext cx="1758990" cy="1033669"/>
           </a:xfrm>
           <a:prstGeom prst="roundRect">
             <a:avLst/>
@@ -13469,13 +14347,18 @@
           <a:p>
             <a:pPr algn="ctr"/>
             <a:r>
-              <a:rPr lang="en-US" dirty="0">
+              <a:rPr lang="en-US" dirty="0" err="1">
                 <a:solidFill>
                   <a:schemeClr val="bg1"/>
                 </a:solidFill>
               </a:rPr>
-              <a:t>Models</a:t>
-            </a:r>
+              <a:t>Modelos</a:t>
+            </a:r>
+            <a:endParaRPr lang="en-US" dirty="0">
+              <a:solidFill>
+                <a:schemeClr val="bg1"/>
+              </a:solidFill>
+            </a:endParaRPr>
           </a:p>
         </p:txBody>
       </p:sp>
@@ -13483,14 +14366,15 @@
         <p:nvCxnSpPr>
           <p:cNvPr id="56" name="Straight Arrow Connector 55"/>
           <p:cNvCxnSpPr>
+            <a:cxnSpLocks/>
             <a:endCxn id="49" idx="3"/>
           </p:cNvCxnSpPr>
           <p:nvPr/>
         </p:nvCxnSpPr>
         <p:spPr>
           <a:xfrm flipH="1">
-            <a:off x="7699044" y="5060467"/>
-            <a:ext cx="1369168" cy="455101"/>
+            <a:off x="8035200" y="5060467"/>
+            <a:ext cx="1033012" cy="455101"/>
           </a:xfrm>
           <a:prstGeom prst="straightConnector1">
             <a:avLst/>
@@ -13521,6 +14405,7 @@
         <p:nvCxnSpPr>
           <p:cNvPr id="60" name="Straight Arrow Connector 59"/>
           <p:cNvCxnSpPr>
+            <a:cxnSpLocks/>
             <a:endCxn id="10" idx="0"/>
           </p:cNvCxnSpPr>
           <p:nvPr/>
@@ -13559,6 +14444,7 @@
         <p:nvCxnSpPr>
           <p:cNvPr id="64" name="Straight Arrow Connector 63"/>
           <p:cNvCxnSpPr>
+            <a:cxnSpLocks/>
             <a:endCxn id="10" idx="2"/>
           </p:cNvCxnSpPr>
           <p:nvPr/>
@@ -13832,24 +14718,34 @@
           <a:p>
             <a:pPr algn="ctr"/>
             <a:r>
+              <a:rPr lang="en-US" dirty="0" err="1">
+                <a:solidFill>
+                  <a:schemeClr val="tx1"/>
+                </a:solidFill>
+              </a:rPr>
+              <a:t>Analizar</a:t>
+            </a:r>
+            <a:r>
               <a:rPr lang="en-US" dirty="0">
                 <a:solidFill>
                   <a:schemeClr val="tx1"/>
                 </a:solidFill>
               </a:rPr>
-              <a:t>Parse</a:t>
-            </a:r>
-          </a:p>
-          <a:p>
-            <a:pPr algn="ctr"/>
-            <a:r>
-              <a:rPr lang="en-US" dirty="0">
+              <a:t> </a:t>
+            </a:r>
+            <a:r>
+              <a:rPr lang="en-US" dirty="0" err="1">
                 <a:solidFill>
                   <a:schemeClr val="tx1"/>
                 </a:solidFill>
               </a:rPr>
-              <a:t>Response</a:t>
-            </a:r>
+              <a:t>respuesta</a:t>
+            </a:r>
+            <a:endParaRPr lang="en-US" dirty="0">
+              <a:solidFill>
+                <a:schemeClr val="tx1"/>
+              </a:solidFill>
+            </a:endParaRPr>
           </a:p>
         </p:txBody>
       </p:sp>
@@ -14216,8 +15112,13 @@
             <a:pPr algn="ctr"/>
             <a:r>
               <a:rPr lang="en-US" dirty="0"/>
-              <a:t>5: Choose</a:t>
-            </a:r>
+              <a:t>5: </a:t>
+            </a:r>
+            <a:r>
+              <a:rPr lang="en-US" dirty="0" err="1"/>
+              <a:t>Elegir</a:t>
+            </a:r>
+            <a:endParaRPr lang="en-US" dirty="0"/>
           </a:p>
         </p:txBody>
       </p:sp>
@@ -14264,11 +15165,11 @@
             <a:pPr algn="ctr"/>
             <a:r>
               <a:rPr lang="en-US" dirty="0"/>
-              <a:t>6</a:t>
-            </a:r>
-            <a:r>
-              <a:rPr lang="en-US"/>
-              <a:t>: Read Data</a:t>
+              <a:t>6: Leer </a:t>
+            </a:r>
+            <a:r>
+              <a:rPr lang="en-US" dirty="0" err="1"/>
+              <a:t>datos</a:t>
             </a:r>
             <a:endParaRPr lang="en-US" dirty="0"/>
           </a:p>
@@ -14319,7 +15220,7 @@
         <p:spPr>
           <a:xfrm>
             <a:off x="5417736" y="2556508"/>
-            <a:ext cx="1377696" cy="382994"/>
+            <a:ext cx="1570550" cy="382994"/>
           </a:xfrm>
           <a:prstGeom prst="roundRect">
             <a:avLst/>
@@ -14353,8 +15254,13 @@
             <a:pPr algn="ctr"/>
             <a:r>
               <a:rPr lang="en-US" dirty="0"/>
-              <a:t>7: Render</a:t>
-            </a:r>
+              <a:t>7: </a:t>
+            </a:r>
+            <a:r>
+              <a:rPr lang="en-US" dirty="0" err="1"/>
+              <a:t>Renderizar</a:t>
+            </a:r>
+            <a:endParaRPr lang="en-US" dirty="0"/>
           </a:p>
         </p:txBody>
       </p:sp>
@@ -14550,9 +15456,10 @@
           <a:p>
             <a:pPr algn="r"/>
             <a:r>
-              <a:rPr lang="en-US" dirty="0"/>
-              <a:t>Browser</a:t>
-            </a:r>
+              <a:rPr lang="en-US" dirty="0" err="1"/>
+              <a:t>Navegador</a:t>
+            </a:r>
+            <a:endParaRPr lang="en-US" dirty="0"/>
           </a:p>
         </p:txBody>
       </p:sp>
@@ -14646,8 +15553,8 @@
         </p:nvSpPr>
         <p:spPr>
           <a:xfrm>
-            <a:off x="6612366" y="1112985"/>
-            <a:ext cx="1086678" cy="1033669"/>
+            <a:off x="6354054" y="1112985"/>
+            <a:ext cx="1603302" cy="1033669"/>
           </a:xfrm>
           <a:prstGeom prst="roundRect">
             <a:avLst/>
@@ -14676,13 +15583,18 @@
           <a:p>
             <a:pPr algn="ctr"/>
             <a:r>
-              <a:rPr lang="en-US">
+              <a:rPr lang="en-US" dirty="0" err="1">
                 <a:solidFill>
                   <a:schemeClr val="bg1"/>
                 </a:solidFill>
               </a:rPr>
-              <a:t>Routing</a:t>
-            </a:r>
+              <a:t>Enrutamiento</a:t>
+            </a:r>
+            <a:endParaRPr lang="en-US" dirty="0">
+              <a:solidFill>
+                <a:schemeClr val="bg1"/>
+              </a:solidFill>
+            </a:endParaRPr>
           </a:p>
         </p:txBody>
       </p:sp>
@@ -14694,8 +15606,8 @@
         </p:nvSpPr>
         <p:spPr>
           <a:xfrm>
-            <a:off x="6612366" y="2901585"/>
-            <a:ext cx="1086678" cy="1033669"/>
+            <a:off x="6354054" y="2901585"/>
+            <a:ext cx="1603302" cy="1033669"/>
           </a:xfrm>
           <a:prstGeom prst="roundRect">
             <a:avLst/>
@@ -14729,7 +15641,7 @@
                   <a:schemeClr val="bg1"/>
                 </a:solidFill>
               </a:rPr>
-              <a:t>Views</a:t>
+              <a:t>Vistas</a:t>
             </a:r>
           </a:p>
         </p:txBody>
@@ -14775,8 +15687,13 @@
             <a:pPr algn="ctr"/>
             <a:r>
               <a:rPr lang="en-US" dirty="0"/>
-              <a:t>Database</a:t>
-            </a:r>
+              <a:t>Base de </a:t>
+            </a:r>
+            <a:r>
+              <a:rPr lang="en-US" dirty="0" err="1"/>
+              <a:t>Datos</a:t>
+            </a:r>
+            <a:endParaRPr lang="en-US" dirty="0"/>
           </a:p>
         </p:txBody>
       </p:sp>
@@ -14815,8 +15732,8 @@
           <a:p>
             <a:pPr algn="ctr"/>
             <a:r>
-              <a:rPr lang="en-US"/>
-              <a:t>Templates</a:t>
+              <a:rPr lang="en-US" dirty="0" err="1"/>
+              <a:t>Plantillas</a:t>
             </a:r>
             <a:endParaRPr lang="en-US" dirty="0"/>
           </a:p>
@@ -14906,6 +15823,7 @@
         <p:nvCxnSpPr>
           <p:cNvPr id="28" name="Straight Arrow Connector 27"/>
           <p:cNvCxnSpPr>
+            <a:cxnSpLocks/>
             <a:stCxn id="15" idx="1"/>
             <a:endCxn id="9" idx="3"/>
           </p:cNvCxnSpPr>
@@ -14913,8 +15831,8 @@
         </p:nvCxnSpPr>
         <p:spPr>
           <a:xfrm flipH="1">
-            <a:off x="7699044" y="1622089"/>
-            <a:ext cx="1318368" cy="7731"/>
+            <a:off x="7957356" y="1622089"/>
+            <a:ext cx="1060056" cy="7731"/>
           </a:xfrm>
           <a:prstGeom prst="straightConnector1">
             <a:avLst/>
@@ -14945,6 +15863,7 @@
         <p:nvCxnSpPr>
           <p:cNvPr id="31" name="Straight Arrow Connector 30"/>
           <p:cNvCxnSpPr>
+            <a:cxnSpLocks/>
             <a:stCxn id="24" idx="1"/>
             <a:endCxn id="10" idx="3"/>
           </p:cNvCxnSpPr>
@@ -14952,8 +15871,8 @@
         </p:nvCxnSpPr>
         <p:spPr>
           <a:xfrm flipH="1">
-            <a:off x="7699044" y="2556508"/>
-            <a:ext cx="1279717" cy="861912"/>
+            <a:off x="7957356" y="2556508"/>
+            <a:ext cx="1021405" cy="861912"/>
           </a:xfrm>
           <a:prstGeom prst="straightConnector1">
             <a:avLst/>
@@ -14984,6 +15903,7 @@
         <p:nvCxnSpPr>
           <p:cNvPr id="34" name="Straight Arrow Connector 33"/>
           <p:cNvCxnSpPr>
+            <a:cxnSpLocks/>
             <a:stCxn id="13" idx="1"/>
             <a:endCxn id="10" idx="3"/>
           </p:cNvCxnSpPr>
@@ -14991,8 +15911,8 @@
         </p:nvCxnSpPr>
         <p:spPr>
           <a:xfrm flipH="1" flipV="1">
-            <a:off x="7699044" y="3418420"/>
-            <a:ext cx="660617" cy="911701"/>
+            <a:off x="7957356" y="3418420"/>
+            <a:ext cx="402305" cy="911701"/>
           </a:xfrm>
           <a:prstGeom prst="straightConnector1">
             <a:avLst/>
@@ -15023,6 +15943,7 @@
         <p:nvCxnSpPr>
           <p:cNvPr id="37" name="Straight Arrow Connector 36"/>
           <p:cNvCxnSpPr>
+            <a:cxnSpLocks/>
             <a:stCxn id="14" idx="1"/>
             <a:endCxn id="10" idx="3"/>
           </p:cNvCxnSpPr>
@@ -15030,8 +15951,8 @@
         </p:nvCxnSpPr>
         <p:spPr>
           <a:xfrm flipH="1" flipV="1">
-            <a:off x="7699044" y="3418420"/>
-            <a:ext cx="1279717" cy="23900"/>
+            <a:off x="7957356" y="3418420"/>
+            <a:ext cx="1021405" cy="23900"/>
           </a:xfrm>
           <a:prstGeom prst="straightConnector1">
             <a:avLst/>
@@ -15062,6 +15983,7 @@
         <p:nvCxnSpPr>
           <p:cNvPr id="40" name="Straight Arrow Connector 39"/>
           <p:cNvCxnSpPr>
+            <a:cxnSpLocks/>
             <a:stCxn id="11" idx="2"/>
             <a:endCxn id="49" idx="3"/>
           </p:cNvCxnSpPr>
@@ -15069,8 +15991,8 @@
         </p:nvCxnSpPr>
         <p:spPr>
           <a:xfrm flipH="1" flipV="1">
-            <a:off x="7699044" y="5515568"/>
-            <a:ext cx="1094848" cy="372789"/>
+            <a:off x="7957356" y="5515568"/>
+            <a:ext cx="836536" cy="372789"/>
           </a:xfrm>
           <a:prstGeom prst="straightConnector1">
             <a:avLst/>
@@ -15346,8 +16268,8 @@
         </p:nvSpPr>
         <p:spPr>
           <a:xfrm>
-            <a:off x="6612366" y="4998733"/>
-            <a:ext cx="1086678" cy="1033669"/>
+            <a:off x="6354054" y="4998733"/>
+            <a:ext cx="1603302" cy="1033669"/>
           </a:xfrm>
           <a:prstGeom prst="roundRect">
             <a:avLst/>
@@ -15376,13 +16298,18 @@
           <a:p>
             <a:pPr algn="ctr"/>
             <a:r>
-              <a:rPr lang="en-US" dirty="0">
+              <a:rPr lang="en-US" dirty="0" err="1">
                 <a:solidFill>
                   <a:schemeClr val="bg1"/>
                 </a:solidFill>
               </a:rPr>
-              <a:t>Models</a:t>
-            </a:r>
+              <a:t>Modelos</a:t>
+            </a:r>
+            <a:endParaRPr lang="en-US" dirty="0">
+              <a:solidFill>
+                <a:schemeClr val="bg1"/>
+              </a:solidFill>
+            </a:endParaRPr>
           </a:p>
         </p:txBody>
       </p:sp>
@@ -15390,14 +16317,15 @@
         <p:nvCxnSpPr>
           <p:cNvPr id="56" name="Straight Arrow Connector 55"/>
           <p:cNvCxnSpPr>
+            <a:cxnSpLocks/>
             <a:endCxn id="49" idx="3"/>
           </p:cNvCxnSpPr>
           <p:nvPr/>
         </p:nvCxnSpPr>
         <p:spPr>
           <a:xfrm flipH="1">
-            <a:off x="7699044" y="5060467"/>
-            <a:ext cx="1369168" cy="455101"/>
+            <a:off x="7957356" y="5060467"/>
+            <a:ext cx="1110856" cy="455101"/>
           </a:xfrm>
           <a:prstGeom prst="straightConnector1">
             <a:avLst/>
@@ -15428,6 +16356,7 @@
         <p:nvCxnSpPr>
           <p:cNvPr id="60" name="Straight Arrow Connector 59"/>
           <p:cNvCxnSpPr>
+            <a:cxnSpLocks/>
             <a:endCxn id="10" idx="0"/>
           </p:cNvCxnSpPr>
           <p:nvPr/>
@@ -15466,6 +16395,7 @@
         <p:nvCxnSpPr>
           <p:cNvPr id="64" name="Straight Arrow Connector 63"/>
           <p:cNvCxnSpPr>
+            <a:cxnSpLocks/>
             <a:endCxn id="10" idx="2"/>
           </p:cNvCxnSpPr>
           <p:nvPr/>
@@ -15739,24 +16669,34 @@
           <a:p>
             <a:pPr algn="ctr"/>
             <a:r>
+              <a:rPr lang="en-US" dirty="0" err="1">
+                <a:solidFill>
+                  <a:schemeClr val="tx1"/>
+                </a:solidFill>
+              </a:rPr>
+              <a:t>Analizar</a:t>
+            </a:r>
+            <a:r>
               <a:rPr lang="en-US" dirty="0">
                 <a:solidFill>
                   <a:schemeClr val="tx1"/>
                 </a:solidFill>
               </a:rPr>
-              <a:t>Parse</a:t>
-            </a:r>
-          </a:p>
-          <a:p>
-            <a:pPr algn="ctr"/>
-            <a:r>
-              <a:rPr lang="en-US" dirty="0">
+              <a:t> </a:t>
+            </a:r>
+            <a:r>
+              <a:rPr lang="en-US" dirty="0" err="1">
                 <a:solidFill>
                   <a:schemeClr val="tx1"/>
                 </a:solidFill>
               </a:rPr>
-              <a:t>Response</a:t>
-            </a:r>
+              <a:t>respuesta</a:t>
+            </a:r>
+            <a:endParaRPr lang="en-US" dirty="0">
+              <a:solidFill>
+                <a:schemeClr val="tx1"/>
+              </a:solidFill>
+            </a:endParaRPr>
           </a:p>
         </p:txBody>
       </p:sp>
@@ -16100,6 +17040,7 @@
         <p:nvCxnSpPr>
           <p:cNvPr id="38" name="Straight Arrow Connector 37"/>
           <p:cNvCxnSpPr>
+            <a:cxnSpLocks/>
             <a:endCxn id="9" idx="1"/>
           </p:cNvCxnSpPr>
           <p:nvPr/>
@@ -16107,7 +17048,7 @@
         <p:spPr>
           <a:xfrm>
             <a:off x="3597722" y="1549422"/>
-            <a:ext cx="3014644" cy="80398"/>
+            <a:ext cx="2756332" cy="80398"/>
           </a:xfrm>
           <a:prstGeom prst="straightConnector1">
             <a:avLst/>
@@ -16277,8 +17218,13 @@
             <a:pPr algn="ctr"/>
             <a:r>
               <a:rPr lang="en-US" dirty="0"/>
-              <a:t>3: Choose</a:t>
-            </a:r>
+              <a:t>3: </a:t>
+            </a:r>
+            <a:r>
+              <a:rPr lang="en-US" dirty="0" err="1"/>
+              <a:t>Elegir</a:t>
+            </a:r>
+            <a:endParaRPr lang="en-US" dirty="0"/>
           </a:p>
         </p:txBody>
       </p:sp>
@@ -16363,7 +17309,7 @@
         <p:spPr>
           <a:xfrm>
             <a:off x="5272267" y="4375124"/>
-            <a:ext cx="1567830" cy="623607"/>
+            <a:ext cx="1567830" cy="801909"/>
           </a:xfrm>
           <a:prstGeom prst="roundRect">
             <a:avLst/>
@@ -16397,15 +17343,23 @@
             <a:pPr algn="ctr"/>
             <a:r>
               <a:rPr lang="en-US" dirty="0"/>
-              <a:t>4</a:t>
-            </a:r>
-            <a:r>
-              <a:rPr lang="en-US"/>
-              <a:t>: Store Data </a:t>
-            </a:r>
-            <a:r>
-              <a:rPr lang="en-US" dirty="0"/>
-              <a:t>(optional)</a:t>
+              <a:t>4: </a:t>
+            </a:r>
+            <a:r>
+              <a:rPr lang="en-US" dirty="0" err="1"/>
+              <a:t>Almacenar</a:t>
+            </a:r>
+            <a:r>
+              <a:rPr lang="en-US" dirty="0"/>
+              <a:t> </a:t>
+            </a:r>
+            <a:r>
+              <a:rPr lang="en-US" dirty="0" err="1"/>
+              <a:t>Datos</a:t>
+            </a:r>
+            <a:r>
+              <a:rPr lang="en-US" dirty="0"/>
+              <a:t> (optional)</a:t>
             </a:r>
           </a:p>
         </p:txBody>
@@ -16453,8 +17407,13 @@
             <a:pPr algn="ctr"/>
             <a:r>
               <a:rPr lang="en-US" dirty="0"/>
-              <a:t>5: Choose</a:t>
-            </a:r>
+              <a:t>5: </a:t>
+            </a:r>
+            <a:r>
+              <a:rPr lang="en-US" dirty="0" err="1"/>
+              <a:t>Elegir</a:t>
+            </a:r>
+            <a:endParaRPr lang="en-US" dirty="0"/>
           </a:p>
         </p:txBody>
       </p:sp>
@@ -16537,11 +17496,11 @@
             <a:pPr algn="ctr"/>
             <a:r>
               <a:rPr lang="en-US" dirty="0"/>
-              <a:t>6</a:t>
-            </a:r>
-            <a:r>
-              <a:rPr lang="en-US"/>
-              <a:t>: Read Data</a:t>
+              <a:t>6: Leer </a:t>
+            </a:r>
+            <a:r>
+              <a:rPr lang="en-US" dirty="0" err="1"/>
+              <a:t>Datos</a:t>
             </a:r>
             <a:endParaRPr lang="en-US" dirty="0"/>
           </a:p>
@@ -16592,7 +17551,7 @@
         <p:spPr>
           <a:xfrm>
             <a:off x="5417736" y="2556508"/>
-            <a:ext cx="1377696" cy="382994"/>
+            <a:ext cx="1539284" cy="382994"/>
           </a:xfrm>
           <a:prstGeom prst="roundRect">
             <a:avLst/>
@@ -16626,8 +17585,13 @@
             <a:pPr algn="ctr"/>
             <a:r>
               <a:rPr lang="en-US" dirty="0"/>
-              <a:t>7: Render</a:t>
-            </a:r>
+              <a:t>7: </a:t>
+            </a:r>
+            <a:r>
+              <a:rPr lang="en-US" dirty="0" err="1"/>
+              <a:t>Renderizar</a:t>
+            </a:r>
+            <a:endParaRPr lang="en-US" dirty="0"/>
           </a:p>
         </p:txBody>
       </p:sp>
@@ -16713,8 +17677,12 @@
           <a:lstStyle/>
           <a:p>
             <a:r>
-              <a:rPr lang="en-US" dirty="0"/>
-              <a:t>Virtual Hosting</a:t>
+              <a:rPr lang="en-US" dirty="0" err="1"/>
+              <a:t>Alojamiento</a:t>
+            </a:r>
+            <a:r>
+              <a:rPr lang="en-US" dirty="0"/>
+              <a:t> Virtual</a:t>
             </a:r>
           </a:p>
         </p:txBody>
@@ -16735,8 +17703,12 @@
           <a:lstStyle/>
           <a:p>
             <a:r>
-              <a:rPr lang="en-US" dirty="0"/>
-              <a:t>Virtual Hosting </a:t>
+              <a:rPr lang="en-US" dirty="0" err="1"/>
+              <a:t>Alojamiento</a:t>
+            </a:r>
+            <a:r>
+              <a:rPr lang="en-US" dirty="0"/>
+              <a:t> Virtual </a:t>
             </a:r>
             <a:r>
               <a:rPr lang="mr-IN" dirty="0"/>
@@ -16744,8 +17716,37 @@
             </a:r>
             <a:r>
               <a:rPr lang="en-US" dirty="0"/>
-              <a:t> Many domains on one system</a:t>
-            </a:r>
+              <a:t> </a:t>
+            </a:r>
+            <a:r>
+              <a:rPr lang="en-US" dirty="0" err="1"/>
+              <a:t>Muchos</a:t>
+            </a:r>
+            <a:r>
+              <a:rPr lang="en-US" dirty="0"/>
+              <a:t> </a:t>
+            </a:r>
+            <a:r>
+              <a:rPr lang="en-US" dirty="0" err="1"/>
+              <a:t>dominios</a:t>
+            </a:r>
+            <a:r>
+              <a:rPr lang="en-US" dirty="0"/>
+              <a:t> </a:t>
+            </a:r>
+            <a:r>
+              <a:rPr lang="en-US" dirty="0" err="1"/>
+              <a:t>en</a:t>
+            </a:r>
+            <a:r>
+              <a:rPr lang="en-US" dirty="0"/>
+              <a:t> un solo </a:t>
+            </a:r>
+            <a:r>
+              <a:rPr lang="en-US" dirty="0" err="1"/>
+              <a:t>sistema</a:t>
+            </a:r>
+            <a:endParaRPr lang="en-US" dirty="0"/>
           </a:p>
           <a:p>
             <a:endParaRPr lang="en-US" dirty="0"/>
@@ -16766,14 +17767,59 @@
           </a:p>
           <a:p>
             <a:r>
-              <a:rPr lang="en-US" dirty="0"/>
-              <a:t>Connects to a domain</a:t>
-            </a:r>
-          </a:p>
-          <a:p>
-            <a:r>
-              <a:rPr lang="en-US" dirty="0"/>
-              <a:t>Includes the domain in the GET request</a:t>
+              <a:rPr lang="en-US" dirty="0" err="1"/>
+              <a:t>Conexión</a:t>
+            </a:r>
+            <a:r>
+              <a:rPr lang="en-US" dirty="0"/>
+              <a:t> a un </a:t>
+            </a:r>
+            <a:r>
+              <a:rPr lang="en-US" dirty="0" err="1"/>
+              <a:t>dominio</a:t>
+            </a:r>
+            <a:endParaRPr lang="en-US" dirty="0"/>
+          </a:p>
+          <a:p>
+            <a:r>
+              <a:rPr lang="en-US" dirty="0" err="1"/>
+              <a:t>Incluye</a:t>
+            </a:r>
+            <a:r>
+              <a:rPr lang="en-US" dirty="0"/>
+              <a:t> </a:t>
+            </a:r>
+            <a:r>
+              <a:rPr lang="en-US" dirty="0" err="1"/>
+              <a:t>el</a:t>
+            </a:r>
+            <a:r>
+              <a:rPr lang="en-US" dirty="0"/>
+              <a:t> </a:t>
+            </a:r>
+            <a:r>
+              <a:rPr lang="en-US" dirty="0" err="1"/>
+              <a:t>dominio</a:t>
+            </a:r>
+            <a:r>
+              <a:rPr lang="en-US" dirty="0"/>
+              <a:t> </a:t>
+            </a:r>
+            <a:r>
+              <a:rPr lang="en-US" dirty="0" err="1"/>
+              <a:t>en</a:t>
+            </a:r>
+            <a:r>
+              <a:rPr lang="en-US" dirty="0"/>
+              <a:t> la </a:t>
+            </a:r>
+            <a:r>
+              <a:rPr lang="en-US" dirty="0" err="1"/>
+              <a:t>solicitud</a:t>
+            </a:r>
+            <a:r>
+              <a:rPr lang="en-US" dirty="0"/>
+              <a:t> GET</a:t>
             </a:r>
           </a:p>
         </p:txBody>

</xml_diff>